<commit_message>
Added some implementation images
</commit_message>
<xml_diff>
--- a/Block Escape.pptx
+++ b/Block Escape.pptx
@@ -265,7 +265,7 @@
           <a:p>
             <a:fld id="{1C56E1C8-51FB-41FF-A952-5015197EF72E}" type="datetimeFigureOut">
               <a:rPr lang="en-GB" smtClean="0"/>
-              <a:t>09/03/2023</a:t>
+              <a:t>10/03/2023</a:t>
             </a:fld>
             <a:endParaRPr lang="en-GB"/>
           </a:p>
@@ -465,7 +465,7 @@
           <a:p>
             <a:fld id="{1C56E1C8-51FB-41FF-A952-5015197EF72E}" type="datetimeFigureOut">
               <a:rPr lang="en-GB" smtClean="0"/>
-              <a:t>09/03/2023</a:t>
+              <a:t>10/03/2023</a:t>
             </a:fld>
             <a:endParaRPr lang="en-GB"/>
           </a:p>
@@ -675,7 +675,7 @@
           <a:p>
             <a:fld id="{1C56E1C8-51FB-41FF-A952-5015197EF72E}" type="datetimeFigureOut">
               <a:rPr lang="en-GB" smtClean="0"/>
-              <a:t>09/03/2023</a:t>
+              <a:t>10/03/2023</a:t>
             </a:fld>
             <a:endParaRPr lang="en-GB"/>
           </a:p>
@@ -875,7 +875,7 @@
           <a:p>
             <a:fld id="{1C56E1C8-51FB-41FF-A952-5015197EF72E}" type="datetimeFigureOut">
               <a:rPr lang="en-GB" smtClean="0"/>
-              <a:t>09/03/2023</a:t>
+              <a:t>10/03/2023</a:t>
             </a:fld>
             <a:endParaRPr lang="en-GB"/>
           </a:p>
@@ -1151,7 +1151,7 @@
           <a:p>
             <a:fld id="{1C56E1C8-51FB-41FF-A952-5015197EF72E}" type="datetimeFigureOut">
               <a:rPr lang="en-GB" smtClean="0"/>
-              <a:t>09/03/2023</a:t>
+              <a:t>10/03/2023</a:t>
             </a:fld>
             <a:endParaRPr lang="en-GB"/>
           </a:p>
@@ -1419,7 +1419,7 @@
           <a:p>
             <a:fld id="{1C56E1C8-51FB-41FF-A952-5015197EF72E}" type="datetimeFigureOut">
               <a:rPr lang="en-GB" smtClean="0"/>
-              <a:t>09/03/2023</a:t>
+              <a:t>10/03/2023</a:t>
             </a:fld>
             <a:endParaRPr lang="en-GB"/>
           </a:p>
@@ -1834,7 +1834,7 @@
           <a:p>
             <a:fld id="{1C56E1C8-51FB-41FF-A952-5015197EF72E}" type="datetimeFigureOut">
               <a:rPr lang="en-GB" smtClean="0"/>
-              <a:t>09/03/2023</a:t>
+              <a:t>10/03/2023</a:t>
             </a:fld>
             <a:endParaRPr lang="en-GB"/>
           </a:p>
@@ -1976,7 +1976,7 @@
           <a:p>
             <a:fld id="{1C56E1C8-51FB-41FF-A952-5015197EF72E}" type="datetimeFigureOut">
               <a:rPr lang="en-GB" smtClean="0"/>
-              <a:t>09/03/2023</a:t>
+              <a:t>10/03/2023</a:t>
             </a:fld>
             <a:endParaRPr lang="en-GB"/>
           </a:p>
@@ -2089,7 +2089,7 @@
           <a:p>
             <a:fld id="{1C56E1C8-51FB-41FF-A952-5015197EF72E}" type="datetimeFigureOut">
               <a:rPr lang="en-GB" smtClean="0"/>
-              <a:t>09/03/2023</a:t>
+              <a:t>10/03/2023</a:t>
             </a:fld>
             <a:endParaRPr lang="en-GB"/>
           </a:p>
@@ -2402,7 +2402,7 @@
           <a:p>
             <a:fld id="{1C56E1C8-51FB-41FF-A952-5015197EF72E}" type="datetimeFigureOut">
               <a:rPr lang="en-GB" smtClean="0"/>
-              <a:t>09/03/2023</a:t>
+              <a:t>10/03/2023</a:t>
             </a:fld>
             <a:endParaRPr lang="en-GB"/>
           </a:p>
@@ -2691,7 +2691,7 @@
           <a:p>
             <a:fld id="{1C56E1C8-51FB-41FF-A952-5015197EF72E}" type="datetimeFigureOut">
               <a:rPr lang="en-GB" smtClean="0"/>
-              <a:t>09/03/2023</a:t>
+              <a:t>10/03/2023</a:t>
             </a:fld>
             <a:endParaRPr lang="en-GB"/>
           </a:p>
@@ -2934,7 +2934,7 @@
           <a:p>
             <a:fld id="{1C56E1C8-51FB-41FF-A952-5015197EF72E}" type="datetimeFigureOut">
               <a:rPr lang="en-GB" smtClean="0"/>
-              <a:t>09/03/2023</a:t>
+              <a:t>10/03/2023</a:t>
             </a:fld>
             <a:endParaRPr lang="en-GB"/>
           </a:p>
@@ -5902,6 +5902,14 @@
 <file path=ppt/slides/slide5.xml><?xml version="1.0" encoding="utf-8"?>
 <p:sld xmlns:a="http://schemas.openxmlformats.org/drawingml/2006/main" xmlns:r="http://schemas.openxmlformats.org/officeDocument/2006/relationships" xmlns:p="http://schemas.openxmlformats.org/presentationml/2006/main">
   <p:cSld>
+    <p:bg>
+      <p:bgPr>
+        <a:solidFill>
+          <a:schemeClr val="bg1"/>
+        </a:solidFill>
+        <a:effectLst/>
+      </p:bgPr>
+    </p:bg>
     <p:spTree>
       <p:nvGrpSpPr>
         <p:cNvPr id="1" name=""/>
@@ -5918,10 +5926,10 @@
       </p:grpSpPr>
       <p:sp useBgFill="1">
         <p:nvSpPr>
-          <p:cNvPr id="8" name="Rectangle 7">
-            <a:extLst>
-              <a:ext uri="{FF2B5EF4-FFF2-40B4-BE49-F238E27FC236}">
-                <a16:creationId xmlns:a16="http://schemas.microsoft.com/office/drawing/2014/main" id="{100EDD19-6802-4EC3-95CE-CFFAB042CFD6}"/>
+          <p:cNvPr id="18" name="Rectangle 17">
+            <a:extLst>
+              <a:ext uri="{FF2B5EF4-FFF2-40B4-BE49-F238E27FC236}">
+                <a16:creationId xmlns:a16="http://schemas.microsoft.com/office/drawing/2014/main" id="{93062723-6941-4ABE-8146-AC6FA530BA4C}"/>
               </a:ext>
               <a:ext uri="{C183D7F6-B498-43B3-948B-1728B52AA6E4}">
                 <adec:decorative xmlns:adec="http://schemas.microsoft.com/office/drawing/2017/decorative" val="1"/>
@@ -5942,7 +5950,7 @@
         <p:spPr>
           <a:xfrm>
             <a:off x="0" y="0"/>
-            <a:ext cx="12188952" cy="6858000"/>
+            <a:ext cx="12192000" cy="6858000"/>
           </a:xfrm>
           <a:prstGeom prst="rect">
             <a:avLst/>
@@ -5976,58 +5984,12 @@
           </a:p>
         </p:txBody>
       </p:sp>
-      <p:sp>
-        <p:nvSpPr>
-          <p:cNvPr id="2" name="Title 1">
-            <a:extLst>
-              <a:ext uri="{FF2B5EF4-FFF2-40B4-BE49-F238E27FC236}">
-                <a16:creationId xmlns:a16="http://schemas.microsoft.com/office/drawing/2014/main" id="{FA6489E2-7FE1-9296-4114-3D2D3A8CBDEC}"/>
-              </a:ext>
-            </a:extLst>
-          </p:cNvPr>
-          <p:cNvSpPr>
-            <a:spLocks noGrp="1"/>
-          </p:cNvSpPr>
-          <p:nvPr>
-            <p:ph type="title"/>
-          </p:nvPr>
-        </p:nvSpPr>
-        <p:spPr>
-          <a:xfrm>
-            <a:off x="838200" y="339725"/>
-            <a:ext cx="10515600" cy="1325563"/>
-          </a:xfrm>
-        </p:spPr>
-        <p:txBody>
-          <a:bodyPr vert="horz" lIns="91440" tIns="45720" rIns="91440" bIns="45720" rtlCol="0" anchor="ctr">
-            <a:normAutofit/>
-          </a:bodyPr>
-          <a:lstStyle/>
-          <a:p>
-            <a:r>
-              <a:rPr lang="en-US" sz="4600" dirty="0">
-                <a:latin typeface="Lexend"/>
-              </a:rPr>
-              <a:t>I</a:t>
-            </a:r>
-            <a:r>
-              <a:rPr lang="en-US" sz="4600" kern="1200" dirty="0">
-                <a:solidFill>
-                  <a:schemeClr val="tx1"/>
-                </a:solidFill>
-                <a:latin typeface="Lexend"/>
-              </a:rPr>
-              <a:t>mplementation work already carried out</a:t>
-            </a:r>
-          </a:p>
-        </p:txBody>
-      </p:sp>
-      <p:sp>
-        <p:nvSpPr>
-          <p:cNvPr id="10" name="sketch line">
-            <a:extLst>
-              <a:ext uri="{FF2B5EF4-FFF2-40B4-BE49-F238E27FC236}">
-                <a16:creationId xmlns:a16="http://schemas.microsoft.com/office/drawing/2014/main" id="{DB17E863-922E-4C26-BD64-E8FD41D28661}"/>
+      <p:sp useBgFill="1">
+        <p:nvSpPr>
+          <p:cNvPr id="20" name="Rectangle 19">
+            <a:extLst>
+              <a:ext uri="{FF2B5EF4-FFF2-40B4-BE49-F238E27FC236}">
+                <a16:creationId xmlns:a16="http://schemas.microsoft.com/office/drawing/2014/main" id="{917859B3-4C91-478D-929D-BB6433F90849}"/>
               </a:ext>
               <a:ext uri="{C183D7F6-B498-43B3-948B-1728B52AA6E4}">
                 <adec:decorative xmlns:adec="http://schemas.microsoft.com/office/drawing/2017/decorative" val="1"/>
@@ -6047,592 +6009,274 @@
         </p:nvSpPr>
         <p:spPr>
           <a:xfrm>
-            <a:off x="669036" y="1677373"/>
-            <a:ext cx="10853928" cy="18288"/>
+            <a:off x="554416" y="4218905"/>
+            <a:ext cx="11167447" cy="2089317"/>
           </a:xfrm>
-          <a:custGeom>
+          <a:prstGeom prst="rect">
             <a:avLst/>
-            <a:gdLst>
-              <a:gd name="connsiteX0" fmla="*/ 0 w 10853928"/>
-              <a:gd name="connsiteY0" fmla="*/ 0 h 18288"/>
-              <a:gd name="connsiteX1" fmla="*/ 461292 w 10853928"/>
-              <a:gd name="connsiteY1" fmla="*/ 0 h 18288"/>
-              <a:gd name="connsiteX2" fmla="*/ 1139662 w 10853928"/>
-              <a:gd name="connsiteY2" fmla="*/ 0 h 18288"/>
-              <a:gd name="connsiteX3" fmla="*/ 1926572 w 10853928"/>
-              <a:gd name="connsiteY3" fmla="*/ 0 h 18288"/>
-              <a:gd name="connsiteX4" fmla="*/ 2279325 w 10853928"/>
-              <a:gd name="connsiteY4" fmla="*/ 0 h 18288"/>
-              <a:gd name="connsiteX5" fmla="*/ 2632078 w 10853928"/>
-              <a:gd name="connsiteY5" fmla="*/ 0 h 18288"/>
-              <a:gd name="connsiteX6" fmla="*/ 3527527 w 10853928"/>
-              <a:gd name="connsiteY6" fmla="*/ 0 h 18288"/>
-              <a:gd name="connsiteX7" fmla="*/ 4205897 w 10853928"/>
-              <a:gd name="connsiteY7" fmla="*/ 0 h 18288"/>
-              <a:gd name="connsiteX8" fmla="*/ 4558650 w 10853928"/>
-              <a:gd name="connsiteY8" fmla="*/ 0 h 18288"/>
-              <a:gd name="connsiteX9" fmla="*/ 5237020 w 10853928"/>
-              <a:gd name="connsiteY9" fmla="*/ 0 h 18288"/>
-              <a:gd name="connsiteX10" fmla="*/ 6132469 w 10853928"/>
-              <a:gd name="connsiteY10" fmla="*/ 0 h 18288"/>
-              <a:gd name="connsiteX11" fmla="*/ 6702301 w 10853928"/>
-              <a:gd name="connsiteY11" fmla="*/ 0 h 18288"/>
-              <a:gd name="connsiteX12" fmla="*/ 7272132 w 10853928"/>
-              <a:gd name="connsiteY12" fmla="*/ 0 h 18288"/>
-              <a:gd name="connsiteX13" fmla="*/ 7950502 w 10853928"/>
-              <a:gd name="connsiteY13" fmla="*/ 0 h 18288"/>
-              <a:gd name="connsiteX14" fmla="*/ 8737412 w 10853928"/>
-              <a:gd name="connsiteY14" fmla="*/ 0 h 18288"/>
-              <a:gd name="connsiteX15" fmla="*/ 9524322 w 10853928"/>
-              <a:gd name="connsiteY15" fmla="*/ 0 h 18288"/>
-              <a:gd name="connsiteX16" fmla="*/ 10853928 w 10853928"/>
-              <a:gd name="connsiteY16" fmla="*/ 0 h 18288"/>
-              <a:gd name="connsiteX17" fmla="*/ 10853928 w 10853928"/>
-              <a:gd name="connsiteY17" fmla="*/ 18288 h 18288"/>
-              <a:gd name="connsiteX18" fmla="*/ 10392636 w 10853928"/>
-              <a:gd name="connsiteY18" fmla="*/ 18288 h 18288"/>
-              <a:gd name="connsiteX19" fmla="*/ 9497187 w 10853928"/>
-              <a:gd name="connsiteY19" fmla="*/ 18288 h 18288"/>
-              <a:gd name="connsiteX20" fmla="*/ 8818817 w 10853928"/>
-              <a:gd name="connsiteY20" fmla="*/ 18288 h 18288"/>
-              <a:gd name="connsiteX21" fmla="*/ 8466064 w 10853928"/>
-              <a:gd name="connsiteY21" fmla="*/ 18288 h 18288"/>
-              <a:gd name="connsiteX22" fmla="*/ 7787693 w 10853928"/>
-              <a:gd name="connsiteY22" fmla="*/ 18288 h 18288"/>
-              <a:gd name="connsiteX23" fmla="*/ 7217862 w 10853928"/>
-              <a:gd name="connsiteY23" fmla="*/ 18288 h 18288"/>
-              <a:gd name="connsiteX24" fmla="*/ 6648031 w 10853928"/>
-              <a:gd name="connsiteY24" fmla="*/ 18288 h 18288"/>
-              <a:gd name="connsiteX25" fmla="*/ 6078200 w 10853928"/>
-              <a:gd name="connsiteY25" fmla="*/ 18288 h 18288"/>
-              <a:gd name="connsiteX26" fmla="*/ 5508368 w 10853928"/>
-              <a:gd name="connsiteY26" fmla="*/ 18288 h 18288"/>
-              <a:gd name="connsiteX27" fmla="*/ 4721459 w 10853928"/>
-              <a:gd name="connsiteY27" fmla="*/ 18288 h 18288"/>
-              <a:gd name="connsiteX28" fmla="*/ 4043088 w 10853928"/>
-              <a:gd name="connsiteY28" fmla="*/ 18288 h 18288"/>
-              <a:gd name="connsiteX29" fmla="*/ 3690336 w 10853928"/>
-              <a:gd name="connsiteY29" fmla="*/ 18288 h 18288"/>
-              <a:gd name="connsiteX30" fmla="*/ 3120504 w 10853928"/>
-              <a:gd name="connsiteY30" fmla="*/ 18288 h 18288"/>
-              <a:gd name="connsiteX31" fmla="*/ 2333595 w 10853928"/>
-              <a:gd name="connsiteY31" fmla="*/ 18288 h 18288"/>
-              <a:gd name="connsiteX32" fmla="*/ 1872303 w 10853928"/>
-              <a:gd name="connsiteY32" fmla="*/ 18288 h 18288"/>
-              <a:gd name="connsiteX33" fmla="*/ 976854 w 10853928"/>
-              <a:gd name="connsiteY33" fmla="*/ 18288 h 18288"/>
-              <a:gd name="connsiteX34" fmla="*/ 0 w 10853928"/>
-              <a:gd name="connsiteY34" fmla="*/ 18288 h 18288"/>
-              <a:gd name="connsiteX35" fmla="*/ 0 w 10853928"/>
-              <a:gd name="connsiteY35" fmla="*/ 0 h 18288"/>
-            </a:gdLst>
-            <a:ahLst/>
-            <a:cxnLst>
-              <a:cxn ang="0">
-                <a:pos x="connsiteX0" y="connsiteY0"/>
-              </a:cxn>
-              <a:cxn ang="0">
-                <a:pos x="connsiteX1" y="connsiteY1"/>
-              </a:cxn>
-              <a:cxn ang="0">
-                <a:pos x="connsiteX2" y="connsiteY2"/>
-              </a:cxn>
-              <a:cxn ang="0">
-                <a:pos x="connsiteX3" y="connsiteY3"/>
-              </a:cxn>
-              <a:cxn ang="0">
-                <a:pos x="connsiteX4" y="connsiteY4"/>
-              </a:cxn>
-              <a:cxn ang="0">
-                <a:pos x="connsiteX5" y="connsiteY5"/>
-              </a:cxn>
-              <a:cxn ang="0">
-                <a:pos x="connsiteX6" y="connsiteY6"/>
-              </a:cxn>
-              <a:cxn ang="0">
-                <a:pos x="connsiteX7" y="connsiteY7"/>
-              </a:cxn>
-              <a:cxn ang="0">
-                <a:pos x="connsiteX8" y="connsiteY8"/>
-              </a:cxn>
-              <a:cxn ang="0">
-                <a:pos x="connsiteX9" y="connsiteY9"/>
-              </a:cxn>
-              <a:cxn ang="0">
-                <a:pos x="connsiteX10" y="connsiteY10"/>
-              </a:cxn>
-              <a:cxn ang="0">
-                <a:pos x="connsiteX11" y="connsiteY11"/>
-              </a:cxn>
-              <a:cxn ang="0">
-                <a:pos x="connsiteX12" y="connsiteY12"/>
-              </a:cxn>
-              <a:cxn ang="0">
-                <a:pos x="connsiteX13" y="connsiteY13"/>
-              </a:cxn>
-              <a:cxn ang="0">
-                <a:pos x="connsiteX14" y="connsiteY14"/>
-              </a:cxn>
-              <a:cxn ang="0">
-                <a:pos x="connsiteX15" y="connsiteY15"/>
-              </a:cxn>
-              <a:cxn ang="0">
-                <a:pos x="connsiteX16" y="connsiteY16"/>
-              </a:cxn>
-              <a:cxn ang="0">
-                <a:pos x="connsiteX17" y="connsiteY17"/>
-              </a:cxn>
-              <a:cxn ang="0">
-                <a:pos x="connsiteX18" y="connsiteY18"/>
-              </a:cxn>
-              <a:cxn ang="0">
-                <a:pos x="connsiteX19" y="connsiteY19"/>
-              </a:cxn>
-              <a:cxn ang="0">
-                <a:pos x="connsiteX20" y="connsiteY20"/>
-              </a:cxn>
-              <a:cxn ang="0">
-                <a:pos x="connsiteX21" y="connsiteY21"/>
-              </a:cxn>
-              <a:cxn ang="0">
-                <a:pos x="connsiteX22" y="connsiteY22"/>
-              </a:cxn>
-              <a:cxn ang="0">
-                <a:pos x="connsiteX23" y="connsiteY23"/>
-              </a:cxn>
-              <a:cxn ang="0">
-                <a:pos x="connsiteX24" y="connsiteY24"/>
-              </a:cxn>
-              <a:cxn ang="0">
-                <a:pos x="connsiteX25" y="connsiteY25"/>
-              </a:cxn>
-              <a:cxn ang="0">
-                <a:pos x="connsiteX26" y="connsiteY26"/>
-              </a:cxn>
-              <a:cxn ang="0">
-                <a:pos x="connsiteX27" y="connsiteY27"/>
-              </a:cxn>
-              <a:cxn ang="0">
-                <a:pos x="connsiteX28" y="connsiteY28"/>
-              </a:cxn>
-              <a:cxn ang="0">
-                <a:pos x="connsiteX29" y="connsiteY29"/>
-              </a:cxn>
-              <a:cxn ang="0">
-                <a:pos x="connsiteX30" y="connsiteY30"/>
-              </a:cxn>
-              <a:cxn ang="0">
-                <a:pos x="connsiteX31" y="connsiteY31"/>
-              </a:cxn>
-              <a:cxn ang="0">
-                <a:pos x="connsiteX32" y="connsiteY32"/>
-              </a:cxn>
-              <a:cxn ang="0">
-                <a:pos x="connsiteX33" y="connsiteY33"/>
-              </a:cxn>
-              <a:cxn ang="0">
-                <a:pos x="connsiteX34" y="connsiteY34"/>
-              </a:cxn>
-              <a:cxn ang="0">
-                <a:pos x="connsiteX35" y="connsiteY35"/>
-              </a:cxn>
-            </a:cxnLst>
-            <a:rect l="l" t="t" r="r" b="b"/>
-            <a:pathLst>
-              <a:path w="10853928" h="18288" fill="none" extrusionOk="0">
-                <a:moveTo>
-                  <a:pt x="0" y="0"/>
-                </a:moveTo>
-                <a:cubicBezTo>
-                  <a:pt x="146993" y="-19076"/>
-                  <a:pt x="347684" y="-4790"/>
-                  <a:pt x="461292" y="0"/>
-                </a:cubicBezTo>
-                <a:cubicBezTo>
-                  <a:pt x="574900" y="4790"/>
-                  <a:pt x="808367" y="19821"/>
-                  <a:pt x="1139662" y="0"/>
-                </a:cubicBezTo>
-                <a:cubicBezTo>
-                  <a:pt x="1470957" y="-19821"/>
-                  <a:pt x="1627405" y="5721"/>
-                  <a:pt x="1926572" y="0"/>
-                </a:cubicBezTo>
-                <a:cubicBezTo>
-                  <a:pt x="2225739" y="-5721"/>
-                  <a:pt x="2137730" y="-3235"/>
-                  <a:pt x="2279325" y="0"/>
-                </a:cubicBezTo>
-                <a:cubicBezTo>
-                  <a:pt x="2420920" y="3235"/>
-                  <a:pt x="2456518" y="9685"/>
-                  <a:pt x="2632078" y="0"/>
-                </a:cubicBezTo>
-                <a:cubicBezTo>
-                  <a:pt x="2807638" y="-9685"/>
-                  <a:pt x="3211516" y="-43007"/>
-                  <a:pt x="3527527" y="0"/>
-                </a:cubicBezTo>
-                <a:cubicBezTo>
-                  <a:pt x="3843538" y="43007"/>
-                  <a:pt x="4058833" y="22042"/>
-                  <a:pt x="4205897" y="0"/>
-                </a:cubicBezTo>
-                <a:cubicBezTo>
-                  <a:pt x="4352961" y="-22042"/>
-                  <a:pt x="4474805" y="-11846"/>
-                  <a:pt x="4558650" y="0"/>
-                </a:cubicBezTo>
-                <a:cubicBezTo>
-                  <a:pt x="4642495" y="11846"/>
-                  <a:pt x="5041928" y="-6069"/>
-                  <a:pt x="5237020" y="0"/>
-                </a:cubicBezTo>
-                <a:cubicBezTo>
-                  <a:pt x="5432112" y="6069"/>
-                  <a:pt x="5943266" y="-17479"/>
-                  <a:pt x="6132469" y="0"/>
-                </a:cubicBezTo>
-                <a:cubicBezTo>
-                  <a:pt x="6321672" y="17479"/>
-                  <a:pt x="6483872" y="26234"/>
-                  <a:pt x="6702301" y="0"/>
-                </a:cubicBezTo>
-                <a:cubicBezTo>
-                  <a:pt x="6920730" y="-26234"/>
-                  <a:pt x="6991194" y="-15156"/>
-                  <a:pt x="7272132" y="0"/>
-                </a:cubicBezTo>
-                <a:cubicBezTo>
-                  <a:pt x="7553070" y="15156"/>
-                  <a:pt x="7684444" y="-32961"/>
-                  <a:pt x="7950502" y="0"/>
-                </a:cubicBezTo>
-                <a:cubicBezTo>
-                  <a:pt x="8216560" y="32961"/>
-                  <a:pt x="8493290" y="-10491"/>
-                  <a:pt x="8737412" y="0"/>
-                </a:cubicBezTo>
-                <a:cubicBezTo>
-                  <a:pt x="8981534" y="10491"/>
-                  <a:pt x="9191586" y="-13899"/>
-                  <a:pt x="9524322" y="0"/>
-                </a:cubicBezTo>
-                <a:cubicBezTo>
-                  <a:pt x="9857058" y="13899"/>
-                  <a:pt x="10297509" y="7485"/>
-                  <a:pt x="10853928" y="0"/>
-                </a:cubicBezTo>
-                <a:cubicBezTo>
-                  <a:pt x="10854574" y="4451"/>
-                  <a:pt x="10854418" y="9226"/>
-                  <a:pt x="10853928" y="18288"/>
-                </a:cubicBezTo>
-                <a:cubicBezTo>
-                  <a:pt x="10691638" y="28522"/>
-                  <a:pt x="10574319" y="29578"/>
-                  <a:pt x="10392636" y="18288"/>
-                </a:cubicBezTo>
-                <a:cubicBezTo>
-                  <a:pt x="10210953" y="6998"/>
-                  <a:pt x="9836277" y="-16742"/>
-                  <a:pt x="9497187" y="18288"/>
-                </a:cubicBezTo>
-                <a:cubicBezTo>
-                  <a:pt x="9158097" y="53318"/>
-                  <a:pt x="9119479" y="30714"/>
-                  <a:pt x="8818817" y="18288"/>
-                </a:cubicBezTo>
-                <a:cubicBezTo>
-                  <a:pt x="8518155" y="5863"/>
-                  <a:pt x="8640037" y="6483"/>
-                  <a:pt x="8466064" y="18288"/>
-                </a:cubicBezTo>
-                <a:cubicBezTo>
-                  <a:pt x="8292091" y="30093"/>
-                  <a:pt x="7997656" y="18914"/>
-                  <a:pt x="7787693" y="18288"/>
-                </a:cubicBezTo>
-                <a:cubicBezTo>
-                  <a:pt x="7577730" y="17662"/>
-                  <a:pt x="7412468" y="21416"/>
-                  <a:pt x="7217862" y="18288"/>
-                </a:cubicBezTo>
-                <a:cubicBezTo>
-                  <a:pt x="7023256" y="15160"/>
-                  <a:pt x="6898018" y="14824"/>
-                  <a:pt x="6648031" y="18288"/>
-                </a:cubicBezTo>
-                <a:cubicBezTo>
-                  <a:pt x="6398044" y="21752"/>
-                  <a:pt x="6254402" y="38625"/>
-                  <a:pt x="6078200" y="18288"/>
-                </a:cubicBezTo>
-                <a:cubicBezTo>
-                  <a:pt x="5901998" y="-2049"/>
-                  <a:pt x="5622886" y="3213"/>
-                  <a:pt x="5508368" y="18288"/>
-                </a:cubicBezTo>
-                <a:cubicBezTo>
-                  <a:pt x="5393850" y="33363"/>
-                  <a:pt x="5036260" y="26830"/>
-                  <a:pt x="4721459" y="18288"/>
-                </a:cubicBezTo>
-                <a:cubicBezTo>
-                  <a:pt x="4406658" y="9746"/>
-                  <a:pt x="4239221" y="41551"/>
-                  <a:pt x="4043088" y="18288"/>
-                </a:cubicBezTo>
-                <a:cubicBezTo>
-                  <a:pt x="3846955" y="-4975"/>
-                  <a:pt x="3818802" y="34658"/>
-                  <a:pt x="3690336" y="18288"/>
-                </a:cubicBezTo>
-                <a:cubicBezTo>
-                  <a:pt x="3561870" y="1918"/>
-                  <a:pt x="3265491" y="42194"/>
-                  <a:pt x="3120504" y="18288"/>
-                </a:cubicBezTo>
-                <a:cubicBezTo>
-                  <a:pt x="2975517" y="-5618"/>
-                  <a:pt x="2720254" y="36673"/>
-                  <a:pt x="2333595" y="18288"/>
-                </a:cubicBezTo>
-                <a:cubicBezTo>
-                  <a:pt x="1946936" y="-97"/>
-                  <a:pt x="2097241" y="5776"/>
-                  <a:pt x="1872303" y="18288"/>
-                </a:cubicBezTo>
-                <a:cubicBezTo>
-                  <a:pt x="1647365" y="30800"/>
-                  <a:pt x="1282708" y="45380"/>
-                  <a:pt x="976854" y="18288"/>
-                </a:cubicBezTo>
-                <a:cubicBezTo>
-                  <a:pt x="671000" y="-8804"/>
-                  <a:pt x="408401" y="-12775"/>
-                  <a:pt x="0" y="18288"/>
-                </a:cubicBezTo>
-                <a:cubicBezTo>
-                  <a:pt x="-213" y="9468"/>
-                  <a:pt x="187" y="4459"/>
-                  <a:pt x="0" y="0"/>
-                </a:cubicBezTo>
-                <a:close/>
-              </a:path>
-              <a:path w="10853928" h="18288" stroke="0" extrusionOk="0">
-                <a:moveTo>
-                  <a:pt x="0" y="0"/>
-                </a:moveTo>
-                <a:cubicBezTo>
-                  <a:pt x="267322" y="15284"/>
-                  <a:pt x="415388" y="-21048"/>
-                  <a:pt x="569831" y="0"/>
-                </a:cubicBezTo>
-                <a:cubicBezTo>
-                  <a:pt x="724274" y="21048"/>
-                  <a:pt x="769333" y="-2353"/>
-                  <a:pt x="922584" y="0"/>
-                </a:cubicBezTo>
-                <a:cubicBezTo>
-                  <a:pt x="1075835" y="2353"/>
-                  <a:pt x="1399490" y="-145"/>
-                  <a:pt x="1818033" y="0"/>
-                </a:cubicBezTo>
-                <a:cubicBezTo>
-                  <a:pt x="2236576" y="145"/>
-                  <a:pt x="2145330" y="5482"/>
-                  <a:pt x="2387864" y="0"/>
-                </a:cubicBezTo>
-                <a:cubicBezTo>
-                  <a:pt x="2630398" y="-5482"/>
-                  <a:pt x="2793207" y="18487"/>
-                  <a:pt x="2957695" y="0"/>
-                </a:cubicBezTo>
-                <a:cubicBezTo>
-                  <a:pt x="3122183" y="-18487"/>
-                  <a:pt x="3579141" y="19003"/>
-                  <a:pt x="3853144" y="0"/>
-                </a:cubicBezTo>
-                <a:cubicBezTo>
-                  <a:pt x="4127147" y="-19003"/>
-                  <a:pt x="4209857" y="12211"/>
-                  <a:pt x="4314436" y="0"/>
-                </a:cubicBezTo>
-                <a:cubicBezTo>
-                  <a:pt x="4419015" y="-12211"/>
-                  <a:pt x="4762459" y="-17220"/>
-                  <a:pt x="5209885" y="0"/>
-                </a:cubicBezTo>
-                <a:cubicBezTo>
-                  <a:pt x="5657311" y="17220"/>
-                  <a:pt x="5692663" y="-3290"/>
-                  <a:pt x="6105335" y="0"/>
-                </a:cubicBezTo>
-                <a:cubicBezTo>
-                  <a:pt x="6518007" y="3290"/>
-                  <a:pt x="6455516" y="-5124"/>
-                  <a:pt x="6783705" y="0"/>
-                </a:cubicBezTo>
-                <a:cubicBezTo>
-                  <a:pt x="7111894" y="5124"/>
-                  <a:pt x="7441941" y="-17829"/>
-                  <a:pt x="7679154" y="0"/>
-                </a:cubicBezTo>
-                <a:cubicBezTo>
-                  <a:pt x="7916367" y="17829"/>
-                  <a:pt x="8102967" y="-24363"/>
-                  <a:pt x="8248985" y="0"/>
-                </a:cubicBezTo>
-                <a:cubicBezTo>
-                  <a:pt x="8395003" y="24363"/>
-                  <a:pt x="8552393" y="25505"/>
-                  <a:pt x="8818817" y="0"/>
-                </a:cubicBezTo>
-                <a:cubicBezTo>
-                  <a:pt x="9085241" y="-25505"/>
-                  <a:pt x="9411308" y="38000"/>
-                  <a:pt x="9605726" y="0"/>
-                </a:cubicBezTo>
-                <a:cubicBezTo>
-                  <a:pt x="9800144" y="-38000"/>
-                  <a:pt x="10006468" y="-25741"/>
-                  <a:pt x="10175558" y="0"/>
-                </a:cubicBezTo>
-                <a:cubicBezTo>
-                  <a:pt x="10344648" y="25741"/>
-                  <a:pt x="10696282" y="695"/>
-                  <a:pt x="10853928" y="0"/>
-                </a:cubicBezTo>
-                <a:cubicBezTo>
-                  <a:pt x="10853521" y="8690"/>
-                  <a:pt x="10853774" y="14141"/>
-                  <a:pt x="10853928" y="18288"/>
-                </a:cubicBezTo>
-                <a:cubicBezTo>
-                  <a:pt x="10608124" y="24255"/>
-                  <a:pt x="10343415" y="22307"/>
-                  <a:pt x="10067018" y="18288"/>
-                </a:cubicBezTo>
-                <a:cubicBezTo>
-                  <a:pt x="9790621" y="14270"/>
-                  <a:pt x="9843266" y="3564"/>
-                  <a:pt x="9714266" y="18288"/>
-                </a:cubicBezTo>
-                <a:cubicBezTo>
-                  <a:pt x="9585266" y="33012"/>
-                  <a:pt x="9379484" y="1875"/>
-                  <a:pt x="9252974" y="18288"/>
-                </a:cubicBezTo>
-                <a:cubicBezTo>
-                  <a:pt x="9126464" y="34701"/>
-                  <a:pt x="8580678" y="-4904"/>
-                  <a:pt x="8357525" y="18288"/>
-                </a:cubicBezTo>
-                <a:cubicBezTo>
-                  <a:pt x="8134372" y="41480"/>
-                  <a:pt x="7903199" y="26458"/>
-                  <a:pt x="7679154" y="18288"/>
-                </a:cubicBezTo>
-                <a:cubicBezTo>
-                  <a:pt x="7455109" y="10118"/>
-                  <a:pt x="7435944" y="27109"/>
-                  <a:pt x="7217862" y="18288"/>
-                </a:cubicBezTo>
-                <a:cubicBezTo>
-                  <a:pt x="6999780" y="9467"/>
-                  <a:pt x="6680409" y="18985"/>
-                  <a:pt x="6539492" y="18288"/>
-                </a:cubicBezTo>
-                <a:cubicBezTo>
-                  <a:pt x="6398575" y="17592"/>
-                  <a:pt x="6312077" y="33018"/>
-                  <a:pt x="6186739" y="18288"/>
-                </a:cubicBezTo>
-                <a:cubicBezTo>
-                  <a:pt x="6061401" y="3558"/>
-                  <a:pt x="5947033" y="12075"/>
-                  <a:pt x="5833986" y="18288"/>
-                </a:cubicBezTo>
-                <a:cubicBezTo>
-                  <a:pt x="5720939" y="24501"/>
-                  <a:pt x="5482226" y="8586"/>
-                  <a:pt x="5155616" y="18288"/>
-                </a:cubicBezTo>
-                <a:cubicBezTo>
-                  <a:pt x="4829006" y="27991"/>
-                  <a:pt x="4841274" y="29316"/>
-                  <a:pt x="4694324" y="18288"/>
-                </a:cubicBezTo>
-                <a:cubicBezTo>
-                  <a:pt x="4547374" y="7260"/>
-                  <a:pt x="4077675" y="7013"/>
-                  <a:pt x="3907414" y="18288"/>
-                </a:cubicBezTo>
-                <a:cubicBezTo>
-                  <a:pt x="3737153" y="29564"/>
-                  <a:pt x="3538393" y="21630"/>
-                  <a:pt x="3446122" y="18288"/>
-                </a:cubicBezTo>
-                <a:cubicBezTo>
-                  <a:pt x="3353851" y="14946"/>
-                  <a:pt x="2990320" y="-8091"/>
-                  <a:pt x="2659212" y="18288"/>
-                </a:cubicBezTo>
-                <a:cubicBezTo>
-                  <a:pt x="2328104" y="44667"/>
-                  <a:pt x="2427653" y="9607"/>
-                  <a:pt x="2306460" y="18288"/>
-                </a:cubicBezTo>
-                <a:cubicBezTo>
-                  <a:pt x="2185267" y="26969"/>
-                  <a:pt x="1719763" y="3717"/>
-                  <a:pt x="1519550" y="18288"/>
-                </a:cubicBezTo>
-                <a:cubicBezTo>
-                  <a:pt x="1319337" y="32860"/>
-                  <a:pt x="1167371" y="17040"/>
-                  <a:pt x="1058258" y="18288"/>
-                </a:cubicBezTo>
-                <a:cubicBezTo>
-                  <a:pt x="949145" y="19536"/>
-                  <a:pt x="780234" y="31447"/>
-                  <a:pt x="705505" y="18288"/>
-                </a:cubicBezTo>
-                <a:cubicBezTo>
-                  <a:pt x="630776" y="5129"/>
-                  <a:pt x="215796" y="30056"/>
-                  <a:pt x="0" y="18288"/>
-                </a:cubicBezTo>
-                <a:cubicBezTo>
-                  <a:pt x="-53" y="11301"/>
-                  <a:pt x="-649" y="7756"/>
-                  <a:pt x="0" y="0"/>
-                </a:cubicBezTo>
-                <a:close/>
-              </a:path>
-            </a:pathLst>
-          </a:custGeom>
+          </a:prstGeom>
+          <a:ln w="12700">
+            <a:solidFill>
+              <a:srgbClr val="DEDEDE"/>
+            </a:solidFill>
+          </a:ln>
+          <a:effectLst>
+            <a:outerShdw blurRad="50800" dist="38100" dir="2700000" algn="tl" rotWithShape="0">
+              <a:schemeClr val="bg2">
+                <a:lumMod val="85000"/>
+                <a:alpha val="50000"/>
+              </a:schemeClr>
+            </a:outerShdw>
+          </a:effectLst>
+        </p:spPr>
+        <p:style>
+          <a:lnRef idx="2">
+            <a:schemeClr val="accent1">
+              <a:shade val="50000"/>
+            </a:schemeClr>
+          </a:lnRef>
+          <a:fillRef idx="1">
+            <a:schemeClr val="accent1"/>
+          </a:fillRef>
+          <a:effectRef idx="0">
+            <a:schemeClr val="accent1"/>
+          </a:effectRef>
+          <a:fontRef idx="minor">
+            <a:schemeClr val="lt1"/>
+          </a:fontRef>
+        </p:style>
+        <p:txBody>
+          <a:bodyPr rtlCol="0" anchor="ctr"/>
+          <a:lstStyle/>
+          <a:p>
+            <a:pPr marL="0" marR="0" lvl="0" indent="0" algn="ctr" defTabSz="914400" rtl="0" eaLnBrk="1" fontAlgn="auto" latinLnBrk="0" hangingPunct="1">
+              <a:lnSpc>
+                <a:spcPct val="100000"/>
+              </a:lnSpc>
+              <a:spcBef>
+                <a:spcPts val="0"/>
+              </a:spcBef>
+              <a:spcAft>
+                <a:spcPts val="0"/>
+              </a:spcAft>
+              <a:buClrTx/>
+              <a:buSzTx/>
+              <a:buFontTx/>
+              <a:buNone/>
+              <a:tabLst/>
+              <a:defRPr/>
+            </a:pPr>
+            <a:endParaRPr kumimoji="0" lang="en-US" sz="1800" b="0" i="0" u="none" strike="noStrike" kern="1200" cap="none" spc="0" normalizeH="0" baseline="0" noProof="0">
+              <a:ln>
+                <a:noFill/>
+              </a:ln>
+              <a:solidFill>
+                <a:prstClr val="white"/>
+              </a:solidFill>
+              <a:effectLst/>
+              <a:uLnTx/>
+              <a:uFillTx/>
+              <a:latin typeface="Calibri" panose="020F0502020204030204"/>
+              <a:ea typeface="+mn-ea"/>
+              <a:cs typeface="+mn-cs"/>
+            </a:endParaRPr>
+          </a:p>
+        </p:txBody>
+      </p:sp>
+      <p:sp>
+        <p:nvSpPr>
+          <p:cNvPr id="2" name="Title 1">
+            <a:extLst>
+              <a:ext uri="{FF2B5EF4-FFF2-40B4-BE49-F238E27FC236}">
+                <a16:creationId xmlns:a16="http://schemas.microsoft.com/office/drawing/2014/main" id="{FA6489E2-7FE1-9296-4114-3D2D3A8CBDEC}"/>
+              </a:ext>
+            </a:extLst>
+          </p:cNvPr>
+          <p:cNvSpPr>
+            <a:spLocks noGrp="1"/>
+          </p:cNvSpPr>
+          <p:nvPr>
+            <p:ph type="title"/>
+          </p:nvPr>
+        </p:nvSpPr>
+        <p:spPr>
+          <a:xfrm>
+            <a:off x="838200" y="4440602"/>
+            <a:ext cx="3093720" cy="1645920"/>
+          </a:xfrm>
+        </p:spPr>
+        <p:txBody>
+          <a:bodyPr vert="horz" lIns="91440" tIns="45720" rIns="91440" bIns="45720" rtlCol="0" anchor="ctr">
+            <a:normAutofit/>
+          </a:bodyPr>
+          <a:lstStyle/>
+          <a:p>
+            <a:r>
+              <a:rPr lang="en-US" sz="2600" kern="1200">
+                <a:solidFill>
+                  <a:schemeClr val="tx1"/>
+                </a:solidFill>
+                <a:latin typeface="+mj-lt"/>
+                <a:ea typeface="+mj-ea"/>
+                <a:cs typeface="+mj-cs"/>
+              </a:rPr>
+              <a:t>Implementation work already carried out</a:t>
+            </a:r>
+          </a:p>
+        </p:txBody>
+      </p:sp>
+      <p:pic>
+        <p:nvPicPr>
+          <p:cNvPr id="9" name="Picture 8" descr="Icon&#10;&#10;Description automatically generated">
+            <a:extLst>
+              <a:ext uri="{FF2B5EF4-FFF2-40B4-BE49-F238E27FC236}">
+                <a16:creationId xmlns:a16="http://schemas.microsoft.com/office/drawing/2014/main" id="{F44A029F-C13F-7AB0-2FAA-81CD7064D174}"/>
+              </a:ext>
+            </a:extLst>
+          </p:cNvPr>
+          <p:cNvPicPr>
+            <a:picLocks noChangeAspect="1"/>
+          </p:cNvPicPr>
+          <p:nvPr/>
+        </p:nvPicPr>
+        <p:blipFill rotWithShape="1">
+          <a:blip r:embed="rId2"/>
+          <a:srcRect t="4768" r="3" b="790"/>
+          <a:stretch/>
+        </p:blipFill>
+        <p:spPr>
+          <a:xfrm>
+            <a:off x="6170749" y="0"/>
+            <a:ext cx="2926060" cy="4005072"/>
+          </a:xfrm>
+          <a:prstGeom prst="rect">
+            <a:avLst/>
+          </a:prstGeom>
+        </p:spPr>
+      </p:pic>
+      <p:pic>
+        <p:nvPicPr>
+          <p:cNvPr id="4" name="Picture 3" descr="Graphical user interface, text&#10;&#10;Description automatically generated">
+            <a:extLst>
+              <a:ext uri="{FF2B5EF4-FFF2-40B4-BE49-F238E27FC236}">
+                <a16:creationId xmlns:a16="http://schemas.microsoft.com/office/drawing/2014/main" id="{593570C6-8FE3-C555-76B5-0A4A04C6CA49}"/>
+              </a:ext>
+            </a:extLst>
+          </p:cNvPr>
+          <p:cNvPicPr>
+            <a:picLocks noChangeAspect="1"/>
+          </p:cNvPicPr>
+          <p:nvPr/>
+        </p:nvPicPr>
+        <p:blipFill rotWithShape="1">
+          <a:blip r:embed="rId3"/>
+          <a:srcRect t="6874" r="2" b="2"/>
+          <a:stretch/>
+        </p:blipFill>
+        <p:spPr>
+          <a:xfrm>
+            <a:off x="0" y="0"/>
+            <a:ext cx="2935224" cy="4005067"/>
+          </a:xfrm>
+          <a:prstGeom prst="rect">
+            <a:avLst/>
+          </a:prstGeom>
+        </p:spPr>
+      </p:pic>
+      <p:pic>
+        <p:nvPicPr>
+          <p:cNvPr id="12" name="Picture 11" descr="Graphical user interface, text&#10;&#10;Description automatically generated">
+            <a:extLst>
+              <a:ext uri="{FF2B5EF4-FFF2-40B4-BE49-F238E27FC236}">
+                <a16:creationId xmlns:a16="http://schemas.microsoft.com/office/drawing/2014/main" id="{25BC8513-3C17-F6F9-29DB-30765CB60658}"/>
+              </a:ext>
+            </a:extLst>
+          </p:cNvPr>
+          <p:cNvPicPr>
+            <a:picLocks noChangeAspect="1"/>
+          </p:cNvPicPr>
+          <p:nvPr/>
+        </p:nvPicPr>
+        <p:blipFill rotWithShape="1">
+          <a:blip r:embed="rId4"/>
+          <a:srcRect r="-4" b="5505"/>
+          <a:stretch/>
+        </p:blipFill>
+        <p:spPr>
+          <a:xfrm>
+            <a:off x="9256776" y="0"/>
+            <a:ext cx="2935224" cy="4005071"/>
+          </a:xfrm>
+          <a:prstGeom prst="rect">
+            <a:avLst/>
+          </a:prstGeom>
+        </p:spPr>
+      </p:pic>
+      <p:pic>
+        <p:nvPicPr>
+          <p:cNvPr id="6" name="Picture 5" descr="Graphical user interface&#10;&#10;Description automatically generated">
+            <a:extLst>
+              <a:ext uri="{FF2B5EF4-FFF2-40B4-BE49-F238E27FC236}">
+                <a16:creationId xmlns:a16="http://schemas.microsoft.com/office/drawing/2014/main" id="{F922CF62-24F8-08D5-F1B1-DE4994EF11F5}"/>
+              </a:ext>
+            </a:extLst>
+          </p:cNvPr>
+          <p:cNvPicPr>
+            <a:picLocks noChangeAspect="1"/>
+          </p:cNvPicPr>
+          <p:nvPr/>
+        </p:nvPicPr>
+        <p:blipFill rotWithShape="1">
+          <a:blip r:embed="rId5"/>
+          <a:srcRect r="4" b="6196"/>
+          <a:stretch/>
+        </p:blipFill>
+        <p:spPr>
+          <a:xfrm>
+            <a:off x="3085374" y="-7867"/>
+            <a:ext cx="2935224" cy="4005072"/>
+          </a:xfrm>
+          <a:prstGeom prst="rect">
+            <a:avLst/>
+          </a:prstGeom>
+        </p:spPr>
+      </p:pic>
+      <p:sp>
+        <p:nvSpPr>
+          <p:cNvPr id="22" name="Rectangle 21">
+            <a:extLst>
+              <a:ext uri="{FF2B5EF4-FFF2-40B4-BE49-F238E27FC236}">
+                <a16:creationId xmlns:a16="http://schemas.microsoft.com/office/drawing/2014/main" id="{6283FBD2-A663-469F-855C-06D86E3C1161}"/>
+              </a:ext>
+              <a:ext uri="{C183D7F6-B498-43B3-948B-1728B52AA6E4}">
+                <adec:decorative xmlns:adec="http://schemas.microsoft.com/office/drawing/2017/decorative" val="1"/>
+              </a:ext>
+            </a:extLst>
+          </p:cNvPr>
+          <p:cNvSpPr>
+            <a:spLocks noGrp="1" noRot="1" noChangeAspect="1" noMove="1" noResize="1" noEditPoints="1" noAdjustHandles="1" noChangeArrowheads="1" noChangeShapeType="1" noTextEdit="1"/>
+          </p:cNvSpPr>
+          <p:nvPr>
+            <p:extLst>
+              <p:ext uri="{386F3935-93C4-4BCD-93E2-E3B085C9AB24}">
+                <p16:designElem xmlns:p16="http://schemas.microsoft.com/office/powerpoint/2015/main" val="1"/>
+              </p:ext>
+            </p:extLst>
+          </p:nvPr>
+        </p:nvSpPr>
+        <p:spPr>
+          <a:xfrm>
+            <a:off x="490408" y="4911519"/>
+            <a:ext cx="128016" cy="704088"/>
+          </a:xfrm>
+          <a:prstGeom prst="rect">
+            <a:avLst/>
+          </a:prstGeom>
           <a:solidFill>
             <a:schemeClr val="accent2"/>
           </a:solidFill>
-          <a:ln w="41275" cap="rnd">
-            <a:solidFill>
-              <a:schemeClr val="accent2"/>
-            </a:solidFill>
-            <a:round/>
-            <a:extLst>
-              <a:ext uri="{C807C97D-BFC1-408E-A445-0C87EB9F89A2}">
-                <ask:lineSketchStyleProps xmlns:ask="http://schemas.microsoft.com/office/drawing/2018/sketchyshapes" sd="1219033472">
-                  <a:prstGeom prst="rect">
-                    <a:avLst/>
-                  </a:prstGeom>
-                  <ask:type>
-                    <ask:lineSketchFreehand/>
-                  </ask:type>
-                </ask:lineSketchStyleProps>
-              </a:ext>
-            </a:extLst>
+          <a:ln>
+            <a:noFill/>
           </a:ln>
         </p:spPr>
         <p:style>
@@ -6655,8 +6299,130 @@
           <a:bodyPr rtlCol="0" anchor="ctr"/>
           <a:lstStyle/>
           <a:p>
-            <a:pPr algn="ctr"/>
-            <a:endParaRPr lang="en-US"/>
+            <a:pPr marL="0" marR="0" lvl="0" indent="0" algn="ctr" defTabSz="914400" rtl="0" eaLnBrk="1" fontAlgn="auto" latinLnBrk="0" hangingPunct="1">
+              <a:lnSpc>
+                <a:spcPct val="100000"/>
+              </a:lnSpc>
+              <a:spcBef>
+                <a:spcPts val="0"/>
+              </a:spcBef>
+              <a:spcAft>
+                <a:spcPts val="0"/>
+              </a:spcAft>
+              <a:buClrTx/>
+              <a:buSzTx/>
+              <a:buFontTx/>
+              <a:buNone/>
+              <a:tabLst/>
+              <a:defRPr/>
+            </a:pPr>
+            <a:endParaRPr kumimoji="0" lang="en-US" sz="1800" b="0" i="0" u="none" strike="noStrike" kern="1200" cap="none" spc="0" normalizeH="0" baseline="0" noProof="0" dirty="0">
+              <a:ln>
+                <a:noFill/>
+              </a:ln>
+              <a:solidFill>
+                <a:prstClr val="white"/>
+              </a:solidFill>
+              <a:effectLst/>
+              <a:uLnTx/>
+              <a:uFillTx/>
+              <a:latin typeface="Calibri" panose="020F0502020204030204"/>
+              <a:ea typeface="+mn-ea"/>
+              <a:cs typeface="+mn-cs"/>
+            </a:endParaRPr>
+          </a:p>
+        </p:txBody>
+      </p:sp>
+      <p:sp>
+        <p:nvSpPr>
+          <p:cNvPr id="24" name="Rectangle 23">
+            <a:extLst>
+              <a:ext uri="{FF2B5EF4-FFF2-40B4-BE49-F238E27FC236}">
+                <a16:creationId xmlns:a16="http://schemas.microsoft.com/office/drawing/2014/main" id="{8A1279FC-7441-4E55-B082-2774E6316482}"/>
+              </a:ext>
+              <a:ext uri="{C183D7F6-B498-43B3-948B-1728B52AA6E4}">
+                <adec:decorative xmlns:adec="http://schemas.microsoft.com/office/drawing/2017/decorative" val="1"/>
+              </a:ext>
+            </a:extLst>
+          </p:cNvPr>
+          <p:cNvSpPr>
+            <a:spLocks noGrp="1" noRot="1" noChangeAspect="1" noMove="1" noResize="1" noEditPoints="1" noAdjustHandles="1" noChangeArrowheads="1" noChangeShapeType="1" noTextEdit="1"/>
+          </p:cNvSpPr>
+          <p:nvPr>
+            <p:extLst>
+              <p:ext uri="{386F3935-93C4-4BCD-93E2-E3B085C9AB24}">
+                <p16:designElem xmlns:p16="http://schemas.microsoft.com/office/powerpoint/2015/main" val="1"/>
+              </p:ext>
+            </p:extLst>
+          </p:nvPr>
+        </p:nvSpPr>
+        <p:spPr>
+          <a:xfrm rot="5400000">
+            <a:off x="3411220" y="5254418"/>
+            <a:ext cx="1463040" cy="18288"/>
+          </a:xfrm>
+          <a:prstGeom prst="rect">
+            <a:avLst/>
+          </a:prstGeom>
+          <a:solidFill>
+            <a:srgbClr val="D5D5D5"/>
+          </a:solidFill>
+          <a:ln w="3175">
+            <a:noFill/>
+          </a:ln>
+          <a:effectLst/>
+        </p:spPr>
+        <p:style>
+          <a:lnRef idx="2">
+            <a:schemeClr val="accent1">
+              <a:shade val="50000"/>
+            </a:schemeClr>
+          </a:lnRef>
+          <a:fillRef idx="1">
+            <a:schemeClr val="accent1"/>
+          </a:fillRef>
+          <a:effectRef idx="0">
+            <a:schemeClr val="accent1"/>
+          </a:effectRef>
+          <a:fontRef idx="minor">
+            <a:schemeClr val="lt1"/>
+          </a:fontRef>
+        </p:style>
+        <p:txBody>
+          <a:bodyPr rtlCol="0" anchor="ctr"/>
+          <a:lstStyle/>
+          <a:p>
+            <a:pPr marL="0" marR="0" lvl="0" indent="0" algn="ctr" defTabSz="914400" rtl="0" eaLnBrk="1" fontAlgn="auto" latinLnBrk="0" hangingPunct="1">
+              <a:lnSpc>
+                <a:spcPct val="100000"/>
+              </a:lnSpc>
+              <a:spcBef>
+                <a:spcPts val="0"/>
+              </a:spcBef>
+              <a:spcAft>
+                <a:spcPts val="0"/>
+              </a:spcAft>
+              <a:buClrTx/>
+              <a:buSzTx/>
+              <a:buFontTx/>
+              <a:buNone/>
+              <a:tabLst/>
+              <a:defRPr/>
+            </a:pPr>
+            <a:endParaRPr kumimoji="0" lang="en-US" sz="1800" b="0" i="0" u="none" strike="noStrike" kern="1200" cap="none" spc="0" normalizeH="0" baseline="0" noProof="0">
+              <a:ln>
+                <a:noFill/>
+              </a:ln>
+              <a:solidFill>
+                <a:prstClr val="white"/>
+              </a:solidFill>
+              <a:effectLst/>
+              <a:uLnTx/>
+              <a:uFillTx/>
+              <a:latin typeface="Calibri" panose="020F0502020204030204"/>
+              <a:ea typeface="+mn-ea"/>
+              <a:cs typeface="+mn-cs"/>
+            </a:endParaRPr>
           </a:p>
         </p:txBody>
       </p:sp>
@@ -6674,15 +6440,15 @@
         </p:nvSpPr>
         <p:spPr>
           <a:xfrm>
-            <a:off x="836676" y="3054647"/>
-            <a:ext cx="10515600" cy="4251960"/>
+            <a:off x="4380266" y="4440602"/>
+            <a:ext cx="7104188" cy="1645920"/>
           </a:xfrm>
           <a:prstGeom prst="rect">
             <a:avLst/>
           </a:prstGeom>
         </p:spPr>
         <p:txBody>
-          <a:bodyPr vert="horz" lIns="91440" tIns="45720" rIns="91440" bIns="45720" rtlCol="0">
+          <a:bodyPr vert="horz" lIns="91440" tIns="45720" rIns="91440" bIns="45720" rtlCol="0" anchor="ctr">
             <a:normAutofit/>
           </a:bodyPr>
           <a:lstStyle/>
@@ -6698,10 +6464,8 @@
               <a:buChar char="•"/>
             </a:pPr>
             <a:r>
-              <a:rPr lang="en-US" sz="2200" dirty="0">
-                <a:latin typeface="Lexend"/>
-              </a:rPr>
-              <a:t>Graphical User Interface (GUI) for piece movements</a:t>
+              <a:rPr lang="en-US" dirty="0"/>
+              <a:t>Menu that allows users to start or quit the game</a:t>
             </a:r>
           </a:p>
           <a:p>
@@ -6716,10 +6480,8 @@
               <a:buChar char="•"/>
             </a:pPr>
             <a:r>
-              <a:rPr lang="en-US" sz="2200" dirty="0">
-                <a:latin typeface="Lexend"/>
-              </a:rPr>
-              <a:t>Game over detection to determine when the game ends</a:t>
+              <a:rPr lang="en-US" dirty="0"/>
+              <a:t>Difficulty level selection after starting the game</a:t>
             </a:r>
           </a:p>
           <a:p>
@@ -6734,10 +6496,8 @@
               <a:buChar char="•"/>
             </a:pPr>
             <a:r>
-              <a:rPr lang="en-US" sz="2200" dirty="0">
-                <a:latin typeface="Lexend"/>
-              </a:rPr>
-              <a:t>Total moves counter to keep track of the number of moves made</a:t>
+              <a:rPr lang="en-US" dirty="0"/>
+              <a:t>Graphical User Interface (GUI) for piece movements</a:t>
             </a:r>
           </a:p>
           <a:p>
@@ -6752,10 +6512,8 @@
               <a:buChar char="•"/>
             </a:pPr>
             <a:r>
-              <a:rPr lang="en-US" sz="2200" dirty="0">
-                <a:latin typeface="Lexend"/>
-              </a:rPr>
-              <a:t>Menu that allows users to start or quit the game</a:t>
+              <a:rPr lang="en-US" dirty="0"/>
+              <a:t>Game over detection to determine when the game ends</a:t>
             </a:r>
           </a:p>
           <a:p>
@@ -6770,10 +6528,8 @@
               <a:buChar char="•"/>
             </a:pPr>
             <a:r>
-              <a:rPr lang="en-US" sz="2200" dirty="0">
-                <a:latin typeface="Lexend"/>
-              </a:rPr>
-              <a:t>Difficulty level selection after starting the game</a:t>
+              <a:rPr lang="en-US" dirty="0"/>
+              <a:t>Total moves counter to keep track of the number of moves made</a:t>
             </a:r>
           </a:p>
         </p:txBody>

</xml_diff>

<commit_message>
Changed hard level and updated slides
</commit_message>
<xml_diff>
--- a/Block Escape.pptx
+++ b/Block Escape.pptx
@@ -5,7 +5,7 @@
     <p:sldMasterId id="2147483648" r:id="rId1"/>
   </p:sldMasterIdLst>
   <p:notesMasterIdLst>
-    <p:notesMasterId r:id="rId7"/>
+    <p:notesMasterId r:id="rId11"/>
   </p:notesMasterIdLst>
   <p:sldIdLst>
     <p:sldId id="260" r:id="rId2"/>
@@ -13,6 +13,10 @@
     <p:sldId id="258" r:id="rId4"/>
     <p:sldId id="259" r:id="rId5"/>
     <p:sldId id="261" r:id="rId6"/>
+    <p:sldId id="263" r:id="rId7"/>
+    <p:sldId id="264" r:id="rId8"/>
+    <p:sldId id="266" r:id="rId9"/>
+    <p:sldId id="265" r:id="rId10"/>
   </p:sldIdLst>
   <p:sldSz cx="12192000" cy="6858000"/>
   <p:notesSz cx="6858000" cy="9144000"/>
@@ -201,7 +205,7 @@
           <a:p>
             <a:fld id="{93E535DD-106C-4541-B5AF-9672E5885387}" type="datetimeFigureOut">
               <a:rPr lang="en-US" smtClean="0"/>
-              <a:t>3/12/2023</a:t>
+              <a:t>3/27/2023</a:t>
             </a:fld>
             <a:endParaRPr lang="en-US"/>
           </a:p>
@@ -701,7 +705,7 @@
           <a:p>
             <a:fld id="{1C56E1C8-51FB-41FF-A952-5015197EF72E}" type="datetimeFigureOut">
               <a:rPr lang="en-GB" smtClean="0"/>
-              <a:t>12/03/2023</a:t>
+              <a:t>27/03/2023</a:t>
             </a:fld>
             <a:endParaRPr lang="en-GB"/>
           </a:p>
@@ -901,7 +905,7 @@
           <a:p>
             <a:fld id="{1C56E1C8-51FB-41FF-A952-5015197EF72E}" type="datetimeFigureOut">
               <a:rPr lang="en-GB" smtClean="0"/>
-              <a:t>12/03/2023</a:t>
+              <a:t>27/03/2023</a:t>
             </a:fld>
             <a:endParaRPr lang="en-GB"/>
           </a:p>
@@ -1111,7 +1115,7 @@
           <a:p>
             <a:fld id="{1C56E1C8-51FB-41FF-A952-5015197EF72E}" type="datetimeFigureOut">
               <a:rPr lang="en-GB" smtClean="0"/>
-              <a:t>12/03/2023</a:t>
+              <a:t>27/03/2023</a:t>
             </a:fld>
             <a:endParaRPr lang="en-GB"/>
           </a:p>
@@ -1311,7 +1315,7 @@
           <a:p>
             <a:fld id="{1C56E1C8-51FB-41FF-A952-5015197EF72E}" type="datetimeFigureOut">
               <a:rPr lang="en-GB" smtClean="0"/>
-              <a:t>12/03/2023</a:t>
+              <a:t>27/03/2023</a:t>
             </a:fld>
             <a:endParaRPr lang="en-GB"/>
           </a:p>
@@ -1587,7 +1591,7 @@
           <a:p>
             <a:fld id="{1C56E1C8-51FB-41FF-A952-5015197EF72E}" type="datetimeFigureOut">
               <a:rPr lang="en-GB" smtClean="0"/>
-              <a:t>12/03/2023</a:t>
+              <a:t>27/03/2023</a:t>
             </a:fld>
             <a:endParaRPr lang="en-GB"/>
           </a:p>
@@ -1855,7 +1859,7 @@
           <a:p>
             <a:fld id="{1C56E1C8-51FB-41FF-A952-5015197EF72E}" type="datetimeFigureOut">
               <a:rPr lang="en-GB" smtClean="0"/>
-              <a:t>12/03/2023</a:t>
+              <a:t>27/03/2023</a:t>
             </a:fld>
             <a:endParaRPr lang="en-GB"/>
           </a:p>
@@ -2270,7 +2274,7 @@
           <a:p>
             <a:fld id="{1C56E1C8-51FB-41FF-A952-5015197EF72E}" type="datetimeFigureOut">
               <a:rPr lang="en-GB" smtClean="0"/>
-              <a:t>12/03/2023</a:t>
+              <a:t>27/03/2023</a:t>
             </a:fld>
             <a:endParaRPr lang="en-GB"/>
           </a:p>
@@ -2412,7 +2416,7 @@
           <a:p>
             <a:fld id="{1C56E1C8-51FB-41FF-A952-5015197EF72E}" type="datetimeFigureOut">
               <a:rPr lang="en-GB" smtClean="0"/>
-              <a:t>12/03/2023</a:t>
+              <a:t>27/03/2023</a:t>
             </a:fld>
             <a:endParaRPr lang="en-GB"/>
           </a:p>
@@ -2525,7 +2529,7 @@
           <a:p>
             <a:fld id="{1C56E1C8-51FB-41FF-A952-5015197EF72E}" type="datetimeFigureOut">
               <a:rPr lang="en-GB" smtClean="0"/>
-              <a:t>12/03/2023</a:t>
+              <a:t>27/03/2023</a:t>
             </a:fld>
             <a:endParaRPr lang="en-GB"/>
           </a:p>
@@ -2838,7 +2842,7 @@
           <a:p>
             <a:fld id="{1C56E1C8-51FB-41FF-A952-5015197EF72E}" type="datetimeFigureOut">
               <a:rPr lang="en-GB" smtClean="0"/>
-              <a:t>12/03/2023</a:t>
+              <a:t>27/03/2023</a:t>
             </a:fld>
             <a:endParaRPr lang="en-GB"/>
           </a:p>
@@ -3127,7 +3131,7 @@
           <a:p>
             <a:fld id="{1C56E1C8-51FB-41FF-A952-5015197EF72E}" type="datetimeFigureOut">
               <a:rPr lang="en-GB" smtClean="0"/>
-              <a:t>12/03/2023</a:t>
+              <a:t>27/03/2023</a:t>
             </a:fld>
             <a:endParaRPr lang="en-GB"/>
           </a:p>
@@ -3370,7 +3374,7 @@
           <a:p>
             <a:fld id="{1C56E1C8-51FB-41FF-A952-5015197EF72E}" type="datetimeFigureOut">
               <a:rPr lang="en-GB" smtClean="0"/>
-              <a:t>12/03/2023</a:t>
+              <a:t>27/03/2023</a:t>
             </a:fld>
             <a:endParaRPr lang="en-GB"/>
           </a:p>
@@ -4549,7 +4553,7 @@
               <a:rPr lang="en-GB" sz="5400" dirty="0">
                 <a:latin typeface="Lexend"/>
               </a:rPr>
-              <a:t>Related work</a:t>
+              <a:t>Software used and related work</a:t>
             </a:r>
           </a:p>
         </p:txBody>
@@ -5263,6 +5267,30 @@
             </a:endParaRPr>
           </a:p>
           <a:p>
+            <a:r>
+              <a:rPr lang="en-GB" sz="2200" dirty="0">
+                <a:latin typeface="Lexend"/>
+              </a:rPr>
+              <a:t>PyCharm Professional</a:t>
+            </a:r>
+          </a:p>
+          <a:p>
+            <a:r>
+              <a:rPr lang="en-GB" sz="2200" dirty="0">
+                <a:latin typeface="Lexend"/>
+              </a:rPr>
+              <a:t>Python 3.9</a:t>
+            </a:r>
+          </a:p>
+          <a:p>
+            <a:r>
+              <a:rPr lang="en-GB" sz="2200" dirty="0">
+                <a:latin typeface="Lexend"/>
+              </a:rPr>
+              <a:t>Git</a:t>
+            </a:r>
+          </a:p>
+          <a:p>
             <a:endParaRPr lang="en-GB" sz="2200" dirty="0">
               <a:latin typeface="Lexend"/>
             </a:endParaRPr>
@@ -6925,6 +6953,1488 @@
     <p:extLst>
       <p:ext uri="{BB962C8B-B14F-4D97-AF65-F5344CB8AC3E}">
         <p14:creationId xmlns:p14="http://schemas.microsoft.com/office/powerpoint/2010/main" val="2421214975"/>
+      </p:ext>
+    </p:extLst>
+  </p:cSld>
+  <p:clrMapOvr>
+    <a:masterClrMapping/>
+  </p:clrMapOvr>
+</p:sld>
+</file>
+
+<file path=ppt/slides/slide6.xml><?xml version="1.0" encoding="utf-8"?>
+<p:sld xmlns:a="http://schemas.openxmlformats.org/drawingml/2006/main" xmlns:r="http://schemas.openxmlformats.org/officeDocument/2006/relationships" xmlns:p="http://schemas.openxmlformats.org/presentationml/2006/main">
+  <p:cSld>
+    <p:bg>
+      <p:bgPr>
+        <a:solidFill>
+          <a:schemeClr val="bg1"/>
+        </a:solidFill>
+        <a:effectLst/>
+      </p:bgPr>
+    </p:bg>
+    <p:spTree>
+      <p:nvGrpSpPr>
+        <p:cNvPr id="1" name=""/>
+        <p:cNvGrpSpPr/>
+        <p:nvPr/>
+      </p:nvGrpSpPr>
+      <p:grpSpPr>
+        <a:xfrm>
+          <a:off x="0" y="0"/>
+          <a:ext cx="0" cy="0"/>
+          <a:chOff x="0" y="0"/>
+          <a:chExt cx="0" cy="0"/>
+        </a:xfrm>
+      </p:grpSpPr>
+      <p:sp useBgFill="1">
+        <p:nvSpPr>
+          <p:cNvPr id="8" name="Rectangle 7">
+            <a:extLst>
+              <a:ext uri="{FF2B5EF4-FFF2-40B4-BE49-F238E27FC236}">
+                <a16:creationId xmlns:a16="http://schemas.microsoft.com/office/drawing/2014/main" id="{907EF6B7-1338-4443-8C46-6A318D952DFD}"/>
+              </a:ext>
+              <a:ext uri="{C183D7F6-B498-43B3-948B-1728B52AA6E4}">
+                <adec:decorative xmlns:adec="http://schemas.microsoft.com/office/drawing/2017/decorative" val="1"/>
+              </a:ext>
+            </a:extLst>
+          </p:cNvPr>
+          <p:cNvSpPr>
+            <a:spLocks noGrp="1" noRot="1" noChangeAspect="1" noMove="1" noResize="1" noEditPoints="1" noAdjustHandles="1" noChangeArrowheads="1" noChangeShapeType="1" noTextEdit="1"/>
+          </p:cNvSpPr>
+          <p:nvPr>
+            <p:extLst>
+              <p:ext uri="{386F3935-93C4-4BCD-93E2-E3B085C9AB24}">
+                <p16:designElem xmlns:p16="http://schemas.microsoft.com/office/powerpoint/2015/main" val="1"/>
+              </p:ext>
+            </p:extLst>
+          </p:nvPr>
+        </p:nvSpPr>
+        <p:spPr>
+          <a:xfrm>
+            <a:off x="3048" y="0"/>
+            <a:ext cx="12188952" cy="6858000"/>
+          </a:xfrm>
+          <a:prstGeom prst="rect">
+            <a:avLst/>
+          </a:prstGeom>
+          <a:ln>
+            <a:noFill/>
+          </a:ln>
+        </p:spPr>
+        <p:style>
+          <a:lnRef idx="2">
+            <a:schemeClr val="accent1">
+              <a:shade val="50000"/>
+            </a:schemeClr>
+          </a:lnRef>
+          <a:fillRef idx="1">
+            <a:schemeClr val="accent1"/>
+          </a:fillRef>
+          <a:effectRef idx="0">
+            <a:schemeClr val="accent1"/>
+          </a:effectRef>
+          <a:fontRef idx="minor">
+            <a:schemeClr val="lt1"/>
+          </a:fontRef>
+        </p:style>
+        <p:txBody>
+          <a:bodyPr rtlCol="0" anchor="ctr"/>
+          <a:lstStyle/>
+          <a:p>
+            <a:pPr algn="ctr"/>
+            <a:endParaRPr lang="en-US"/>
+          </a:p>
+        </p:txBody>
+      </p:sp>
+      <p:sp>
+        <p:nvSpPr>
+          <p:cNvPr id="10" name="Freeform: Shape 9">
+            <a:extLst>
+              <a:ext uri="{FF2B5EF4-FFF2-40B4-BE49-F238E27FC236}">
+                <a16:creationId xmlns:a16="http://schemas.microsoft.com/office/drawing/2014/main" id="{DAAE4CDD-124C-4DCF-9584-B6033B545DD5}"/>
+              </a:ext>
+              <a:ext uri="{C183D7F6-B498-43B3-948B-1728B52AA6E4}">
+                <adec:decorative xmlns:adec="http://schemas.microsoft.com/office/drawing/2017/decorative" val="1"/>
+              </a:ext>
+            </a:extLst>
+          </p:cNvPr>
+          <p:cNvSpPr>
+            <a:spLocks noGrp="1" noRot="1" noChangeAspect="1" noMove="1" noResize="1" noEditPoints="1" noAdjustHandles="1" noChangeArrowheads="1" noChangeShapeType="1" noTextEdit="1"/>
+          </p:cNvSpPr>
+          <p:nvPr>
+            <p:extLst>
+              <p:ext uri="{386F3935-93C4-4BCD-93E2-E3B085C9AB24}">
+                <p16:designElem xmlns:p16="http://schemas.microsoft.com/office/powerpoint/2015/main" val="1"/>
+              </p:ext>
+            </p:extLst>
+          </p:nvPr>
+        </p:nvSpPr>
+        <p:spPr>
+          <a:xfrm>
+            <a:off x="1" y="0"/>
+            <a:ext cx="4167271" cy="6858000"/>
+          </a:xfrm>
+          <a:custGeom>
+            <a:avLst/>
+            <a:gdLst>
+              <a:gd name="connsiteX0" fmla="*/ 0 w 4167271"/>
+              <a:gd name="connsiteY0" fmla="*/ 0 h 6858000"/>
+              <a:gd name="connsiteX1" fmla="*/ 2259550 w 4167271"/>
+              <a:gd name="connsiteY1" fmla="*/ 0 h 6858000"/>
+              <a:gd name="connsiteX2" fmla="*/ 2387803 w 4167271"/>
+              <a:gd name="connsiteY2" fmla="*/ 82222 h 6858000"/>
+              <a:gd name="connsiteX3" fmla="*/ 4167271 w 4167271"/>
+              <a:gd name="connsiteY3" fmla="*/ 3429000 h 6858000"/>
+              <a:gd name="connsiteX4" fmla="*/ 2387803 w 4167271"/>
+              <a:gd name="connsiteY4" fmla="*/ 6775779 h 6858000"/>
+              <a:gd name="connsiteX5" fmla="*/ 2259550 w 4167271"/>
+              <a:gd name="connsiteY5" fmla="*/ 6858000 h 6858000"/>
+              <a:gd name="connsiteX6" fmla="*/ 0 w 4167271"/>
+              <a:gd name="connsiteY6" fmla="*/ 6858000 h 6858000"/>
+            </a:gdLst>
+            <a:ahLst/>
+            <a:cxnLst>
+              <a:cxn ang="0">
+                <a:pos x="connsiteX0" y="connsiteY0"/>
+              </a:cxn>
+              <a:cxn ang="0">
+                <a:pos x="connsiteX1" y="connsiteY1"/>
+              </a:cxn>
+              <a:cxn ang="0">
+                <a:pos x="connsiteX2" y="connsiteY2"/>
+              </a:cxn>
+              <a:cxn ang="0">
+                <a:pos x="connsiteX3" y="connsiteY3"/>
+              </a:cxn>
+              <a:cxn ang="0">
+                <a:pos x="connsiteX4" y="connsiteY4"/>
+              </a:cxn>
+              <a:cxn ang="0">
+                <a:pos x="connsiteX5" y="connsiteY5"/>
+              </a:cxn>
+              <a:cxn ang="0">
+                <a:pos x="connsiteX6" y="connsiteY6"/>
+              </a:cxn>
+            </a:cxnLst>
+            <a:rect l="l" t="t" r="r" b="b"/>
+            <a:pathLst>
+              <a:path w="4167271" h="6858000">
+                <a:moveTo>
+                  <a:pt x="0" y="0"/>
+                </a:moveTo>
+                <a:lnTo>
+                  <a:pt x="2259550" y="0"/>
+                </a:lnTo>
+                <a:lnTo>
+                  <a:pt x="2387803" y="82222"/>
+                </a:lnTo>
+                <a:cubicBezTo>
+                  <a:pt x="3461407" y="807534"/>
+                  <a:pt x="4167271" y="2035835"/>
+                  <a:pt x="4167271" y="3429000"/>
+                </a:cubicBezTo>
+                <a:cubicBezTo>
+                  <a:pt x="4167271" y="4822165"/>
+                  <a:pt x="3461407" y="6050467"/>
+                  <a:pt x="2387803" y="6775779"/>
+                </a:cubicBezTo>
+                <a:lnTo>
+                  <a:pt x="2259550" y="6858000"/>
+                </a:lnTo>
+                <a:lnTo>
+                  <a:pt x="0" y="6858000"/>
+                </a:lnTo>
+                <a:close/>
+              </a:path>
+            </a:pathLst>
+          </a:custGeom>
+          <a:solidFill>
+            <a:schemeClr val="accent2"/>
+          </a:solidFill>
+          <a:ln>
+            <a:noFill/>
+          </a:ln>
+        </p:spPr>
+        <p:style>
+          <a:lnRef idx="2">
+            <a:schemeClr val="accent1">
+              <a:shade val="50000"/>
+            </a:schemeClr>
+          </a:lnRef>
+          <a:fillRef idx="1">
+            <a:schemeClr val="accent1"/>
+          </a:fillRef>
+          <a:effectRef idx="0">
+            <a:schemeClr val="accent1"/>
+          </a:effectRef>
+          <a:fontRef idx="minor">
+            <a:schemeClr val="lt1"/>
+          </a:fontRef>
+        </p:style>
+        <p:txBody>
+          <a:bodyPr rtlCol="0" anchor="ctr"/>
+          <a:lstStyle/>
+          <a:p>
+            <a:pPr algn="ctr"/>
+            <a:endParaRPr lang="en-US"/>
+          </a:p>
+        </p:txBody>
+      </p:sp>
+      <p:sp>
+        <p:nvSpPr>
+          <p:cNvPr id="2" name="Title 1">
+            <a:extLst>
+              <a:ext uri="{FF2B5EF4-FFF2-40B4-BE49-F238E27FC236}">
+                <a16:creationId xmlns:a16="http://schemas.microsoft.com/office/drawing/2014/main" id="{EDD9DF23-6234-B66E-6BF1-6050239F82D0}"/>
+              </a:ext>
+            </a:extLst>
+          </p:cNvPr>
+          <p:cNvSpPr>
+            <a:spLocks noGrp="1"/>
+          </p:cNvSpPr>
+          <p:nvPr>
+            <p:ph type="title"/>
+          </p:nvPr>
+        </p:nvSpPr>
+        <p:spPr>
+          <a:xfrm>
+            <a:off x="686834" y="1153572"/>
+            <a:ext cx="3200400" cy="4461163"/>
+          </a:xfrm>
+        </p:spPr>
+        <p:txBody>
+          <a:bodyPr vert="horz" lIns="91440" tIns="45720" rIns="91440" bIns="45720" rtlCol="0" anchor="ctr">
+            <a:normAutofit/>
+          </a:bodyPr>
+          <a:lstStyle/>
+          <a:p>
+            <a:r>
+              <a:rPr lang="en-US" kern="1200">
+                <a:solidFill>
+                  <a:srgbClr val="FFFFFF"/>
+                </a:solidFill>
+                <a:latin typeface="+mj-lt"/>
+                <a:ea typeface="+mj-ea"/>
+                <a:cs typeface="+mj-cs"/>
+              </a:rPr>
+              <a:t>Heuristics and operators</a:t>
+            </a:r>
+          </a:p>
+        </p:txBody>
+      </p:sp>
+      <p:sp>
+        <p:nvSpPr>
+          <p:cNvPr id="12" name="Arc 11">
+            <a:extLst>
+              <a:ext uri="{FF2B5EF4-FFF2-40B4-BE49-F238E27FC236}">
+                <a16:creationId xmlns:a16="http://schemas.microsoft.com/office/drawing/2014/main" id="{081E4A58-353D-44AE-B2FC-2A74E2E400F7}"/>
+              </a:ext>
+              <a:ext uri="{C183D7F6-B498-43B3-948B-1728B52AA6E4}">
+                <adec:decorative xmlns:adec="http://schemas.microsoft.com/office/drawing/2017/decorative" val="1"/>
+              </a:ext>
+            </a:extLst>
+          </p:cNvPr>
+          <p:cNvSpPr>
+            <a:spLocks noGrp="1" noRot="1" noChangeAspect="1" noMove="1" noResize="1" noEditPoints="1" noAdjustHandles="1" noChangeArrowheads="1" noChangeShapeType="1" noTextEdit="1"/>
+          </p:cNvSpPr>
+          <p:nvPr>
+            <p:extLst>
+              <p:ext uri="{386F3935-93C4-4BCD-93E2-E3B085C9AB24}">
+                <p16:designElem xmlns:p16="http://schemas.microsoft.com/office/powerpoint/2015/main" val="1"/>
+              </p:ext>
+            </p:extLst>
+          </p:nvPr>
+        </p:nvSpPr>
+        <p:spPr>
+          <a:xfrm flipV="1">
+            <a:off x="7550402" y="2455479"/>
+            <a:ext cx="4083433" cy="4083433"/>
+          </a:xfrm>
+          <a:prstGeom prst="arc">
+            <a:avLst/>
+          </a:prstGeom>
+          <a:ln w="127000" cap="rnd">
+            <a:solidFill>
+              <a:schemeClr val="accent4"/>
+            </a:solidFill>
+            <a:prstDash val="dash"/>
+          </a:ln>
+        </p:spPr>
+        <p:style>
+          <a:lnRef idx="1">
+            <a:schemeClr val="accent1"/>
+          </a:lnRef>
+          <a:fillRef idx="0">
+            <a:schemeClr val="accent1"/>
+          </a:fillRef>
+          <a:effectRef idx="0">
+            <a:schemeClr val="accent1"/>
+          </a:effectRef>
+          <a:fontRef idx="minor">
+            <a:schemeClr val="tx1"/>
+          </a:fontRef>
+        </p:style>
+        <p:txBody>
+          <a:bodyPr rtlCol="0" anchor="ctr"/>
+          <a:lstStyle/>
+          <a:p>
+            <a:pPr algn="ctr"/>
+            <a:endParaRPr lang="en-US" dirty="0"/>
+          </a:p>
+        </p:txBody>
+      </p:sp>
+      <p:sp>
+        <p:nvSpPr>
+          <p:cNvPr id="3" name="TextBox 2">
+            <a:extLst>
+              <a:ext uri="{FF2B5EF4-FFF2-40B4-BE49-F238E27FC236}">
+                <a16:creationId xmlns:a16="http://schemas.microsoft.com/office/drawing/2014/main" id="{A1969BF5-4664-EF14-E742-CD60A0050F18}"/>
+              </a:ext>
+            </a:extLst>
+          </p:cNvPr>
+          <p:cNvSpPr txBox="1"/>
+          <p:nvPr/>
+        </p:nvSpPr>
+        <p:spPr>
+          <a:xfrm>
+            <a:off x="4447308" y="591344"/>
+            <a:ext cx="7186527" cy="5947568"/>
+          </a:xfrm>
+          <a:prstGeom prst="rect">
+            <a:avLst/>
+          </a:prstGeom>
+        </p:spPr>
+        <p:txBody>
+          <a:bodyPr vert="horz" lIns="91440" tIns="45720" rIns="91440" bIns="45720" rtlCol="0" anchor="ctr">
+            <a:normAutofit/>
+          </a:bodyPr>
+          <a:lstStyle/>
+          <a:p>
+            <a:pPr indent="-228600">
+              <a:lnSpc>
+                <a:spcPct val="90000"/>
+              </a:lnSpc>
+              <a:buFont typeface="Arial" panose="020B0604020202020204" pitchFamily="34" charset="0"/>
+              <a:buChar char="•"/>
+            </a:pPr>
+            <a:r>
+              <a:rPr lang="en-US" dirty="0"/>
+              <a:t>Heuristics:</a:t>
+            </a:r>
+          </a:p>
+          <a:p>
+            <a:pPr marL="342900" indent="-228600">
+              <a:lnSpc>
+                <a:spcPct val="90000"/>
+              </a:lnSpc>
+              <a:buFont typeface="Arial" panose="020B0604020202020204" pitchFamily="34" charset="0"/>
+              <a:buChar char="•"/>
+            </a:pPr>
+            <a:r>
+              <a:rPr lang="en-US" dirty="0"/>
+              <a:t>Euclidean distance between the red block and the exit</a:t>
+            </a:r>
+          </a:p>
+          <a:p>
+            <a:pPr marL="342900" indent="-228600">
+              <a:lnSpc>
+                <a:spcPct val="90000"/>
+              </a:lnSpc>
+              <a:buFont typeface="Arial" panose="020B0604020202020204" pitchFamily="34" charset="0"/>
+              <a:buChar char="•"/>
+            </a:pPr>
+            <a:r>
+              <a:rPr lang="en-US" dirty="0"/>
+              <a:t>Weighted sum of the obstacles between the red block and the exit</a:t>
+            </a:r>
+          </a:p>
+          <a:p>
+            <a:pPr marL="342900" indent="-228600">
+              <a:lnSpc>
+                <a:spcPct val="90000"/>
+              </a:lnSpc>
+              <a:buFont typeface="Arial" panose="020B0604020202020204" pitchFamily="34" charset="0"/>
+              <a:buChar char="•"/>
+            </a:pPr>
+            <a:r>
+              <a:rPr lang="en-US" dirty="0"/>
+              <a:t>Maximize the amount of contiguous empty spaces near the red block</a:t>
+            </a:r>
+          </a:p>
+          <a:p>
+            <a:pPr marL="342900" indent="-228600">
+              <a:lnSpc>
+                <a:spcPct val="90000"/>
+              </a:lnSpc>
+              <a:buFont typeface="Arial" panose="020B0604020202020204" pitchFamily="34" charset="0"/>
+              <a:buChar char="•"/>
+            </a:pPr>
+            <a:r>
+              <a:rPr lang="en-US" dirty="0"/>
+              <a:t>Prioritize moves that keep the red block close to the edges</a:t>
+            </a:r>
+          </a:p>
+          <a:p>
+            <a:pPr marL="342900" indent="-228600">
+              <a:lnSpc>
+                <a:spcPct val="90000"/>
+              </a:lnSpc>
+              <a:buFont typeface="Arial" panose="020B0604020202020204" pitchFamily="34" charset="0"/>
+              <a:buChar char="•"/>
+            </a:pPr>
+            <a:r>
+              <a:rPr lang="en-US" dirty="0"/>
+              <a:t>Prioritize movements in which the red block has at least one possible movement</a:t>
+            </a:r>
+          </a:p>
+          <a:p>
+            <a:pPr marL="342900" indent="-228600">
+              <a:lnSpc>
+                <a:spcPct val="90000"/>
+              </a:lnSpc>
+              <a:buFont typeface="Arial" panose="020B0604020202020204" pitchFamily="34" charset="0"/>
+              <a:buChar char="•"/>
+            </a:pPr>
+            <a:r>
+              <a:rPr lang="en-US" dirty="0"/>
+              <a:t>Prioritize fitting blocks along the edges of the game board from largest to smallest</a:t>
+            </a:r>
+          </a:p>
+          <a:p>
+            <a:pPr marL="342900" indent="-228600">
+              <a:lnSpc>
+                <a:spcPct val="90000"/>
+              </a:lnSpc>
+              <a:buFont typeface="Arial" panose="020B0604020202020204" pitchFamily="34" charset="0"/>
+              <a:buChar char="•"/>
+            </a:pPr>
+            <a:r>
+              <a:rPr lang="en-US" dirty="0"/>
+              <a:t>Prioritize moving the largest blocks first</a:t>
+            </a:r>
+          </a:p>
+          <a:p>
+            <a:pPr marL="342900" indent="-228600">
+              <a:lnSpc>
+                <a:spcPct val="90000"/>
+              </a:lnSpc>
+              <a:buFont typeface="Arial" panose="020B0604020202020204" pitchFamily="34" charset="0"/>
+              <a:buChar char="•"/>
+            </a:pPr>
+            <a:r>
+              <a:rPr lang="en-US" dirty="0">
+                <a:solidFill>
+                  <a:srgbClr val="FF0000"/>
+                </a:solidFill>
+              </a:rPr>
+              <a:t>FALTA</a:t>
+            </a:r>
+          </a:p>
+          <a:p>
+            <a:pPr indent="-228600">
+              <a:lnSpc>
+                <a:spcPct val="90000"/>
+              </a:lnSpc>
+              <a:buFont typeface="Arial" panose="020B0604020202020204" pitchFamily="34" charset="0"/>
+              <a:buChar char="•"/>
+            </a:pPr>
+            <a:endParaRPr lang="en-US" dirty="0"/>
+          </a:p>
+          <a:p>
+            <a:pPr indent="-228600">
+              <a:lnSpc>
+                <a:spcPct val="90000"/>
+              </a:lnSpc>
+              <a:buFont typeface="Arial" panose="020B0604020202020204" pitchFamily="34" charset="0"/>
+              <a:buChar char="•"/>
+            </a:pPr>
+            <a:r>
+              <a:rPr lang="en-US" dirty="0"/>
+              <a:t>Operators:</a:t>
+            </a:r>
+          </a:p>
+          <a:p>
+            <a:pPr marL="285750" indent="-228600">
+              <a:lnSpc>
+                <a:spcPct val="90000"/>
+              </a:lnSpc>
+              <a:spcAft>
+                <a:spcPts val="600"/>
+              </a:spcAft>
+              <a:buFont typeface="Arial" panose="020B0604020202020204" pitchFamily="34" charset="0"/>
+              <a:buChar char="•"/>
+            </a:pPr>
+            <a:r>
+              <a:rPr lang="en-US" dirty="0"/>
+              <a:t>move: Move a block (up, down, right or left) to an adjacent empty space in the game board. </a:t>
+            </a:r>
+          </a:p>
+          <a:p>
+            <a:pPr marL="800100" lvl="1" indent="-228600">
+              <a:lnSpc>
+                <a:spcPct val="90000"/>
+              </a:lnSpc>
+              <a:spcAft>
+                <a:spcPts val="600"/>
+              </a:spcAft>
+              <a:buFont typeface="Arial" panose="020B0604020202020204" pitchFamily="34" charset="0"/>
+              <a:buChar char="•"/>
+            </a:pPr>
+            <a:r>
+              <a:rPr lang="en-US" dirty="0"/>
+              <a:t>Preconditions: Enough space adjacent to the current position and the coordinates are valid on the game board. </a:t>
+            </a:r>
+          </a:p>
+          <a:p>
+            <a:pPr marL="800100" lvl="1" indent="-228600">
+              <a:lnSpc>
+                <a:spcPct val="90000"/>
+              </a:lnSpc>
+              <a:spcAft>
+                <a:spcPts val="600"/>
+              </a:spcAft>
+              <a:buFont typeface="Arial" panose="020B0604020202020204" pitchFamily="34" charset="0"/>
+              <a:buChar char="•"/>
+            </a:pPr>
+            <a:r>
+              <a:rPr lang="en-US" dirty="0"/>
+              <a:t>Cost: 1 move. </a:t>
+            </a:r>
+          </a:p>
+          <a:p>
+            <a:pPr marL="800100" lvl="1" indent="-228600">
+              <a:lnSpc>
+                <a:spcPct val="90000"/>
+              </a:lnSpc>
+              <a:spcAft>
+                <a:spcPts val="600"/>
+              </a:spcAft>
+              <a:buFont typeface="Arial" panose="020B0604020202020204" pitchFamily="34" charset="0"/>
+              <a:buChar char="•"/>
+            </a:pPr>
+            <a:r>
+              <a:rPr lang="en-US" dirty="0"/>
+              <a:t>Effect: Update the position of the block.</a:t>
+            </a:r>
+          </a:p>
+          <a:p>
+            <a:pPr indent="-228600">
+              <a:lnSpc>
+                <a:spcPct val="90000"/>
+              </a:lnSpc>
+              <a:buFont typeface="Arial" panose="020B0604020202020204" pitchFamily="34" charset="0"/>
+              <a:buChar char="•"/>
+            </a:pPr>
+            <a:endParaRPr lang="en-US" dirty="0"/>
+          </a:p>
+        </p:txBody>
+      </p:sp>
+    </p:spTree>
+    <p:extLst>
+      <p:ext uri="{BB962C8B-B14F-4D97-AF65-F5344CB8AC3E}">
+        <p14:creationId xmlns:p14="http://schemas.microsoft.com/office/powerpoint/2010/main" val="3439691363"/>
+      </p:ext>
+    </p:extLst>
+  </p:cSld>
+  <p:clrMapOvr>
+    <a:masterClrMapping/>
+  </p:clrMapOvr>
+</p:sld>
+</file>
+
+<file path=ppt/slides/slide7.xml><?xml version="1.0" encoding="utf-8"?>
+<p:sld xmlns:a="http://schemas.openxmlformats.org/drawingml/2006/main" xmlns:r="http://schemas.openxmlformats.org/officeDocument/2006/relationships" xmlns:p="http://schemas.openxmlformats.org/presentationml/2006/main">
+  <p:cSld>
+    <p:bg>
+      <p:bgPr>
+        <a:solidFill>
+          <a:schemeClr val="bg1"/>
+        </a:solidFill>
+        <a:effectLst/>
+      </p:bgPr>
+    </p:bg>
+    <p:spTree>
+      <p:nvGrpSpPr>
+        <p:cNvPr id="1" name=""/>
+        <p:cNvGrpSpPr/>
+        <p:nvPr/>
+      </p:nvGrpSpPr>
+      <p:grpSpPr>
+        <a:xfrm>
+          <a:off x="0" y="0"/>
+          <a:ext cx="0" cy="0"/>
+          <a:chOff x="0" y="0"/>
+          <a:chExt cx="0" cy="0"/>
+        </a:xfrm>
+      </p:grpSpPr>
+      <p:sp useBgFill="1">
+        <p:nvSpPr>
+          <p:cNvPr id="10" name="Rectangle 9">
+            <a:extLst>
+              <a:ext uri="{FF2B5EF4-FFF2-40B4-BE49-F238E27FC236}">
+                <a16:creationId xmlns:a16="http://schemas.microsoft.com/office/drawing/2014/main" id="{95199994-21AE-49A2-BA0D-12E295989A9A}"/>
+              </a:ext>
+              <a:ext uri="{C183D7F6-B498-43B3-948B-1728B52AA6E4}">
+                <adec:decorative xmlns:adec="http://schemas.microsoft.com/office/drawing/2017/decorative" val="1"/>
+              </a:ext>
+            </a:extLst>
+          </p:cNvPr>
+          <p:cNvSpPr>
+            <a:spLocks noGrp="1" noRot="1" noChangeAspect="1" noMove="1" noResize="1" noEditPoints="1" noAdjustHandles="1" noChangeArrowheads="1" noChangeShapeType="1" noTextEdit="1"/>
+          </p:cNvSpPr>
+          <p:nvPr>
+            <p:extLst>
+              <p:ext uri="{386F3935-93C4-4BCD-93E2-E3B085C9AB24}">
+                <p16:designElem xmlns:p16="http://schemas.microsoft.com/office/powerpoint/2015/main" val="1"/>
+              </p:ext>
+            </p:extLst>
+          </p:nvPr>
+        </p:nvSpPr>
+        <p:spPr bwMode="white">
+          <a:xfrm>
+            <a:off x="0" y="0"/>
+            <a:ext cx="12192000" cy="6858000"/>
+          </a:xfrm>
+          <a:prstGeom prst="rect">
+            <a:avLst/>
+          </a:prstGeom>
+          <a:ln>
+            <a:noFill/>
+          </a:ln>
+        </p:spPr>
+        <p:style>
+          <a:lnRef idx="2">
+            <a:schemeClr val="accent1">
+              <a:shade val="50000"/>
+            </a:schemeClr>
+          </a:lnRef>
+          <a:fillRef idx="1">
+            <a:schemeClr val="accent1"/>
+          </a:fillRef>
+          <a:effectRef idx="0">
+            <a:schemeClr val="accent1"/>
+          </a:effectRef>
+          <a:fontRef idx="minor">
+            <a:schemeClr val="lt1"/>
+          </a:fontRef>
+        </p:style>
+        <p:txBody>
+          <a:bodyPr rtlCol="0" anchor="ctr"/>
+          <a:lstStyle>
+            <a:defPPr>
+              <a:defRPr lang="en-US"/>
+            </a:defPPr>
+            <a:lvl1pPr marL="0" algn="l" defTabSz="914400" rtl="0" eaLnBrk="1" latinLnBrk="0" hangingPunct="1">
+              <a:defRPr sz="1800" kern="1200">
+                <a:solidFill>
+                  <a:schemeClr val="lt1"/>
+                </a:solidFill>
+                <a:latin typeface="+mn-lt"/>
+                <a:ea typeface="+mn-ea"/>
+                <a:cs typeface="+mn-cs"/>
+              </a:defRPr>
+            </a:lvl1pPr>
+            <a:lvl2pPr marL="457200" algn="l" defTabSz="914400" rtl="0" eaLnBrk="1" latinLnBrk="0" hangingPunct="1">
+              <a:defRPr sz="1800" kern="1200">
+                <a:solidFill>
+                  <a:schemeClr val="lt1"/>
+                </a:solidFill>
+                <a:latin typeface="+mn-lt"/>
+                <a:ea typeface="+mn-ea"/>
+                <a:cs typeface="+mn-cs"/>
+              </a:defRPr>
+            </a:lvl2pPr>
+            <a:lvl3pPr marL="914400" algn="l" defTabSz="914400" rtl="0" eaLnBrk="1" latinLnBrk="0" hangingPunct="1">
+              <a:defRPr sz="1800" kern="1200">
+                <a:solidFill>
+                  <a:schemeClr val="lt1"/>
+                </a:solidFill>
+                <a:latin typeface="+mn-lt"/>
+                <a:ea typeface="+mn-ea"/>
+                <a:cs typeface="+mn-cs"/>
+              </a:defRPr>
+            </a:lvl3pPr>
+            <a:lvl4pPr marL="1371600" algn="l" defTabSz="914400" rtl="0" eaLnBrk="1" latinLnBrk="0" hangingPunct="1">
+              <a:defRPr sz="1800" kern="1200">
+                <a:solidFill>
+                  <a:schemeClr val="lt1"/>
+                </a:solidFill>
+                <a:latin typeface="+mn-lt"/>
+                <a:ea typeface="+mn-ea"/>
+                <a:cs typeface="+mn-cs"/>
+              </a:defRPr>
+            </a:lvl4pPr>
+            <a:lvl5pPr marL="1828800" algn="l" defTabSz="914400" rtl="0" eaLnBrk="1" latinLnBrk="0" hangingPunct="1">
+              <a:defRPr sz="1800" kern="1200">
+                <a:solidFill>
+                  <a:schemeClr val="lt1"/>
+                </a:solidFill>
+                <a:latin typeface="+mn-lt"/>
+                <a:ea typeface="+mn-ea"/>
+                <a:cs typeface="+mn-cs"/>
+              </a:defRPr>
+            </a:lvl5pPr>
+            <a:lvl6pPr marL="2286000" algn="l" defTabSz="914400" rtl="0" eaLnBrk="1" latinLnBrk="0" hangingPunct="1">
+              <a:defRPr sz="1800" kern="1200">
+                <a:solidFill>
+                  <a:schemeClr val="lt1"/>
+                </a:solidFill>
+                <a:latin typeface="+mn-lt"/>
+                <a:ea typeface="+mn-ea"/>
+                <a:cs typeface="+mn-cs"/>
+              </a:defRPr>
+            </a:lvl6pPr>
+            <a:lvl7pPr marL="2743200" algn="l" defTabSz="914400" rtl="0" eaLnBrk="1" latinLnBrk="0" hangingPunct="1">
+              <a:defRPr sz="1800" kern="1200">
+                <a:solidFill>
+                  <a:schemeClr val="lt1"/>
+                </a:solidFill>
+                <a:latin typeface="+mn-lt"/>
+                <a:ea typeface="+mn-ea"/>
+                <a:cs typeface="+mn-cs"/>
+              </a:defRPr>
+            </a:lvl7pPr>
+            <a:lvl8pPr marL="3200400" algn="l" defTabSz="914400" rtl="0" eaLnBrk="1" latinLnBrk="0" hangingPunct="1">
+              <a:defRPr sz="1800" kern="1200">
+                <a:solidFill>
+                  <a:schemeClr val="lt1"/>
+                </a:solidFill>
+                <a:latin typeface="+mn-lt"/>
+                <a:ea typeface="+mn-ea"/>
+                <a:cs typeface="+mn-cs"/>
+              </a:defRPr>
+            </a:lvl8pPr>
+            <a:lvl9pPr marL="3657600" algn="l" defTabSz="914400" rtl="0" eaLnBrk="1" latinLnBrk="0" hangingPunct="1">
+              <a:defRPr sz="1800" kern="1200">
+                <a:solidFill>
+                  <a:schemeClr val="lt1"/>
+                </a:solidFill>
+                <a:latin typeface="+mn-lt"/>
+                <a:ea typeface="+mn-ea"/>
+                <a:cs typeface="+mn-cs"/>
+              </a:defRPr>
+            </a:lvl9pPr>
+          </a:lstStyle>
+          <a:p>
+            <a:pPr algn="ctr"/>
+            <a:endParaRPr lang="en-US"/>
+          </a:p>
+        </p:txBody>
+      </p:sp>
+      <p:sp>
+        <p:nvSpPr>
+          <p:cNvPr id="2" name="Title 1">
+            <a:extLst>
+              <a:ext uri="{FF2B5EF4-FFF2-40B4-BE49-F238E27FC236}">
+                <a16:creationId xmlns:a16="http://schemas.microsoft.com/office/drawing/2014/main" id="{A440814D-58F1-5AC6-8764-E162F73A32BA}"/>
+              </a:ext>
+            </a:extLst>
+          </p:cNvPr>
+          <p:cNvSpPr>
+            <a:spLocks noGrp="1"/>
+          </p:cNvSpPr>
+          <p:nvPr>
+            <p:ph type="title"/>
+          </p:nvPr>
+        </p:nvSpPr>
+        <p:spPr>
+          <a:xfrm>
+            <a:off x="4855265" y="530578"/>
+            <a:ext cx="6685483" cy="1160110"/>
+          </a:xfrm>
+        </p:spPr>
+        <p:txBody>
+          <a:bodyPr vert="horz" lIns="91440" tIns="45720" rIns="91440" bIns="45720" rtlCol="0" anchor="ctr">
+            <a:normAutofit/>
+          </a:bodyPr>
+          <a:lstStyle/>
+          <a:p>
+            <a:r>
+              <a:rPr lang="en-US" sz="3700" kern="1200" dirty="0">
+                <a:solidFill>
+                  <a:schemeClr val="tx1"/>
+                </a:solidFill>
+                <a:latin typeface="+mj-lt"/>
+                <a:ea typeface="+mj-ea"/>
+                <a:cs typeface="+mj-cs"/>
+              </a:rPr>
+              <a:t>Implemented algorithms</a:t>
+            </a:r>
+          </a:p>
+        </p:txBody>
+      </p:sp>
+      <p:pic>
+        <p:nvPicPr>
+          <p:cNvPr id="7" name="Graphic 6" descr="Magnifying glass">
+            <a:extLst>
+              <a:ext uri="{FF2B5EF4-FFF2-40B4-BE49-F238E27FC236}">
+                <a16:creationId xmlns:a16="http://schemas.microsoft.com/office/drawing/2014/main" id="{CEE489C1-A97F-9036-B5A7-D590ECABC4FD}"/>
+              </a:ext>
+            </a:extLst>
+          </p:cNvPr>
+          <p:cNvPicPr>
+            <a:picLocks noChangeAspect="1"/>
+          </p:cNvPicPr>
+          <p:nvPr/>
+        </p:nvPicPr>
+        <p:blipFill>
+          <a:blip r:embed="rId2">
+            <a:extLst>
+              <a:ext uri="{28A0092B-C50C-407E-A947-70E740481C1C}">
+                <a14:useLocalDpi xmlns:a14="http://schemas.microsoft.com/office/drawing/2010/main" val="0"/>
+              </a:ext>
+              <a:ext uri="{96DAC541-7B7A-43D3-8B79-37D633B846F1}">
+                <asvg:svgBlip xmlns:asvg="http://schemas.microsoft.com/office/drawing/2016/SVG/main" r:embed="rId3"/>
+              </a:ext>
+            </a:extLst>
+          </a:blip>
+          <a:stretch>
+            <a:fillRect/>
+          </a:stretch>
+        </p:blipFill>
+        <p:spPr>
+          <a:xfrm>
+            <a:off x="512090" y="1268685"/>
+            <a:ext cx="4123294" cy="4123294"/>
+          </a:xfrm>
+          <a:custGeom>
+            <a:avLst/>
+            <a:gdLst/>
+            <a:ahLst/>
+            <a:cxnLst/>
+            <a:rect l="l" t="t" r="r" b="b"/>
+            <a:pathLst>
+              <a:path w="4643496" h="5550370">
+                <a:moveTo>
+                  <a:pt x="81586" y="0"/>
+                </a:moveTo>
+                <a:lnTo>
+                  <a:pt x="4561910" y="0"/>
+                </a:lnTo>
+                <a:cubicBezTo>
+                  <a:pt x="4606969" y="0"/>
+                  <a:pt x="4643496" y="36527"/>
+                  <a:pt x="4643496" y="81586"/>
+                </a:cubicBezTo>
+                <a:lnTo>
+                  <a:pt x="4643496" y="5468784"/>
+                </a:lnTo>
+                <a:cubicBezTo>
+                  <a:pt x="4643496" y="5513843"/>
+                  <a:pt x="4606969" y="5550370"/>
+                  <a:pt x="4561910" y="5550370"/>
+                </a:cubicBezTo>
+                <a:lnTo>
+                  <a:pt x="81586" y="5550370"/>
+                </a:lnTo>
+                <a:cubicBezTo>
+                  <a:pt x="36527" y="5550370"/>
+                  <a:pt x="0" y="5513843"/>
+                  <a:pt x="0" y="5468784"/>
+                </a:cubicBezTo>
+                <a:lnTo>
+                  <a:pt x="0" y="81586"/>
+                </a:lnTo>
+                <a:cubicBezTo>
+                  <a:pt x="0" y="36527"/>
+                  <a:pt x="36527" y="0"/>
+                  <a:pt x="81586" y="0"/>
+                </a:cubicBezTo>
+                <a:close/>
+              </a:path>
+            </a:pathLst>
+          </a:custGeom>
+        </p:spPr>
+      </p:pic>
+      <p:sp>
+        <p:nvSpPr>
+          <p:cNvPr id="12" name="Arc 11">
+            <a:extLst>
+              <a:ext uri="{FF2B5EF4-FFF2-40B4-BE49-F238E27FC236}">
+                <a16:creationId xmlns:a16="http://schemas.microsoft.com/office/drawing/2014/main" id="{A2C34835-4F79-4934-B151-D68E79764C72}"/>
+              </a:ext>
+              <a:ext uri="{C183D7F6-B498-43B3-948B-1728B52AA6E4}">
+                <adec:decorative xmlns:adec="http://schemas.microsoft.com/office/drawing/2017/decorative" val="1"/>
+              </a:ext>
+            </a:extLst>
+          </p:cNvPr>
+          <p:cNvSpPr>
+            <a:spLocks noGrp="1" noRot="1" noChangeAspect="1" noMove="1" noResize="1" noEditPoints="1" noAdjustHandles="1" noChangeArrowheads="1" noChangeShapeType="1" noTextEdit="1"/>
+          </p:cNvSpPr>
+          <p:nvPr>
+            <p:extLst>
+              <p:ext uri="{386F3935-93C4-4BCD-93E2-E3B085C9AB24}">
+                <p16:designElem xmlns:p16="http://schemas.microsoft.com/office/powerpoint/2015/main" val="1"/>
+              </p:ext>
+            </p:extLst>
+          </p:nvPr>
+        </p:nvSpPr>
+        <p:spPr>
+          <a:xfrm rot="6269068">
+            <a:off x="8717845" y="3339275"/>
+            <a:ext cx="2987899" cy="2987899"/>
+          </a:xfrm>
+          <a:prstGeom prst="arc">
+            <a:avLst>
+              <a:gd name="adj1" fmla="val 14441841"/>
+              <a:gd name="adj2" fmla="val 0"/>
+            </a:avLst>
+          </a:prstGeom>
+          <a:ln w="127000" cap="rnd">
+            <a:solidFill>
+              <a:schemeClr val="accent4">
+                <a:alpha val="95000"/>
+              </a:schemeClr>
+            </a:solidFill>
+            <a:prstDash val="dash"/>
+            <a:miter lim="800000"/>
+          </a:ln>
+        </p:spPr>
+        <p:style>
+          <a:lnRef idx="1">
+            <a:schemeClr val="accent1"/>
+          </a:lnRef>
+          <a:fillRef idx="0">
+            <a:schemeClr val="accent1"/>
+          </a:fillRef>
+          <a:effectRef idx="0">
+            <a:schemeClr val="accent1"/>
+          </a:effectRef>
+          <a:fontRef idx="minor">
+            <a:schemeClr val="tx1"/>
+          </a:fontRef>
+        </p:style>
+        <p:txBody>
+          <a:bodyPr rtlCol="0" anchor="ctr"/>
+          <a:lstStyle/>
+          <a:p>
+            <a:pPr marL="0" marR="0" lvl="0" indent="0" algn="ctr" defTabSz="914400" rtl="0" eaLnBrk="1" fontAlgn="auto" latinLnBrk="0" hangingPunct="1">
+              <a:lnSpc>
+                <a:spcPct val="100000"/>
+              </a:lnSpc>
+              <a:spcBef>
+                <a:spcPts val="0"/>
+              </a:spcBef>
+              <a:spcAft>
+                <a:spcPts val="0"/>
+              </a:spcAft>
+              <a:buClrTx/>
+              <a:buSzTx/>
+              <a:buFontTx/>
+              <a:buNone/>
+              <a:tabLst/>
+              <a:defRPr/>
+            </a:pPr>
+            <a:endParaRPr kumimoji="0" lang="en-US" sz="1800" b="0" i="0" u="none" strike="noStrike" kern="1200" cap="none" spc="0" normalizeH="0" baseline="0" noProof="0">
+              <a:ln>
+                <a:noFill/>
+              </a:ln>
+              <a:solidFill>
+                <a:srgbClr val="000000"/>
+              </a:solidFill>
+              <a:effectLst/>
+              <a:uLnTx/>
+              <a:uFillTx/>
+              <a:latin typeface="Calibri" panose="020F0502020204030204"/>
+              <a:ea typeface="+mn-ea"/>
+              <a:cs typeface="+mn-cs"/>
+            </a:endParaRPr>
+          </a:p>
+        </p:txBody>
+      </p:sp>
+      <p:sp>
+        <p:nvSpPr>
+          <p:cNvPr id="3" name="TextBox 2">
+            <a:extLst>
+              <a:ext uri="{FF2B5EF4-FFF2-40B4-BE49-F238E27FC236}">
+                <a16:creationId xmlns:a16="http://schemas.microsoft.com/office/drawing/2014/main" id="{6279D5A5-2C3E-D20B-26B3-5CA38DD44134}"/>
+              </a:ext>
+            </a:extLst>
+          </p:cNvPr>
+          <p:cNvSpPr txBox="1"/>
+          <p:nvPr/>
+        </p:nvSpPr>
+        <p:spPr>
+          <a:xfrm>
+            <a:off x="4855265" y="1825625"/>
+            <a:ext cx="6685483" cy="4388908"/>
+          </a:xfrm>
+          <a:prstGeom prst="rect">
+            <a:avLst/>
+          </a:prstGeom>
+        </p:spPr>
+        <p:txBody>
+          <a:bodyPr vert="horz" lIns="91440" tIns="45720" rIns="91440" bIns="45720" rtlCol="0">
+            <a:normAutofit/>
+          </a:bodyPr>
+          <a:lstStyle/>
+          <a:p>
+            <a:pPr marL="285750" indent="-228600">
+              <a:lnSpc>
+                <a:spcPct val="90000"/>
+              </a:lnSpc>
+              <a:spcAft>
+                <a:spcPts val="600"/>
+              </a:spcAft>
+              <a:buFont typeface="Arial" panose="020B0604020202020204" pitchFamily="34" charset="0"/>
+              <a:buChar char="•"/>
+            </a:pPr>
+            <a:r>
+              <a:rPr lang="en-US" sz="2400" dirty="0"/>
+              <a:t>Breadth First Search</a:t>
+            </a:r>
+          </a:p>
+          <a:p>
+            <a:pPr marL="285750" indent="-228600">
+              <a:lnSpc>
+                <a:spcPct val="90000"/>
+              </a:lnSpc>
+              <a:spcAft>
+                <a:spcPts val="600"/>
+              </a:spcAft>
+              <a:buFont typeface="Arial" panose="020B0604020202020204" pitchFamily="34" charset="0"/>
+              <a:buChar char="•"/>
+            </a:pPr>
+            <a:r>
+              <a:rPr lang="en-US" sz="2400" dirty="0"/>
+              <a:t>Depth First Search</a:t>
+            </a:r>
+          </a:p>
+          <a:p>
+            <a:pPr marL="285750" indent="-228600">
+              <a:lnSpc>
+                <a:spcPct val="90000"/>
+              </a:lnSpc>
+              <a:spcAft>
+                <a:spcPts val="600"/>
+              </a:spcAft>
+              <a:buFont typeface="Arial" panose="020B0604020202020204" pitchFamily="34" charset="0"/>
+              <a:buChar char="•"/>
+            </a:pPr>
+            <a:r>
+              <a:rPr lang="en-US" sz="2400" dirty="0"/>
+              <a:t>Depth Limited Search</a:t>
+            </a:r>
+          </a:p>
+          <a:p>
+            <a:pPr marL="285750" indent="-228600">
+              <a:lnSpc>
+                <a:spcPct val="90000"/>
+              </a:lnSpc>
+              <a:spcAft>
+                <a:spcPts val="600"/>
+              </a:spcAft>
+              <a:buFont typeface="Arial" panose="020B0604020202020204" pitchFamily="34" charset="0"/>
+              <a:buChar char="•"/>
+            </a:pPr>
+            <a:r>
+              <a:rPr lang="en-US" sz="2400" dirty="0"/>
+              <a:t>Iterative Deepening Search</a:t>
+            </a:r>
+          </a:p>
+          <a:p>
+            <a:pPr marL="285750" indent="-228600">
+              <a:lnSpc>
+                <a:spcPct val="90000"/>
+              </a:lnSpc>
+              <a:spcAft>
+                <a:spcPts val="600"/>
+              </a:spcAft>
+              <a:buFont typeface="Arial" panose="020B0604020202020204" pitchFamily="34" charset="0"/>
+              <a:buChar char="•"/>
+            </a:pPr>
+            <a:r>
+              <a:rPr lang="en-US" sz="2400" dirty="0"/>
+              <a:t>Greedy Search</a:t>
+            </a:r>
+          </a:p>
+          <a:p>
+            <a:pPr marL="285750" indent="-228600">
+              <a:lnSpc>
+                <a:spcPct val="90000"/>
+              </a:lnSpc>
+              <a:spcAft>
+                <a:spcPts val="600"/>
+              </a:spcAft>
+              <a:buFont typeface="Arial" panose="020B0604020202020204" pitchFamily="34" charset="0"/>
+              <a:buChar char="•"/>
+            </a:pPr>
+            <a:r>
+              <a:rPr lang="en-US" sz="2400" dirty="0"/>
+              <a:t>A* search</a:t>
+            </a:r>
+          </a:p>
+          <a:p>
+            <a:pPr marL="285750" indent="-228600">
+              <a:lnSpc>
+                <a:spcPct val="90000"/>
+              </a:lnSpc>
+              <a:spcAft>
+                <a:spcPts val="600"/>
+              </a:spcAft>
+              <a:buFont typeface="Arial" panose="020B0604020202020204" pitchFamily="34" charset="0"/>
+              <a:buChar char="•"/>
+            </a:pPr>
+            <a:r>
+              <a:rPr lang="en-US" sz="2400" dirty="0"/>
+              <a:t>Weighted A* search</a:t>
+            </a:r>
+          </a:p>
+          <a:p>
+            <a:pPr marL="285750" indent="-228600">
+              <a:lnSpc>
+                <a:spcPct val="90000"/>
+              </a:lnSpc>
+              <a:spcAft>
+                <a:spcPts val="600"/>
+              </a:spcAft>
+              <a:buFont typeface="Arial" panose="020B0604020202020204" pitchFamily="34" charset="0"/>
+              <a:buChar char="•"/>
+            </a:pPr>
+            <a:endParaRPr lang="en-US" sz="2400" dirty="0"/>
+          </a:p>
+          <a:p>
+            <a:pPr indent="-228600">
+              <a:lnSpc>
+                <a:spcPct val="90000"/>
+              </a:lnSpc>
+              <a:spcAft>
+                <a:spcPts val="600"/>
+              </a:spcAft>
+              <a:buFont typeface="Arial" panose="020B0604020202020204" pitchFamily="34" charset="0"/>
+              <a:buChar char="•"/>
+            </a:pPr>
+            <a:endParaRPr lang="en-US" sz="2400" dirty="0"/>
+          </a:p>
+        </p:txBody>
+      </p:sp>
+    </p:spTree>
+    <p:extLst>
+      <p:ext uri="{BB962C8B-B14F-4D97-AF65-F5344CB8AC3E}">
+        <p14:creationId xmlns:p14="http://schemas.microsoft.com/office/powerpoint/2010/main" val="851997528"/>
+      </p:ext>
+    </p:extLst>
+  </p:cSld>
+  <p:clrMapOvr>
+    <a:masterClrMapping/>
+  </p:clrMapOvr>
+</p:sld>
+</file>
+
+<file path=ppt/slides/slide8.xml><?xml version="1.0" encoding="utf-8"?>
+<p:sld xmlns:a="http://schemas.openxmlformats.org/drawingml/2006/main" xmlns:r="http://schemas.openxmlformats.org/officeDocument/2006/relationships" xmlns:p="http://schemas.openxmlformats.org/presentationml/2006/main">
+  <p:cSld>
+    <p:spTree>
+      <p:nvGrpSpPr>
+        <p:cNvPr id="1" name=""/>
+        <p:cNvGrpSpPr/>
+        <p:nvPr/>
+      </p:nvGrpSpPr>
+      <p:grpSpPr>
+        <a:xfrm>
+          <a:off x="0" y="0"/>
+          <a:ext cx="0" cy="0"/>
+          <a:chOff x="0" y="0"/>
+          <a:chExt cx="0" cy="0"/>
+        </a:xfrm>
+      </p:grpSpPr>
+      <p:sp>
+        <p:nvSpPr>
+          <p:cNvPr id="2" name="Title 1">
+            <a:extLst>
+              <a:ext uri="{FF2B5EF4-FFF2-40B4-BE49-F238E27FC236}">
+                <a16:creationId xmlns:a16="http://schemas.microsoft.com/office/drawing/2014/main" id="{B2DAAE40-76B7-CD13-732B-8FFEDE403A02}"/>
+              </a:ext>
+            </a:extLst>
+          </p:cNvPr>
+          <p:cNvSpPr>
+            <a:spLocks noGrp="1"/>
+          </p:cNvSpPr>
+          <p:nvPr>
+            <p:ph type="title"/>
+          </p:nvPr>
+        </p:nvSpPr>
+        <p:spPr/>
+        <p:txBody>
+          <a:bodyPr/>
+          <a:lstStyle/>
+          <a:p>
+            <a:r>
+              <a:rPr lang="en-US" dirty="0"/>
+              <a:t>Experimental Results</a:t>
+            </a:r>
+            <a:endParaRPr lang="en-GB" dirty="0"/>
+          </a:p>
+        </p:txBody>
+      </p:sp>
+      <p:sp>
+        <p:nvSpPr>
+          <p:cNvPr id="3" name="TextBox 2">
+            <a:extLst>
+              <a:ext uri="{FF2B5EF4-FFF2-40B4-BE49-F238E27FC236}">
+                <a16:creationId xmlns:a16="http://schemas.microsoft.com/office/drawing/2014/main" id="{3657C692-D500-1670-527E-FB2D1A135A6C}"/>
+              </a:ext>
+            </a:extLst>
+          </p:cNvPr>
+          <p:cNvSpPr txBox="1"/>
+          <p:nvPr/>
+        </p:nvSpPr>
+        <p:spPr>
+          <a:xfrm>
+            <a:off x="1900518" y="2613212"/>
+            <a:ext cx="7171764" cy="369332"/>
+          </a:xfrm>
+          <a:prstGeom prst="rect">
+            <a:avLst/>
+          </a:prstGeom>
+          <a:noFill/>
+        </p:spPr>
+        <p:txBody>
+          <a:bodyPr wrap="square" rtlCol="0">
+            <a:spAutoFit/>
+          </a:bodyPr>
+          <a:lstStyle/>
+          <a:p>
+            <a:r>
+              <a:rPr lang="en-US" dirty="0"/>
+              <a:t>1 </a:t>
+            </a:r>
+            <a:r>
+              <a:rPr lang="en-US" dirty="0" err="1"/>
+              <a:t>grafico</a:t>
+            </a:r>
+            <a:r>
+              <a:rPr lang="en-US" dirty="0"/>
+              <a:t> </a:t>
+            </a:r>
+            <a:r>
+              <a:rPr lang="en-US" dirty="0" err="1"/>
+              <a:t>sobre</a:t>
+            </a:r>
+            <a:r>
+              <a:rPr lang="en-US" dirty="0"/>
+              <a:t> uninformed search e outro </a:t>
+            </a:r>
+            <a:r>
+              <a:rPr lang="en-US" dirty="0" err="1"/>
+              <a:t>sobre</a:t>
+            </a:r>
+            <a:r>
+              <a:rPr lang="en-US" dirty="0"/>
+              <a:t> informed search</a:t>
+            </a:r>
+            <a:endParaRPr lang="en-GB" dirty="0"/>
+          </a:p>
+        </p:txBody>
+      </p:sp>
+      <p:sp>
+        <p:nvSpPr>
+          <p:cNvPr id="4" name="TextBox 3">
+            <a:extLst>
+              <a:ext uri="{FF2B5EF4-FFF2-40B4-BE49-F238E27FC236}">
+                <a16:creationId xmlns:a16="http://schemas.microsoft.com/office/drawing/2014/main" id="{43E30558-AD42-A188-4378-9F93BBC390EA}"/>
+              </a:ext>
+            </a:extLst>
+          </p:cNvPr>
+          <p:cNvSpPr txBox="1"/>
+          <p:nvPr/>
+        </p:nvSpPr>
+        <p:spPr>
+          <a:xfrm>
+            <a:off x="1748118" y="5221941"/>
+            <a:ext cx="8574741" cy="369332"/>
+          </a:xfrm>
+          <a:prstGeom prst="rect">
+            <a:avLst/>
+          </a:prstGeom>
+          <a:noFill/>
+        </p:spPr>
+        <p:txBody>
+          <a:bodyPr wrap="square" rtlCol="0">
+            <a:spAutoFit/>
+          </a:bodyPr>
+          <a:lstStyle/>
+          <a:p>
+            <a:r>
+              <a:rPr lang="en-US" dirty="0"/>
+              <a:t>Link para o html</a:t>
+            </a:r>
+            <a:endParaRPr lang="en-GB" dirty="0"/>
+          </a:p>
+        </p:txBody>
+      </p:sp>
+    </p:spTree>
+    <p:extLst>
+      <p:ext uri="{BB962C8B-B14F-4D97-AF65-F5344CB8AC3E}">
+        <p14:creationId xmlns:p14="http://schemas.microsoft.com/office/powerpoint/2010/main" val="3788508465"/>
+      </p:ext>
+    </p:extLst>
+  </p:cSld>
+  <p:clrMapOvr>
+    <a:masterClrMapping/>
+  </p:clrMapOvr>
+</p:sld>
+</file>
+
+<file path=ppt/slides/slide9.xml><?xml version="1.0" encoding="utf-8"?>
+<p:sld xmlns:a="http://schemas.openxmlformats.org/drawingml/2006/main" xmlns:r="http://schemas.openxmlformats.org/officeDocument/2006/relationships" xmlns:p="http://schemas.openxmlformats.org/presentationml/2006/main">
+  <p:cSld>
+    <p:spTree>
+      <p:nvGrpSpPr>
+        <p:cNvPr id="1" name=""/>
+        <p:cNvGrpSpPr/>
+        <p:nvPr/>
+      </p:nvGrpSpPr>
+      <p:grpSpPr>
+        <a:xfrm>
+          <a:off x="0" y="0"/>
+          <a:ext cx="0" cy="0"/>
+          <a:chOff x="0" y="0"/>
+          <a:chExt cx="0" cy="0"/>
+        </a:xfrm>
+      </p:grpSpPr>
+      <p:sp>
+        <p:nvSpPr>
+          <p:cNvPr id="2" name="Title 1">
+            <a:extLst>
+              <a:ext uri="{FF2B5EF4-FFF2-40B4-BE49-F238E27FC236}">
+                <a16:creationId xmlns:a16="http://schemas.microsoft.com/office/drawing/2014/main" id="{DDEA2501-2C54-6AFE-2C1C-F17A493DF165}"/>
+              </a:ext>
+            </a:extLst>
+          </p:cNvPr>
+          <p:cNvSpPr>
+            <a:spLocks noGrp="1"/>
+          </p:cNvSpPr>
+          <p:nvPr>
+            <p:ph type="title"/>
+          </p:nvPr>
+        </p:nvSpPr>
+        <p:spPr/>
+        <p:txBody>
+          <a:bodyPr/>
+          <a:lstStyle/>
+          <a:p>
+            <a:r>
+              <a:rPr lang="en-US" dirty="0"/>
+              <a:t>Conclusions</a:t>
+            </a:r>
+            <a:endParaRPr lang="en-GB" dirty="0"/>
+          </a:p>
+        </p:txBody>
+      </p:sp>
+      <p:sp>
+        <p:nvSpPr>
+          <p:cNvPr id="3" name="TextBox 2">
+            <a:extLst>
+              <a:ext uri="{FF2B5EF4-FFF2-40B4-BE49-F238E27FC236}">
+                <a16:creationId xmlns:a16="http://schemas.microsoft.com/office/drawing/2014/main" id="{F7E182FB-1F4F-6DCB-7107-E44F8C704AC1}"/>
+              </a:ext>
+            </a:extLst>
+          </p:cNvPr>
+          <p:cNvSpPr txBox="1"/>
+          <p:nvPr/>
+        </p:nvSpPr>
+        <p:spPr>
+          <a:xfrm>
+            <a:off x="1304365" y="1900518"/>
+            <a:ext cx="8068235" cy="646331"/>
+          </a:xfrm>
+          <a:prstGeom prst="rect">
+            <a:avLst/>
+          </a:prstGeom>
+          <a:noFill/>
+        </p:spPr>
+        <p:txBody>
+          <a:bodyPr wrap="square" rtlCol="0">
+            <a:spAutoFit/>
+          </a:bodyPr>
+          <a:lstStyle/>
+          <a:p>
+            <a:r>
+              <a:rPr lang="en-US" dirty="0" err="1"/>
+              <a:t>Falar</a:t>
+            </a:r>
+            <a:r>
+              <a:rPr lang="en-US" dirty="0"/>
+              <a:t> </a:t>
+            </a:r>
+            <a:r>
+              <a:rPr lang="en-US" dirty="0" err="1"/>
+              <a:t>sobre</a:t>
+            </a:r>
+            <a:r>
+              <a:rPr lang="en-US" dirty="0"/>
+              <a:t> a </a:t>
+            </a:r>
+            <a:r>
+              <a:rPr lang="en-US" dirty="0" err="1"/>
+              <a:t>melhor</a:t>
+            </a:r>
+            <a:r>
+              <a:rPr lang="en-US" dirty="0"/>
+              <a:t> </a:t>
+            </a:r>
+            <a:r>
+              <a:rPr lang="en-US" dirty="0" err="1"/>
+              <a:t>heuristica</a:t>
+            </a:r>
+            <a:r>
+              <a:rPr lang="en-US" dirty="0"/>
+              <a:t> + </a:t>
+            </a:r>
+            <a:r>
+              <a:rPr lang="en-US" dirty="0" err="1"/>
+              <a:t>melhor</a:t>
+            </a:r>
+            <a:r>
+              <a:rPr lang="en-US" dirty="0"/>
+              <a:t> </a:t>
+            </a:r>
+            <a:r>
+              <a:rPr lang="en-US" dirty="0" err="1"/>
+              <a:t>algoritmo</a:t>
+            </a:r>
+            <a:r>
+              <a:rPr lang="en-US" dirty="0"/>
+              <a:t>  e </a:t>
+            </a:r>
+            <a:r>
+              <a:rPr lang="en-US" dirty="0" err="1"/>
+              <a:t>comparar</a:t>
+            </a:r>
+            <a:r>
+              <a:rPr lang="en-US" dirty="0"/>
+              <a:t> </a:t>
+            </a:r>
+            <a:r>
+              <a:rPr lang="en-US" dirty="0" err="1"/>
+              <a:t>comportamentos</a:t>
+            </a:r>
+            <a:r>
+              <a:rPr lang="en-US" dirty="0"/>
+              <a:t> </a:t>
+            </a:r>
+            <a:r>
+              <a:rPr lang="en-US" dirty="0" err="1"/>
+              <a:t>nas</a:t>
+            </a:r>
+            <a:r>
+              <a:rPr lang="en-US" dirty="0"/>
+              <a:t> </a:t>
+            </a:r>
+            <a:r>
+              <a:rPr lang="en-US" dirty="0" err="1"/>
+              <a:t>dificuldades</a:t>
+            </a:r>
+            <a:endParaRPr lang="en-GB" dirty="0"/>
+          </a:p>
+        </p:txBody>
+      </p:sp>
+    </p:spTree>
+    <p:extLst>
+      <p:ext uri="{BB962C8B-B14F-4D97-AF65-F5344CB8AC3E}">
+        <p14:creationId xmlns:p14="http://schemas.microsoft.com/office/powerpoint/2010/main" val="1465826938"/>
       </p:ext>
     </p:extLst>
   </p:cSld>

</xml_diff>

<commit_message>
Fixed some bugs and finished PowerPoint
</commit_message>
<xml_diff>
--- a/Block Escape.pptx
+++ b/Block Escape.pptx
@@ -205,7 +205,7 @@
           <a:p>
             <a:fld id="{93E535DD-106C-4541-B5AF-9672E5885387}" type="datetimeFigureOut">
               <a:rPr lang="en-US" smtClean="0"/>
-              <a:t>4/2/2023</a:t>
+              <a:t>4/3/2023</a:t>
             </a:fld>
             <a:endParaRPr lang="en-US"/>
           </a:p>
@@ -705,7 +705,7 @@
           <a:p>
             <a:fld id="{1C56E1C8-51FB-41FF-A952-5015197EF72E}" type="datetimeFigureOut">
               <a:rPr lang="en-GB" smtClean="0"/>
-              <a:t>02/04/2023</a:t>
+              <a:t>03/04/2023</a:t>
             </a:fld>
             <a:endParaRPr lang="en-GB"/>
           </a:p>
@@ -905,7 +905,7 @@
           <a:p>
             <a:fld id="{1C56E1C8-51FB-41FF-A952-5015197EF72E}" type="datetimeFigureOut">
               <a:rPr lang="en-GB" smtClean="0"/>
-              <a:t>02/04/2023</a:t>
+              <a:t>03/04/2023</a:t>
             </a:fld>
             <a:endParaRPr lang="en-GB"/>
           </a:p>
@@ -1115,7 +1115,7 @@
           <a:p>
             <a:fld id="{1C56E1C8-51FB-41FF-A952-5015197EF72E}" type="datetimeFigureOut">
               <a:rPr lang="en-GB" smtClean="0"/>
-              <a:t>02/04/2023</a:t>
+              <a:t>03/04/2023</a:t>
             </a:fld>
             <a:endParaRPr lang="en-GB"/>
           </a:p>
@@ -1315,7 +1315,7 @@
           <a:p>
             <a:fld id="{1C56E1C8-51FB-41FF-A952-5015197EF72E}" type="datetimeFigureOut">
               <a:rPr lang="en-GB" smtClean="0"/>
-              <a:t>02/04/2023</a:t>
+              <a:t>03/04/2023</a:t>
             </a:fld>
             <a:endParaRPr lang="en-GB"/>
           </a:p>
@@ -1591,7 +1591,7 @@
           <a:p>
             <a:fld id="{1C56E1C8-51FB-41FF-A952-5015197EF72E}" type="datetimeFigureOut">
               <a:rPr lang="en-GB" smtClean="0"/>
-              <a:t>02/04/2023</a:t>
+              <a:t>03/04/2023</a:t>
             </a:fld>
             <a:endParaRPr lang="en-GB"/>
           </a:p>
@@ -1859,7 +1859,7 @@
           <a:p>
             <a:fld id="{1C56E1C8-51FB-41FF-A952-5015197EF72E}" type="datetimeFigureOut">
               <a:rPr lang="en-GB" smtClean="0"/>
-              <a:t>02/04/2023</a:t>
+              <a:t>03/04/2023</a:t>
             </a:fld>
             <a:endParaRPr lang="en-GB"/>
           </a:p>
@@ -2274,7 +2274,7 @@
           <a:p>
             <a:fld id="{1C56E1C8-51FB-41FF-A952-5015197EF72E}" type="datetimeFigureOut">
               <a:rPr lang="en-GB" smtClean="0"/>
-              <a:t>02/04/2023</a:t>
+              <a:t>03/04/2023</a:t>
             </a:fld>
             <a:endParaRPr lang="en-GB"/>
           </a:p>
@@ -2416,7 +2416,7 @@
           <a:p>
             <a:fld id="{1C56E1C8-51FB-41FF-A952-5015197EF72E}" type="datetimeFigureOut">
               <a:rPr lang="en-GB" smtClean="0"/>
-              <a:t>02/04/2023</a:t>
+              <a:t>03/04/2023</a:t>
             </a:fld>
             <a:endParaRPr lang="en-GB"/>
           </a:p>
@@ -2529,7 +2529,7 @@
           <a:p>
             <a:fld id="{1C56E1C8-51FB-41FF-A952-5015197EF72E}" type="datetimeFigureOut">
               <a:rPr lang="en-GB" smtClean="0"/>
-              <a:t>02/04/2023</a:t>
+              <a:t>03/04/2023</a:t>
             </a:fld>
             <a:endParaRPr lang="en-GB"/>
           </a:p>
@@ -2842,7 +2842,7 @@
           <a:p>
             <a:fld id="{1C56E1C8-51FB-41FF-A952-5015197EF72E}" type="datetimeFigureOut">
               <a:rPr lang="en-GB" smtClean="0"/>
-              <a:t>02/04/2023</a:t>
+              <a:t>03/04/2023</a:t>
             </a:fld>
             <a:endParaRPr lang="en-GB"/>
           </a:p>
@@ -3131,7 +3131,7 @@
           <a:p>
             <a:fld id="{1C56E1C8-51FB-41FF-A952-5015197EF72E}" type="datetimeFigureOut">
               <a:rPr lang="en-GB" smtClean="0"/>
-              <a:t>02/04/2023</a:t>
+              <a:t>03/04/2023</a:t>
             </a:fld>
             <a:endParaRPr lang="en-GB"/>
           </a:p>
@@ -3374,7 +3374,7 @@
           <a:p>
             <a:fld id="{1C56E1C8-51FB-41FF-A952-5015197EF72E}" type="datetimeFigureOut">
               <a:rPr lang="en-GB" smtClean="0"/>
-              <a:t>02/04/2023</a:t>
+              <a:t>03/04/2023</a:t>
             </a:fld>
             <a:endParaRPr lang="en-GB"/>
           </a:p>
@@ -5911,7 +5911,7 @@
         </p:spPr>
         <p:txBody>
           <a:bodyPr vert="horz" lIns="91440" tIns="45720" rIns="91440" bIns="45720" rtlCol="0">
-            <a:normAutofit lnSpcReduction="10000"/>
+            <a:normAutofit fontScale="92500" lnSpcReduction="10000"/>
           </a:bodyPr>
           <a:lstStyle/>
           <a:p>
@@ -5925,7 +5925,7 @@
             </a:pPr>
             <a:r>
               <a:rPr lang="en-US" sz="1400" b="1" dirty="0"/>
-              <a:t>Goal: </a:t>
+              <a:t>Objective Test: </a:t>
             </a:r>
             <a:r>
               <a:rPr lang="en-US" sz="1400" dirty="0"/>
@@ -7332,6 +7332,10 @@
               <a:buChar char="•"/>
             </a:pPr>
             <a:r>
+              <a:rPr lang="en-US" b="1" dirty="0"/>
+              <a:t>H1: </a:t>
+            </a:r>
+            <a:r>
               <a:rPr lang="en-US" dirty="0"/>
               <a:t>Euclidean distance between the red block and the exit</a:t>
             </a:r>
@@ -7345,6 +7349,10 @@
               <a:buChar char="•"/>
             </a:pPr>
             <a:r>
+              <a:rPr lang="en-US" b="1" dirty="0"/>
+              <a:t>H2: </a:t>
+            </a:r>
+            <a:r>
               <a:rPr lang="en-US" dirty="0"/>
               <a:t>Weighted sum of the obstacles between the red block and the exit</a:t>
             </a:r>
@@ -7358,6 +7366,10 @@
               <a:buChar char="•"/>
             </a:pPr>
             <a:r>
+              <a:rPr lang="en-US" b="1" dirty="0"/>
+              <a:t>H3: </a:t>
+            </a:r>
+            <a:r>
               <a:rPr lang="en-US" dirty="0"/>
               <a:t>Maximize the amount of contiguous empty spaces near the red block</a:t>
             </a:r>
@@ -7371,6 +7383,10 @@
               <a:buChar char="•"/>
             </a:pPr>
             <a:r>
+              <a:rPr lang="en-US" b="1" dirty="0"/>
+              <a:t>H4: </a:t>
+            </a:r>
+            <a:r>
               <a:rPr lang="en-US" dirty="0"/>
               <a:t>Prioritize moves that keep the red block close to the edges</a:t>
             </a:r>
@@ -7384,6 +7400,10 @@
               <a:buChar char="•"/>
             </a:pPr>
             <a:r>
+              <a:rPr lang="en-US" b="1" dirty="0"/>
+              <a:t>H5: </a:t>
+            </a:r>
+            <a:r>
               <a:rPr lang="en-US" dirty="0"/>
               <a:t>Prioritize movements in which the red block has at least one possible movement</a:t>
             </a:r>
@@ -7397,6 +7417,10 @@
               <a:buChar char="•"/>
             </a:pPr>
             <a:r>
+              <a:rPr lang="en-US" b="1" dirty="0"/>
+              <a:t>H6: </a:t>
+            </a:r>
+            <a:r>
               <a:rPr lang="en-US" dirty="0"/>
               <a:t>Prioritize fitting blocks along the edges of the game board from largest to smallest</a:t>
             </a:r>
@@ -7410,6 +7434,10 @@
               <a:buChar char="•"/>
             </a:pPr>
             <a:r>
+              <a:rPr lang="en-US" b="1" dirty="0"/>
+              <a:t>H7: </a:t>
+            </a:r>
+            <a:r>
               <a:rPr lang="en-US" dirty="0"/>
               <a:t>Prioritize moving the largest blocks first</a:t>
             </a:r>
@@ -7422,6 +7450,10 @@
               <a:buFont typeface="Arial" panose="020B0604020202020204" pitchFamily="34" charset="0"/>
               <a:buChar char="•"/>
             </a:pPr>
+            <a:r>
+              <a:rPr lang="en-US" b="1" dirty="0"/>
+              <a:t>H8: </a:t>
+            </a:r>
             <a:r>
               <a:rPr lang="en-US" dirty="0"/>
               <a:t>Prioritize moving the smallest blocks first</a:t>
@@ -8119,6 +8151,14 @@
 <file path=ppt/slides/slide8.xml><?xml version="1.0" encoding="utf-8"?>
 <p:sld xmlns:a="http://schemas.openxmlformats.org/drawingml/2006/main" xmlns:r="http://schemas.openxmlformats.org/officeDocument/2006/relationships" xmlns:p="http://schemas.openxmlformats.org/presentationml/2006/main">
   <p:cSld>
+    <p:bg>
+      <p:bgPr>
+        <a:solidFill>
+          <a:schemeClr val="bg1"/>
+        </a:solidFill>
+        <a:effectLst/>
+      </p:bgPr>
+    </p:bg>
     <p:spTree>
       <p:nvGrpSpPr>
         <p:cNvPr id="1" name=""/>
@@ -8133,6 +8173,255 @@
           <a:chExt cx="0" cy="0"/>
         </a:xfrm>
       </p:grpSpPr>
+      <p:sp useBgFill="1">
+        <p:nvSpPr>
+          <p:cNvPr id="23" name="Rectangle 12">
+            <a:extLst>
+              <a:ext uri="{FF2B5EF4-FFF2-40B4-BE49-F238E27FC236}">
+                <a16:creationId xmlns:a16="http://schemas.microsoft.com/office/drawing/2014/main" id="{89A320C9-9735-4D13-8279-C1C674841392}"/>
+              </a:ext>
+              <a:ext uri="{C183D7F6-B498-43B3-948B-1728B52AA6E4}">
+                <adec:decorative xmlns:adec="http://schemas.microsoft.com/office/drawing/2017/decorative" val="1"/>
+              </a:ext>
+            </a:extLst>
+          </p:cNvPr>
+          <p:cNvSpPr>
+            <a:spLocks noGrp="1" noRot="1" noChangeAspect="1" noMove="1" noResize="1" noEditPoints="1" noAdjustHandles="1" noChangeArrowheads="1" noChangeShapeType="1" noTextEdit="1"/>
+          </p:cNvSpPr>
+          <p:nvPr>
+            <p:extLst>
+              <p:ext uri="{386F3935-93C4-4BCD-93E2-E3B085C9AB24}">
+                <p16:designElem xmlns:p16="http://schemas.microsoft.com/office/powerpoint/2015/main" val="1"/>
+              </p:ext>
+            </p:extLst>
+          </p:nvPr>
+        </p:nvSpPr>
+        <p:spPr>
+          <a:xfrm>
+            <a:off x="0" y="0"/>
+            <a:ext cx="12192000" cy="6858000"/>
+          </a:xfrm>
+          <a:prstGeom prst="rect">
+            <a:avLst/>
+          </a:prstGeom>
+          <a:ln>
+            <a:noFill/>
+          </a:ln>
+        </p:spPr>
+        <p:style>
+          <a:lnRef idx="2">
+            <a:schemeClr val="accent1">
+              <a:shade val="50000"/>
+            </a:schemeClr>
+          </a:lnRef>
+          <a:fillRef idx="1">
+            <a:schemeClr val="accent1"/>
+          </a:fillRef>
+          <a:effectRef idx="0">
+            <a:schemeClr val="accent1"/>
+          </a:effectRef>
+          <a:fontRef idx="minor">
+            <a:schemeClr val="lt1"/>
+          </a:fontRef>
+        </p:style>
+        <p:txBody>
+          <a:bodyPr rtlCol="0" anchor="ctr"/>
+          <a:lstStyle/>
+          <a:p>
+            <a:pPr algn="ctr"/>
+            <a:endParaRPr lang="en-US"/>
+          </a:p>
+        </p:txBody>
+      </p:sp>
+      <p:sp useBgFill="1">
+        <p:nvSpPr>
+          <p:cNvPr id="24" name="Rectangle 14">
+            <a:extLst>
+              <a:ext uri="{FF2B5EF4-FFF2-40B4-BE49-F238E27FC236}">
+                <a16:creationId xmlns:a16="http://schemas.microsoft.com/office/drawing/2014/main" id="{92544CF4-9B52-4A7B-A4B3-88C72729B77D}"/>
+              </a:ext>
+              <a:ext uri="{C183D7F6-B498-43B3-948B-1728B52AA6E4}">
+                <adec:decorative xmlns:adec="http://schemas.microsoft.com/office/drawing/2017/decorative" val="1"/>
+              </a:ext>
+            </a:extLst>
+          </p:cNvPr>
+          <p:cNvSpPr>
+            <a:spLocks noGrp="1" noRot="1" noChangeAspect="1" noMove="1" noResize="1" noEditPoints="1" noAdjustHandles="1" noChangeArrowheads="1" noChangeShapeType="1" noTextEdit="1"/>
+          </p:cNvSpPr>
+          <p:nvPr>
+            <p:extLst>
+              <p:ext uri="{386F3935-93C4-4BCD-93E2-E3B085C9AB24}">
+                <p16:designElem xmlns:p16="http://schemas.microsoft.com/office/powerpoint/2015/main" val="1"/>
+              </p:ext>
+            </p:extLst>
+          </p:nvPr>
+        </p:nvSpPr>
+        <p:spPr>
+          <a:xfrm>
+            <a:off x="558209" y="7126"/>
+            <a:ext cx="11167447" cy="2018806"/>
+          </a:xfrm>
+          <a:prstGeom prst="rect">
+            <a:avLst/>
+          </a:prstGeom>
+          <a:ln w="9525">
+            <a:solidFill>
+              <a:srgbClr val="DEDEDE"/>
+            </a:solidFill>
+          </a:ln>
+          <a:effectLst>
+            <a:outerShdw blurRad="50800" dist="38100" dir="2700000" algn="tl" rotWithShape="0">
+              <a:schemeClr val="bg1">
+                <a:lumMod val="85000"/>
+                <a:alpha val="50000"/>
+              </a:schemeClr>
+            </a:outerShdw>
+          </a:effectLst>
+        </p:spPr>
+        <p:style>
+          <a:lnRef idx="2">
+            <a:schemeClr val="accent1">
+              <a:shade val="50000"/>
+            </a:schemeClr>
+          </a:lnRef>
+          <a:fillRef idx="1">
+            <a:schemeClr val="accent1"/>
+          </a:fillRef>
+          <a:effectRef idx="0">
+            <a:schemeClr val="accent1"/>
+          </a:effectRef>
+          <a:fontRef idx="minor">
+            <a:schemeClr val="lt1"/>
+          </a:fontRef>
+        </p:style>
+        <p:txBody>
+          <a:bodyPr rtlCol="0" anchor="ctr"/>
+          <a:lstStyle/>
+          <a:p>
+            <a:pPr marL="0" marR="0" lvl="0" indent="0" algn="ctr" defTabSz="914400" rtl="0" eaLnBrk="1" fontAlgn="auto" latinLnBrk="0" hangingPunct="1">
+              <a:lnSpc>
+                <a:spcPct val="100000"/>
+              </a:lnSpc>
+              <a:spcBef>
+                <a:spcPts val="0"/>
+              </a:spcBef>
+              <a:spcAft>
+                <a:spcPts val="0"/>
+              </a:spcAft>
+              <a:buClrTx/>
+              <a:buSzTx/>
+              <a:buFontTx/>
+              <a:buNone/>
+              <a:tabLst/>
+              <a:defRPr/>
+            </a:pPr>
+            <a:endParaRPr kumimoji="0" lang="en-US" sz="1800" b="0" i="0" u="none" strike="noStrike" kern="1200" cap="none" spc="0" normalizeH="0" baseline="0" noProof="0">
+              <a:ln>
+                <a:noFill/>
+              </a:ln>
+              <a:solidFill>
+                <a:prstClr val="white"/>
+              </a:solidFill>
+              <a:effectLst/>
+              <a:uLnTx/>
+              <a:uFillTx/>
+              <a:latin typeface="Calibri" panose="020F0502020204030204"/>
+              <a:ea typeface="+mn-ea"/>
+              <a:cs typeface="+mn-cs"/>
+            </a:endParaRPr>
+          </a:p>
+        </p:txBody>
+      </p:sp>
+      <p:sp useBgFill="1">
+        <p:nvSpPr>
+          <p:cNvPr id="25" name="Rectangle 16">
+            <a:extLst>
+              <a:ext uri="{FF2B5EF4-FFF2-40B4-BE49-F238E27FC236}">
+                <a16:creationId xmlns:a16="http://schemas.microsoft.com/office/drawing/2014/main" id="{E75862C5-5C00-4421-BC7B-9B7B86DBC80D}"/>
+              </a:ext>
+              <a:ext uri="{C183D7F6-B498-43B3-948B-1728B52AA6E4}">
+                <adec:decorative xmlns:adec="http://schemas.microsoft.com/office/drawing/2017/decorative" val="1"/>
+              </a:ext>
+            </a:extLst>
+          </p:cNvPr>
+          <p:cNvSpPr>
+            <a:spLocks noGrp="1" noRot="1" noChangeAspect="1" noMove="1" noResize="1" noEditPoints="1" noAdjustHandles="1" noChangeArrowheads="1" noChangeShapeType="1" noTextEdit="1"/>
+          </p:cNvSpPr>
+          <p:nvPr>
+            <p:extLst>
+              <p:ext uri="{386F3935-93C4-4BCD-93E2-E3B085C9AB24}">
+                <p16:designElem xmlns:p16="http://schemas.microsoft.com/office/powerpoint/2015/main" val="1"/>
+              </p:ext>
+            </p:extLst>
+          </p:nvPr>
+        </p:nvSpPr>
+        <p:spPr>
+          <a:xfrm>
+            <a:off x="566928" y="0"/>
+            <a:ext cx="11155680" cy="2011680"/>
+          </a:xfrm>
+          <a:prstGeom prst="rect">
+            <a:avLst/>
+          </a:prstGeom>
+          <a:ln w="9525">
+            <a:noFill/>
+          </a:ln>
+          <a:effectLst/>
+        </p:spPr>
+        <p:style>
+          <a:lnRef idx="2">
+            <a:schemeClr val="accent1">
+              <a:shade val="50000"/>
+            </a:schemeClr>
+          </a:lnRef>
+          <a:fillRef idx="1">
+            <a:schemeClr val="accent1"/>
+          </a:fillRef>
+          <a:effectRef idx="0">
+            <a:schemeClr val="accent1"/>
+          </a:effectRef>
+          <a:fontRef idx="minor">
+            <a:schemeClr val="lt1"/>
+          </a:fontRef>
+        </p:style>
+        <p:txBody>
+          <a:bodyPr rtlCol="0" anchor="ctr"/>
+          <a:lstStyle/>
+          <a:p>
+            <a:pPr marL="0" marR="0" lvl="0" indent="0" algn="ctr" defTabSz="914400" rtl="0" eaLnBrk="1" fontAlgn="auto" latinLnBrk="0" hangingPunct="1">
+              <a:lnSpc>
+                <a:spcPct val="100000"/>
+              </a:lnSpc>
+              <a:spcBef>
+                <a:spcPts val="0"/>
+              </a:spcBef>
+              <a:spcAft>
+                <a:spcPts val="0"/>
+              </a:spcAft>
+              <a:buClrTx/>
+              <a:buSzTx/>
+              <a:buFontTx/>
+              <a:buNone/>
+              <a:tabLst/>
+              <a:defRPr/>
+            </a:pPr>
+            <a:endParaRPr kumimoji="0" lang="en-US" sz="1800" b="0" i="0" u="none" strike="noStrike" kern="1200" cap="none" spc="0" normalizeH="0" baseline="0" noProof="0">
+              <a:ln>
+                <a:noFill/>
+              </a:ln>
+              <a:solidFill>
+                <a:prstClr val="white"/>
+              </a:solidFill>
+              <a:effectLst/>
+              <a:uLnTx/>
+              <a:uFillTx/>
+              <a:latin typeface="Calibri" panose="020F0502020204030204"/>
+              <a:ea typeface="+mn-ea"/>
+              <a:cs typeface="+mn-cs"/>
+            </a:endParaRPr>
+          </a:p>
+        </p:txBody>
+      </p:sp>
       <p:sp>
         <p:nvSpPr>
           <p:cNvPr id="2" name="Title 1">
@@ -8149,25 +8438,178 @@
             <p:ph type="title"/>
           </p:nvPr>
         </p:nvSpPr>
-        <p:spPr/>
-        <p:txBody>
-          <a:bodyPr/>
+        <p:spPr>
+          <a:xfrm>
+            <a:off x="1115568" y="548640"/>
+            <a:ext cx="10168128" cy="1179576"/>
+          </a:xfrm>
+        </p:spPr>
+        <p:txBody>
+          <a:bodyPr vert="horz" lIns="91440" tIns="45720" rIns="91440" bIns="45720" rtlCol="0" anchor="ctr">
+            <a:normAutofit/>
+          </a:bodyPr>
           <a:lstStyle/>
           <a:p>
             <a:r>
-              <a:rPr lang="en-US" dirty="0"/>
+              <a:rPr lang="en-US" sz="4000" kern="1200" dirty="0">
+                <a:solidFill>
+                  <a:schemeClr val="tx1"/>
+                </a:solidFill>
+                <a:latin typeface="+mj-lt"/>
+                <a:ea typeface="+mj-ea"/>
+                <a:cs typeface="+mj-cs"/>
+              </a:rPr>
               <a:t>Experimental Results</a:t>
             </a:r>
-            <a:endParaRPr lang="en-GB" dirty="0"/>
           </a:p>
         </p:txBody>
       </p:sp>
       <p:sp>
         <p:nvSpPr>
-          <p:cNvPr id="3" name="TextBox 2">
-            <a:extLst>
-              <a:ext uri="{FF2B5EF4-FFF2-40B4-BE49-F238E27FC236}">
-                <a16:creationId xmlns:a16="http://schemas.microsoft.com/office/drawing/2014/main" id="{3657C692-D500-1670-527E-FB2D1A135A6C}"/>
+          <p:cNvPr id="26" name="Rectangle 18">
+            <a:extLst>
+              <a:ext uri="{FF2B5EF4-FFF2-40B4-BE49-F238E27FC236}">
+                <a16:creationId xmlns:a16="http://schemas.microsoft.com/office/drawing/2014/main" id="{089440EF-9BE9-4AE9-8C28-00B02296CDB6}"/>
+              </a:ext>
+              <a:ext uri="{C183D7F6-B498-43B3-948B-1728B52AA6E4}">
+                <adec:decorative xmlns:adec="http://schemas.microsoft.com/office/drawing/2017/decorative" val="1"/>
+              </a:ext>
+            </a:extLst>
+          </p:cNvPr>
+          <p:cNvSpPr>
+            <a:spLocks noGrp="1" noRot="1" noChangeAspect="1" noMove="1" noResize="1" noEditPoints="1" noAdjustHandles="1" noChangeArrowheads="1" noChangeShapeType="1" noTextEdit="1"/>
+          </p:cNvSpPr>
+          <p:nvPr>
+            <p:extLst>
+              <p:ext uri="{386F3935-93C4-4BCD-93E2-E3B085C9AB24}">
+                <p16:designElem xmlns:p16="http://schemas.microsoft.com/office/powerpoint/2015/main" val="1"/>
+              </p:ext>
+            </p:extLst>
+          </p:nvPr>
+        </p:nvSpPr>
+        <p:spPr>
+          <a:xfrm>
+            <a:off x="498834" y="758952"/>
+            <a:ext cx="128016" cy="704088"/>
+          </a:xfrm>
+          <a:prstGeom prst="rect">
+            <a:avLst/>
+          </a:prstGeom>
+          <a:solidFill>
+            <a:schemeClr val="accent2"/>
+          </a:solidFill>
+          <a:ln>
+            <a:noFill/>
+          </a:ln>
+        </p:spPr>
+        <p:style>
+          <a:lnRef idx="2">
+            <a:schemeClr val="accent1">
+              <a:shade val="50000"/>
+            </a:schemeClr>
+          </a:lnRef>
+          <a:fillRef idx="1">
+            <a:schemeClr val="accent1"/>
+          </a:fillRef>
+          <a:effectRef idx="0">
+            <a:schemeClr val="accent1"/>
+          </a:effectRef>
+          <a:fontRef idx="minor">
+            <a:schemeClr val="lt1"/>
+          </a:fontRef>
+        </p:style>
+        <p:txBody>
+          <a:bodyPr rtlCol="0" anchor="ctr"/>
+          <a:lstStyle/>
+          <a:p>
+            <a:pPr algn="ctr"/>
+            <a:endParaRPr lang="en-US">
+              <a:solidFill>
+                <a:prstClr val="white"/>
+              </a:solidFill>
+              <a:latin typeface="Calibri" panose="020F0502020204030204"/>
+            </a:endParaRPr>
+          </a:p>
+        </p:txBody>
+      </p:sp>
+      <p:pic>
+        <p:nvPicPr>
+          <p:cNvPr id="6" name="Picture 5" descr="Uniformed search on easy level (nodes)">
+            <a:extLst>
+              <a:ext uri="{FF2B5EF4-FFF2-40B4-BE49-F238E27FC236}">
+                <a16:creationId xmlns:a16="http://schemas.microsoft.com/office/drawing/2014/main" id="{34D95D2B-BAE1-4D8C-54DA-1B78FF19179B}"/>
+              </a:ext>
+            </a:extLst>
+          </p:cNvPr>
+          <p:cNvPicPr>
+            <a:picLocks noChangeAspect="1"/>
+          </p:cNvPicPr>
+          <p:nvPr/>
+        </p:nvPicPr>
+        <p:blipFill>
+          <a:blip r:embed="rId2">
+            <a:extLst>
+              <a:ext uri="{28A0092B-C50C-407E-A947-70E740481C1C}">
+                <a14:useLocalDpi xmlns:a14="http://schemas.microsoft.com/office/drawing/2010/main" val="0"/>
+              </a:ext>
+            </a:extLst>
+          </a:blip>
+          <a:stretch>
+            <a:fillRect/>
+          </a:stretch>
+        </p:blipFill>
+        <p:spPr>
+          <a:xfrm>
+            <a:off x="1057868" y="2001212"/>
+            <a:ext cx="10168128" cy="2424831"/>
+          </a:xfrm>
+          <a:prstGeom prst="rect">
+            <a:avLst/>
+          </a:prstGeom>
+        </p:spPr>
+      </p:pic>
+      <p:pic>
+        <p:nvPicPr>
+          <p:cNvPr id="10" name="Picture 9" descr="Chart, bar chart&#10;&#10;Description automatically generated">
+            <a:extLst>
+              <a:ext uri="{FF2B5EF4-FFF2-40B4-BE49-F238E27FC236}">
+                <a16:creationId xmlns:a16="http://schemas.microsoft.com/office/drawing/2014/main" id="{CF71D2E0-1628-663A-0C4E-253323709E45}"/>
+              </a:ext>
+            </a:extLst>
+          </p:cNvPr>
+          <p:cNvPicPr>
+            <a:picLocks noChangeAspect="1"/>
+          </p:cNvPicPr>
+          <p:nvPr/>
+        </p:nvPicPr>
+        <p:blipFill>
+          <a:blip r:embed="rId3">
+            <a:extLst>
+              <a:ext uri="{28A0092B-C50C-407E-A947-70E740481C1C}">
+                <a14:useLocalDpi xmlns:a14="http://schemas.microsoft.com/office/drawing/2010/main" val="0"/>
+              </a:ext>
+            </a:extLst>
+          </a:blip>
+          <a:stretch>
+            <a:fillRect/>
+          </a:stretch>
+        </p:blipFill>
+        <p:spPr>
+          <a:xfrm>
+            <a:off x="1011937" y="4426043"/>
+            <a:ext cx="10168125" cy="2424831"/>
+          </a:xfrm>
+          <a:prstGeom prst="rect">
+            <a:avLst/>
+          </a:prstGeom>
+        </p:spPr>
+      </p:pic>
+      <p:sp>
+        <p:nvSpPr>
+          <p:cNvPr id="11" name="TextBox 10">
+            <a:extLst>
+              <a:ext uri="{FF2B5EF4-FFF2-40B4-BE49-F238E27FC236}">
+                <a16:creationId xmlns:a16="http://schemas.microsoft.com/office/drawing/2014/main" id="{368B0B0F-B985-4537-FF92-0A79C933BA5A}"/>
               </a:ext>
             </a:extLst>
           </p:cNvPr>
@@ -8176,8 +8618,8 @@
         </p:nvSpPr>
         <p:spPr>
           <a:xfrm>
-            <a:off x="1900518" y="2613212"/>
-            <a:ext cx="7171764" cy="369332"/>
+            <a:off x="1234911" y="1728216"/>
+            <a:ext cx="1646989" cy="369332"/>
           </a:xfrm>
           <a:prstGeom prst="rect">
             <a:avLst/>
@@ -8185,76 +8627,22 @@
           <a:noFill/>
         </p:spPr>
         <p:txBody>
-          <a:bodyPr wrap="square" rtlCol="0">
+          <a:bodyPr wrap="none" rtlCol="0">
             <a:spAutoFit/>
           </a:bodyPr>
           <a:lstStyle/>
           <a:p>
             <a:r>
               <a:rPr lang="en-US" dirty="0"/>
-              <a:t>1 </a:t>
-            </a:r>
-            <a:r>
-              <a:rPr lang="en-US" dirty="0" err="1"/>
-              <a:t>grafico</a:t>
-            </a:r>
-            <a:r>
-              <a:rPr lang="en-US" dirty="0"/>
-              <a:t> </a:t>
-            </a:r>
-            <a:r>
-              <a:rPr lang="en-US" dirty="0" err="1"/>
-              <a:t>sobre</a:t>
-            </a:r>
-            <a:r>
-              <a:rPr lang="en-US" dirty="0"/>
-              <a:t> uninformed search e outro </a:t>
-            </a:r>
-            <a:r>
-              <a:rPr lang="en-US" dirty="0" err="1"/>
-              <a:t>sobre</a:t>
-            </a:r>
-            <a:r>
-              <a:rPr lang="en-US" dirty="0"/>
-              <a:t> informed search</a:t>
-            </a:r>
-            <a:endParaRPr lang="en-GB" dirty="0"/>
-          </a:p>
-        </p:txBody>
-      </p:sp>
-      <p:sp>
-        <p:nvSpPr>
-          <p:cNvPr id="4" name="TextBox 3">
-            <a:extLst>
-              <a:ext uri="{FF2B5EF4-FFF2-40B4-BE49-F238E27FC236}">
-                <a16:creationId xmlns:a16="http://schemas.microsoft.com/office/drawing/2014/main" id="{43E30558-AD42-A188-4378-9F93BBC390EA}"/>
-              </a:ext>
-            </a:extLst>
-          </p:cNvPr>
-          <p:cNvSpPr txBox="1"/>
-          <p:nvPr/>
-        </p:nvSpPr>
-        <p:spPr>
-          <a:xfrm>
-            <a:off x="1748118" y="5221941"/>
-            <a:ext cx="8574741" cy="369332"/>
-          </a:xfrm>
-          <a:prstGeom prst="rect">
-            <a:avLst/>
-          </a:prstGeom>
-          <a:noFill/>
-        </p:spPr>
-        <p:txBody>
-          <a:bodyPr wrap="square" rtlCol="0">
-            <a:spAutoFit/>
-          </a:bodyPr>
-          <a:lstStyle/>
-          <a:p>
-            <a:r>
-              <a:rPr lang="en-US" dirty="0"/>
-              <a:t>Link para o html</a:t>
-            </a:r>
-            <a:endParaRPr lang="en-GB" dirty="0"/>
+              <a:t>Full report </a:t>
+            </a:r>
+            <a:r>
+              <a:rPr lang="en-US" dirty="0">
+                <a:hlinkClick r:id="rId4" action="ppaction://hlinkfile"/>
+              </a:rPr>
+              <a:t>here</a:t>
+            </a:r>
+            <a:endParaRPr lang="en-US" dirty="0"/>
           </a:p>
         </p:txBody>
       </p:sp>
@@ -8274,6 +8662,14 @@
 <file path=ppt/slides/slide9.xml><?xml version="1.0" encoding="utf-8"?>
 <p:sld xmlns:a="http://schemas.openxmlformats.org/drawingml/2006/main" xmlns:r="http://schemas.openxmlformats.org/officeDocument/2006/relationships" xmlns:p="http://schemas.openxmlformats.org/presentationml/2006/main">
   <p:cSld>
+    <p:bg>
+      <p:bgPr>
+        <a:solidFill>
+          <a:schemeClr val="bg1"/>
+        </a:solidFill>
+        <a:effectLst/>
+      </p:bgPr>
+    </p:bg>
     <p:spTree>
       <p:nvGrpSpPr>
         <p:cNvPr id="1" name=""/>
@@ -8288,80 +8684,819 @@
           <a:chExt cx="0" cy="0"/>
         </a:xfrm>
       </p:grpSpPr>
-      <p:sp>
-        <p:nvSpPr>
-          <p:cNvPr id="2" name="Title 1">
-            <a:extLst>
-              <a:ext uri="{FF2B5EF4-FFF2-40B4-BE49-F238E27FC236}">
-                <a16:creationId xmlns:a16="http://schemas.microsoft.com/office/drawing/2014/main" id="{DDEA2501-2C54-6AFE-2C1C-F17A493DF165}"/>
-              </a:ext>
-            </a:extLst>
-          </p:cNvPr>
-          <p:cNvSpPr>
-            <a:spLocks noGrp="1"/>
-          </p:cNvSpPr>
-          <p:nvPr>
-            <p:ph type="title"/>
-          </p:nvPr>
-        </p:nvSpPr>
-        <p:spPr/>
-        <p:txBody>
-          <a:bodyPr/>
-          <a:lstStyle/>
-          <a:p>
-            <a:r>
-              <a:rPr lang="en-US" dirty="0"/>
-              <a:t>Conclusions</a:t>
-            </a:r>
-            <a:endParaRPr lang="en-GB" dirty="0"/>
-          </a:p>
-        </p:txBody>
-      </p:sp>
-      <p:sp>
-        <p:nvSpPr>
-          <p:cNvPr id="5" name="TextBox 4">
-            <a:extLst>
-              <a:ext uri="{FF2B5EF4-FFF2-40B4-BE49-F238E27FC236}">
-                <a16:creationId xmlns:a16="http://schemas.microsoft.com/office/drawing/2014/main" id="{37873CC5-5CDF-8DA5-4F00-6976A11C2424}"/>
-              </a:ext>
-            </a:extLst>
-          </p:cNvPr>
-          <p:cNvSpPr txBox="1"/>
-          <p:nvPr/>
+      <p:sp useBgFill="1">
+        <p:nvSpPr>
+          <p:cNvPr id="10" name="Rectangle 9">
+            <a:extLst>
+              <a:ext uri="{FF2B5EF4-FFF2-40B4-BE49-F238E27FC236}">
+                <a16:creationId xmlns:a16="http://schemas.microsoft.com/office/drawing/2014/main" id="{100EDD19-6802-4EC3-95CE-CFFAB042CFD6}"/>
+              </a:ext>
+              <a:ext uri="{C183D7F6-B498-43B3-948B-1728B52AA6E4}">
+                <adec:decorative xmlns:adec="http://schemas.microsoft.com/office/drawing/2017/decorative" val="1"/>
+              </a:ext>
+            </a:extLst>
+          </p:cNvPr>
+          <p:cNvSpPr>
+            <a:spLocks noGrp="1" noRot="1" noChangeAspect="1" noMove="1" noResize="1" noEditPoints="1" noAdjustHandles="1" noChangeArrowheads="1" noChangeShapeType="1" noTextEdit="1"/>
+          </p:cNvSpPr>
+          <p:nvPr>
+            <p:extLst>
+              <p:ext uri="{386F3935-93C4-4BCD-93E2-E3B085C9AB24}">
+                <p16:designElem xmlns:p16="http://schemas.microsoft.com/office/powerpoint/2015/main" val="1"/>
+              </p:ext>
+            </p:extLst>
+          </p:nvPr>
         </p:nvSpPr>
         <p:spPr>
           <a:xfrm>
-            <a:off x="838200" y="1690688"/>
-            <a:ext cx="10515600" cy="3693319"/>
+            <a:off x="0" y="0"/>
+            <a:ext cx="12188952" cy="6858000"/>
           </a:xfrm>
           <a:prstGeom prst="rect">
             <a:avLst/>
           </a:prstGeom>
-          <a:noFill/>
+          <a:ln>
+            <a:noFill/>
+          </a:ln>
         </p:spPr>
-        <p:txBody>
-          <a:bodyPr wrap="square" rtlCol="0">
-            <a:spAutoFit/>
+        <p:style>
+          <a:lnRef idx="2">
+            <a:schemeClr val="accent1">
+              <a:shade val="50000"/>
+            </a:schemeClr>
+          </a:lnRef>
+          <a:fillRef idx="1">
+            <a:schemeClr val="accent1"/>
+          </a:fillRef>
+          <a:effectRef idx="0">
+            <a:schemeClr val="accent1"/>
+          </a:effectRef>
+          <a:fontRef idx="minor">
+            <a:schemeClr val="lt1"/>
+          </a:fontRef>
+        </p:style>
+        <p:txBody>
+          <a:bodyPr rtlCol="0" anchor="ctr"/>
+          <a:lstStyle/>
+          <a:p>
+            <a:pPr algn="ctr"/>
+            <a:endParaRPr lang="en-US"/>
+          </a:p>
+        </p:txBody>
+      </p:sp>
+      <p:sp>
+        <p:nvSpPr>
+          <p:cNvPr id="2" name="Title 1">
+            <a:extLst>
+              <a:ext uri="{FF2B5EF4-FFF2-40B4-BE49-F238E27FC236}">
+                <a16:creationId xmlns:a16="http://schemas.microsoft.com/office/drawing/2014/main" id="{DDEA2501-2C54-6AFE-2C1C-F17A493DF165}"/>
+              </a:ext>
+            </a:extLst>
+          </p:cNvPr>
+          <p:cNvSpPr>
+            <a:spLocks noGrp="1"/>
+          </p:cNvSpPr>
+          <p:nvPr>
+            <p:ph type="title"/>
+          </p:nvPr>
+        </p:nvSpPr>
+        <p:spPr>
+          <a:xfrm>
+            <a:off x="838200" y="365125"/>
+            <a:ext cx="10515600" cy="1325563"/>
+          </a:xfrm>
+        </p:spPr>
+        <p:txBody>
+          <a:bodyPr vert="horz" lIns="91440" tIns="45720" rIns="91440" bIns="45720" rtlCol="0" anchor="ctr">
+            <a:normAutofit/>
           </a:bodyPr>
           <a:lstStyle/>
           <a:p>
             <a:r>
-              <a:rPr lang="en-US" dirty="0"/>
-              <a:t>	In conclusion, we implemented multiple search algorithms in our video game "Block Escape", including BFS, DFS, IDS, A, Weighted A and Greedy. </a:t>
-            </a:r>
-          </a:p>
-          <a:p>
-            <a:r>
-              <a:rPr lang="en-US" dirty="0"/>
+              <a:rPr lang="en-US" sz="5400" kern="1200">
+                <a:solidFill>
+                  <a:schemeClr val="tx1"/>
+                </a:solidFill>
+                <a:latin typeface="+mj-lt"/>
+                <a:ea typeface="+mj-ea"/>
+                <a:cs typeface="+mj-cs"/>
+              </a:rPr>
+              <a:t>Conclusions</a:t>
+            </a:r>
+          </a:p>
+        </p:txBody>
+      </p:sp>
+      <p:sp>
+        <p:nvSpPr>
+          <p:cNvPr id="12" name="sketch line">
+            <a:extLst>
+              <a:ext uri="{FF2B5EF4-FFF2-40B4-BE49-F238E27FC236}">
+                <a16:creationId xmlns:a16="http://schemas.microsoft.com/office/drawing/2014/main" id="{DB17E863-922E-4C26-BD64-E8FD41D28661}"/>
+              </a:ext>
+              <a:ext uri="{C183D7F6-B498-43B3-948B-1728B52AA6E4}">
+                <adec:decorative xmlns:adec="http://schemas.microsoft.com/office/drawing/2017/decorative" val="1"/>
+              </a:ext>
+            </a:extLst>
+          </p:cNvPr>
+          <p:cNvSpPr>
+            <a:spLocks noGrp="1" noRot="1" noChangeAspect="1" noMove="1" noResize="1" noEditPoints="1" noAdjustHandles="1" noChangeArrowheads="1" noChangeShapeType="1" noTextEdit="1"/>
+          </p:cNvSpPr>
+          <p:nvPr>
+            <p:extLst>
+              <p:ext uri="{386F3935-93C4-4BCD-93E2-E3B085C9AB24}">
+                <p16:designElem xmlns:p16="http://schemas.microsoft.com/office/powerpoint/2015/main" val="1"/>
+              </p:ext>
+            </p:extLst>
+          </p:nvPr>
+        </p:nvSpPr>
+        <p:spPr>
+          <a:xfrm>
+            <a:off x="669036" y="1677373"/>
+            <a:ext cx="10853928" cy="18288"/>
+          </a:xfrm>
+          <a:custGeom>
+            <a:avLst/>
+            <a:gdLst>
+              <a:gd name="connsiteX0" fmla="*/ 0 w 10853928"/>
+              <a:gd name="connsiteY0" fmla="*/ 0 h 18288"/>
+              <a:gd name="connsiteX1" fmla="*/ 461292 w 10853928"/>
+              <a:gd name="connsiteY1" fmla="*/ 0 h 18288"/>
+              <a:gd name="connsiteX2" fmla="*/ 1139662 w 10853928"/>
+              <a:gd name="connsiteY2" fmla="*/ 0 h 18288"/>
+              <a:gd name="connsiteX3" fmla="*/ 1926572 w 10853928"/>
+              <a:gd name="connsiteY3" fmla="*/ 0 h 18288"/>
+              <a:gd name="connsiteX4" fmla="*/ 2279325 w 10853928"/>
+              <a:gd name="connsiteY4" fmla="*/ 0 h 18288"/>
+              <a:gd name="connsiteX5" fmla="*/ 2632078 w 10853928"/>
+              <a:gd name="connsiteY5" fmla="*/ 0 h 18288"/>
+              <a:gd name="connsiteX6" fmla="*/ 3527527 w 10853928"/>
+              <a:gd name="connsiteY6" fmla="*/ 0 h 18288"/>
+              <a:gd name="connsiteX7" fmla="*/ 4205897 w 10853928"/>
+              <a:gd name="connsiteY7" fmla="*/ 0 h 18288"/>
+              <a:gd name="connsiteX8" fmla="*/ 4558650 w 10853928"/>
+              <a:gd name="connsiteY8" fmla="*/ 0 h 18288"/>
+              <a:gd name="connsiteX9" fmla="*/ 5237020 w 10853928"/>
+              <a:gd name="connsiteY9" fmla="*/ 0 h 18288"/>
+              <a:gd name="connsiteX10" fmla="*/ 6132469 w 10853928"/>
+              <a:gd name="connsiteY10" fmla="*/ 0 h 18288"/>
+              <a:gd name="connsiteX11" fmla="*/ 6702301 w 10853928"/>
+              <a:gd name="connsiteY11" fmla="*/ 0 h 18288"/>
+              <a:gd name="connsiteX12" fmla="*/ 7272132 w 10853928"/>
+              <a:gd name="connsiteY12" fmla="*/ 0 h 18288"/>
+              <a:gd name="connsiteX13" fmla="*/ 7950502 w 10853928"/>
+              <a:gd name="connsiteY13" fmla="*/ 0 h 18288"/>
+              <a:gd name="connsiteX14" fmla="*/ 8737412 w 10853928"/>
+              <a:gd name="connsiteY14" fmla="*/ 0 h 18288"/>
+              <a:gd name="connsiteX15" fmla="*/ 9524322 w 10853928"/>
+              <a:gd name="connsiteY15" fmla="*/ 0 h 18288"/>
+              <a:gd name="connsiteX16" fmla="*/ 10853928 w 10853928"/>
+              <a:gd name="connsiteY16" fmla="*/ 0 h 18288"/>
+              <a:gd name="connsiteX17" fmla="*/ 10853928 w 10853928"/>
+              <a:gd name="connsiteY17" fmla="*/ 18288 h 18288"/>
+              <a:gd name="connsiteX18" fmla="*/ 10392636 w 10853928"/>
+              <a:gd name="connsiteY18" fmla="*/ 18288 h 18288"/>
+              <a:gd name="connsiteX19" fmla="*/ 9497187 w 10853928"/>
+              <a:gd name="connsiteY19" fmla="*/ 18288 h 18288"/>
+              <a:gd name="connsiteX20" fmla="*/ 8818817 w 10853928"/>
+              <a:gd name="connsiteY20" fmla="*/ 18288 h 18288"/>
+              <a:gd name="connsiteX21" fmla="*/ 8466064 w 10853928"/>
+              <a:gd name="connsiteY21" fmla="*/ 18288 h 18288"/>
+              <a:gd name="connsiteX22" fmla="*/ 7787693 w 10853928"/>
+              <a:gd name="connsiteY22" fmla="*/ 18288 h 18288"/>
+              <a:gd name="connsiteX23" fmla="*/ 7217862 w 10853928"/>
+              <a:gd name="connsiteY23" fmla="*/ 18288 h 18288"/>
+              <a:gd name="connsiteX24" fmla="*/ 6648031 w 10853928"/>
+              <a:gd name="connsiteY24" fmla="*/ 18288 h 18288"/>
+              <a:gd name="connsiteX25" fmla="*/ 6078200 w 10853928"/>
+              <a:gd name="connsiteY25" fmla="*/ 18288 h 18288"/>
+              <a:gd name="connsiteX26" fmla="*/ 5508368 w 10853928"/>
+              <a:gd name="connsiteY26" fmla="*/ 18288 h 18288"/>
+              <a:gd name="connsiteX27" fmla="*/ 4721459 w 10853928"/>
+              <a:gd name="connsiteY27" fmla="*/ 18288 h 18288"/>
+              <a:gd name="connsiteX28" fmla="*/ 4043088 w 10853928"/>
+              <a:gd name="connsiteY28" fmla="*/ 18288 h 18288"/>
+              <a:gd name="connsiteX29" fmla="*/ 3690336 w 10853928"/>
+              <a:gd name="connsiteY29" fmla="*/ 18288 h 18288"/>
+              <a:gd name="connsiteX30" fmla="*/ 3120504 w 10853928"/>
+              <a:gd name="connsiteY30" fmla="*/ 18288 h 18288"/>
+              <a:gd name="connsiteX31" fmla="*/ 2333595 w 10853928"/>
+              <a:gd name="connsiteY31" fmla="*/ 18288 h 18288"/>
+              <a:gd name="connsiteX32" fmla="*/ 1872303 w 10853928"/>
+              <a:gd name="connsiteY32" fmla="*/ 18288 h 18288"/>
+              <a:gd name="connsiteX33" fmla="*/ 976854 w 10853928"/>
+              <a:gd name="connsiteY33" fmla="*/ 18288 h 18288"/>
+              <a:gd name="connsiteX34" fmla="*/ 0 w 10853928"/>
+              <a:gd name="connsiteY34" fmla="*/ 18288 h 18288"/>
+              <a:gd name="connsiteX35" fmla="*/ 0 w 10853928"/>
+              <a:gd name="connsiteY35" fmla="*/ 0 h 18288"/>
+            </a:gdLst>
+            <a:ahLst/>
+            <a:cxnLst>
+              <a:cxn ang="0">
+                <a:pos x="connsiteX0" y="connsiteY0"/>
+              </a:cxn>
+              <a:cxn ang="0">
+                <a:pos x="connsiteX1" y="connsiteY1"/>
+              </a:cxn>
+              <a:cxn ang="0">
+                <a:pos x="connsiteX2" y="connsiteY2"/>
+              </a:cxn>
+              <a:cxn ang="0">
+                <a:pos x="connsiteX3" y="connsiteY3"/>
+              </a:cxn>
+              <a:cxn ang="0">
+                <a:pos x="connsiteX4" y="connsiteY4"/>
+              </a:cxn>
+              <a:cxn ang="0">
+                <a:pos x="connsiteX5" y="connsiteY5"/>
+              </a:cxn>
+              <a:cxn ang="0">
+                <a:pos x="connsiteX6" y="connsiteY6"/>
+              </a:cxn>
+              <a:cxn ang="0">
+                <a:pos x="connsiteX7" y="connsiteY7"/>
+              </a:cxn>
+              <a:cxn ang="0">
+                <a:pos x="connsiteX8" y="connsiteY8"/>
+              </a:cxn>
+              <a:cxn ang="0">
+                <a:pos x="connsiteX9" y="connsiteY9"/>
+              </a:cxn>
+              <a:cxn ang="0">
+                <a:pos x="connsiteX10" y="connsiteY10"/>
+              </a:cxn>
+              <a:cxn ang="0">
+                <a:pos x="connsiteX11" y="connsiteY11"/>
+              </a:cxn>
+              <a:cxn ang="0">
+                <a:pos x="connsiteX12" y="connsiteY12"/>
+              </a:cxn>
+              <a:cxn ang="0">
+                <a:pos x="connsiteX13" y="connsiteY13"/>
+              </a:cxn>
+              <a:cxn ang="0">
+                <a:pos x="connsiteX14" y="connsiteY14"/>
+              </a:cxn>
+              <a:cxn ang="0">
+                <a:pos x="connsiteX15" y="connsiteY15"/>
+              </a:cxn>
+              <a:cxn ang="0">
+                <a:pos x="connsiteX16" y="connsiteY16"/>
+              </a:cxn>
+              <a:cxn ang="0">
+                <a:pos x="connsiteX17" y="connsiteY17"/>
+              </a:cxn>
+              <a:cxn ang="0">
+                <a:pos x="connsiteX18" y="connsiteY18"/>
+              </a:cxn>
+              <a:cxn ang="0">
+                <a:pos x="connsiteX19" y="connsiteY19"/>
+              </a:cxn>
+              <a:cxn ang="0">
+                <a:pos x="connsiteX20" y="connsiteY20"/>
+              </a:cxn>
+              <a:cxn ang="0">
+                <a:pos x="connsiteX21" y="connsiteY21"/>
+              </a:cxn>
+              <a:cxn ang="0">
+                <a:pos x="connsiteX22" y="connsiteY22"/>
+              </a:cxn>
+              <a:cxn ang="0">
+                <a:pos x="connsiteX23" y="connsiteY23"/>
+              </a:cxn>
+              <a:cxn ang="0">
+                <a:pos x="connsiteX24" y="connsiteY24"/>
+              </a:cxn>
+              <a:cxn ang="0">
+                <a:pos x="connsiteX25" y="connsiteY25"/>
+              </a:cxn>
+              <a:cxn ang="0">
+                <a:pos x="connsiteX26" y="connsiteY26"/>
+              </a:cxn>
+              <a:cxn ang="0">
+                <a:pos x="connsiteX27" y="connsiteY27"/>
+              </a:cxn>
+              <a:cxn ang="0">
+                <a:pos x="connsiteX28" y="connsiteY28"/>
+              </a:cxn>
+              <a:cxn ang="0">
+                <a:pos x="connsiteX29" y="connsiteY29"/>
+              </a:cxn>
+              <a:cxn ang="0">
+                <a:pos x="connsiteX30" y="connsiteY30"/>
+              </a:cxn>
+              <a:cxn ang="0">
+                <a:pos x="connsiteX31" y="connsiteY31"/>
+              </a:cxn>
+              <a:cxn ang="0">
+                <a:pos x="connsiteX32" y="connsiteY32"/>
+              </a:cxn>
+              <a:cxn ang="0">
+                <a:pos x="connsiteX33" y="connsiteY33"/>
+              </a:cxn>
+              <a:cxn ang="0">
+                <a:pos x="connsiteX34" y="connsiteY34"/>
+              </a:cxn>
+              <a:cxn ang="0">
+                <a:pos x="connsiteX35" y="connsiteY35"/>
+              </a:cxn>
+            </a:cxnLst>
+            <a:rect l="l" t="t" r="r" b="b"/>
+            <a:pathLst>
+              <a:path w="10853928" h="18288" fill="none" extrusionOk="0">
+                <a:moveTo>
+                  <a:pt x="0" y="0"/>
+                </a:moveTo>
+                <a:cubicBezTo>
+                  <a:pt x="146993" y="-19076"/>
+                  <a:pt x="347684" y="-4790"/>
+                  <a:pt x="461292" y="0"/>
+                </a:cubicBezTo>
+                <a:cubicBezTo>
+                  <a:pt x="574900" y="4790"/>
+                  <a:pt x="808367" y="19821"/>
+                  <a:pt x="1139662" y="0"/>
+                </a:cubicBezTo>
+                <a:cubicBezTo>
+                  <a:pt x="1470957" y="-19821"/>
+                  <a:pt x="1627405" y="5721"/>
+                  <a:pt x="1926572" y="0"/>
+                </a:cubicBezTo>
+                <a:cubicBezTo>
+                  <a:pt x="2225739" y="-5721"/>
+                  <a:pt x="2137730" y="-3235"/>
+                  <a:pt x="2279325" y="0"/>
+                </a:cubicBezTo>
+                <a:cubicBezTo>
+                  <a:pt x="2420920" y="3235"/>
+                  <a:pt x="2456518" y="9685"/>
+                  <a:pt x="2632078" y="0"/>
+                </a:cubicBezTo>
+                <a:cubicBezTo>
+                  <a:pt x="2807638" y="-9685"/>
+                  <a:pt x="3211516" y="-43007"/>
+                  <a:pt x="3527527" y="0"/>
+                </a:cubicBezTo>
+                <a:cubicBezTo>
+                  <a:pt x="3843538" y="43007"/>
+                  <a:pt x="4058833" y="22042"/>
+                  <a:pt x="4205897" y="0"/>
+                </a:cubicBezTo>
+                <a:cubicBezTo>
+                  <a:pt x="4352961" y="-22042"/>
+                  <a:pt x="4474805" y="-11846"/>
+                  <a:pt x="4558650" y="0"/>
+                </a:cubicBezTo>
+                <a:cubicBezTo>
+                  <a:pt x="4642495" y="11846"/>
+                  <a:pt x="5041928" y="-6069"/>
+                  <a:pt x="5237020" y="0"/>
+                </a:cubicBezTo>
+                <a:cubicBezTo>
+                  <a:pt x="5432112" y="6069"/>
+                  <a:pt x="5943266" y="-17479"/>
+                  <a:pt x="6132469" y="0"/>
+                </a:cubicBezTo>
+                <a:cubicBezTo>
+                  <a:pt x="6321672" y="17479"/>
+                  <a:pt x="6483872" y="26234"/>
+                  <a:pt x="6702301" y="0"/>
+                </a:cubicBezTo>
+                <a:cubicBezTo>
+                  <a:pt x="6920730" y="-26234"/>
+                  <a:pt x="6991194" y="-15156"/>
+                  <a:pt x="7272132" y="0"/>
+                </a:cubicBezTo>
+                <a:cubicBezTo>
+                  <a:pt x="7553070" y="15156"/>
+                  <a:pt x="7684444" y="-32961"/>
+                  <a:pt x="7950502" y="0"/>
+                </a:cubicBezTo>
+                <a:cubicBezTo>
+                  <a:pt x="8216560" y="32961"/>
+                  <a:pt x="8493290" y="-10491"/>
+                  <a:pt x="8737412" y="0"/>
+                </a:cubicBezTo>
+                <a:cubicBezTo>
+                  <a:pt x="8981534" y="10491"/>
+                  <a:pt x="9191586" y="-13899"/>
+                  <a:pt x="9524322" y="0"/>
+                </a:cubicBezTo>
+                <a:cubicBezTo>
+                  <a:pt x="9857058" y="13899"/>
+                  <a:pt x="10297509" y="7485"/>
+                  <a:pt x="10853928" y="0"/>
+                </a:cubicBezTo>
+                <a:cubicBezTo>
+                  <a:pt x="10854574" y="4451"/>
+                  <a:pt x="10854418" y="9226"/>
+                  <a:pt x="10853928" y="18288"/>
+                </a:cubicBezTo>
+                <a:cubicBezTo>
+                  <a:pt x="10691638" y="28522"/>
+                  <a:pt x="10574319" y="29578"/>
+                  <a:pt x="10392636" y="18288"/>
+                </a:cubicBezTo>
+                <a:cubicBezTo>
+                  <a:pt x="10210953" y="6998"/>
+                  <a:pt x="9836277" y="-16742"/>
+                  <a:pt x="9497187" y="18288"/>
+                </a:cubicBezTo>
+                <a:cubicBezTo>
+                  <a:pt x="9158097" y="53318"/>
+                  <a:pt x="9119479" y="30714"/>
+                  <a:pt x="8818817" y="18288"/>
+                </a:cubicBezTo>
+                <a:cubicBezTo>
+                  <a:pt x="8518155" y="5863"/>
+                  <a:pt x="8640037" y="6483"/>
+                  <a:pt x="8466064" y="18288"/>
+                </a:cubicBezTo>
+                <a:cubicBezTo>
+                  <a:pt x="8292091" y="30093"/>
+                  <a:pt x="7997656" y="18914"/>
+                  <a:pt x="7787693" y="18288"/>
+                </a:cubicBezTo>
+                <a:cubicBezTo>
+                  <a:pt x="7577730" y="17662"/>
+                  <a:pt x="7412468" y="21416"/>
+                  <a:pt x="7217862" y="18288"/>
+                </a:cubicBezTo>
+                <a:cubicBezTo>
+                  <a:pt x="7023256" y="15160"/>
+                  <a:pt x="6898018" y="14824"/>
+                  <a:pt x="6648031" y="18288"/>
+                </a:cubicBezTo>
+                <a:cubicBezTo>
+                  <a:pt x="6398044" y="21752"/>
+                  <a:pt x="6254402" y="38625"/>
+                  <a:pt x="6078200" y="18288"/>
+                </a:cubicBezTo>
+                <a:cubicBezTo>
+                  <a:pt x="5901998" y="-2049"/>
+                  <a:pt x="5622886" y="3213"/>
+                  <a:pt x="5508368" y="18288"/>
+                </a:cubicBezTo>
+                <a:cubicBezTo>
+                  <a:pt x="5393850" y="33363"/>
+                  <a:pt x="5036260" y="26830"/>
+                  <a:pt x="4721459" y="18288"/>
+                </a:cubicBezTo>
+                <a:cubicBezTo>
+                  <a:pt x="4406658" y="9746"/>
+                  <a:pt x="4239221" y="41551"/>
+                  <a:pt x="4043088" y="18288"/>
+                </a:cubicBezTo>
+                <a:cubicBezTo>
+                  <a:pt x="3846955" y="-4975"/>
+                  <a:pt x="3818802" y="34658"/>
+                  <a:pt x="3690336" y="18288"/>
+                </a:cubicBezTo>
+                <a:cubicBezTo>
+                  <a:pt x="3561870" y="1918"/>
+                  <a:pt x="3265491" y="42194"/>
+                  <a:pt x="3120504" y="18288"/>
+                </a:cubicBezTo>
+                <a:cubicBezTo>
+                  <a:pt x="2975517" y="-5618"/>
+                  <a:pt x="2720254" y="36673"/>
+                  <a:pt x="2333595" y="18288"/>
+                </a:cubicBezTo>
+                <a:cubicBezTo>
+                  <a:pt x="1946936" y="-97"/>
+                  <a:pt x="2097241" y="5776"/>
+                  <a:pt x="1872303" y="18288"/>
+                </a:cubicBezTo>
+                <a:cubicBezTo>
+                  <a:pt x="1647365" y="30800"/>
+                  <a:pt x="1282708" y="45380"/>
+                  <a:pt x="976854" y="18288"/>
+                </a:cubicBezTo>
+                <a:cubicBezTo>
+                  <a:pt x="671000" y="-8804"/>
+                  <a:pt x="408401" y="-12775"/>
+                  <a:pt x="0" y="18288"/>
+                </a:cubicBezTo>
+                <a:cubicBezTo>
+                  <a:pt x="-213" y="9468"/>
+                  <a:pt x="187" y="4459"/>
+                  <a:pt x="0" y="0"/>
+                </a:cubicBezTo>
+                <a:close/>
+              </a:path>
+              <a:path w="10853928" h="18288" stroke="0" extrusionOk="0">
+                <a:moveTo>
+                  <a:pt x="0" y="0"/>
+                </a:moveTo>
+                <a:cubicBezTo>
+                  <a:pt x="267322" y="15284"/>
+                  <a:pt x="415388" y="-21048"/>
+                  <a:pt x="569831" y="0"/>
+                </a:cubicBezTo>
+                <a:cubicBezTo>
+                  <a:pt x="724274" y="21048"/>
+                  <a:pt x="769333" y="-2353"/>
+                  <a:pt x="922584" y="0"/>
+                </a:cubicBezTo>
+                <a:cubicBezTo>
+                  <a:pt x="1075835" y="2353"/>
+                  <a:pt x="1399490" y="-145"/>
+                  <a:pt x="1818033" y="0"/>
+                </a:cubicBezTo>
+                <a:cubicBezTo>
+                  <a:pt x="2236576" y="145"/>
+                  <a:pt x="2145330" y="5482"/>
+                  <a:pt x="2387864" y="0"/>
+                </a:cubicBezTo>
+                <a:cubicBezTo>
+                  <a:pt x="2630398" y="-5482"/>
+                  <a:pt x="2793207" y="18487"/>
+                  <a:pt x="2957695" y="0"/>
+                </a:cubicBezTo>
+                <a:cubicBezTo>
+                  <a:pt x="3122183" y="-18487"/>
+                  <a:pt x="3579141" y="19003"/>
+                  <a:pt x="3853144" y="0"/>
+                </a:cubicBezTo>
+                <a:cubicBezTo>
+                  <a:pt x="4127147" y="-19003"/>
+                  <a:pt x="4209857" y="12211"/>
+                  <a:pt x="4314436" y="0"/>
+                </a:cubicBezTo>
+                <a:cubicBezTo>
+                  <a:pt x="4419015" y="-12211"/>
+                  <a:pt x="4762459" y="-17220"/>
+                  <a:pt x="5209885" y="0"/>
+                </a:cubicBezTo>
+                <a:cubicBezTo>
+                  <a:pt x="5657311" y="17220"/>
+                  <a:pt x="5692663" y="-3290"/>
+                  <a:pt x="6105335" y="0"/>
+                </a:cubicBezTo>
+                <a:cubicBezTo>
+                  <a:pt x="6518007" y="3290"/>
+                  <a:pt x="6455516" y="-5124"/>
+                  <a:pt x="6783705" y="0"/>
+                </a:cubicBezTo>
+                <a:cubicBezTo>
+                  <a:pt x="7111894" y="5124"/>
+                  <a:pt x="7441941" y="-17829"/>
+                  <a:pt x="7679154" y="0"/>
+                </a:cubicBezTo>
+                <a:cubicBezTo>
+                  <a:pt x="7916367" y="17829"/>
+                  <a:pt x="8102967" y="-24363"/>
+                  <a:pt x="8248985" y="0"/>
+                </a:cubicBezTo>
+                <a:cubicBezTo>
+                  <a:pt x="8395003" y="24363"/>
+                  <a:pt x="8552393" y="25505"/>
+                  <a:pt x="8818817" y="0"/>
+                </a:cubicBezTo>
+                <a:cubicBezTo>
+                  <a:pt x="9085241" y="-25505"/>
+                  <a:pt x="9411308" y="38000"/>
+                  <a:pt x="9605726" y="0"/>
+                </a:cubicBezTo>
+                <a:cubicBezTo>
+                  <a:pt x="9800144" y="-38000"/>
+                  <a:pt x="10006468" y="-25741"/>
+                  <a:pt x="10175558" y="0"/>
+                </a:cubicBezTo>
+                <a:cubicBezTo>
+                  <a:pt x="10344648" y="25741"/>
+                  <a:pt x="10696282" y="695"/>
+                  <a:pt x="10853928" y="0"/>
+                </a:cubicBezTo>
+                <a:cubicBezTo>
+                  <a:pt x="10853521" y="8690"/>
+                  <a:pt x="10853774" y="14141"/>
+                  <a:pt x="10853928" y="18288"/>
+                </a:cubicBezTo>
+                <a:cubicBezTo>
+                  <a:pt x="10608124" y="24255"/>
+                  <a:pt x="10343415" y="22307"/>
+                  <a:pt x="10067018" y="18288"/>
+                </a:cubicBezTo>
+                <a:cubicBezTo>
+                  <a:pt x="9790621" y="14270"/>
+                  <a:pt x="9843266" y="3564"/>
+                  <a:pt x="9714266" y="18288"/>
+                </a:cubicBezTo>
+                <a:cubicBezTo>
+                  <a:pt x="9585266" y="33012"/>
+                  <a:pt x="9379484" y="1875"/>
+                  <a:pt x="9252974" y="18288"/>
+                </a:cubicBezTo>
+                <a:cubicBezTo>
+                  <a:pt x="9126464" y="34701"/>
+                  <a:pt x="8580678" y="-4904"/>
+                  <a:pt x="8357525" y="18288"/>
+                </a:cubicBezTo>
+                <a:cubicBezTo>
+                  <a:pt x="8134372" y="41480"/>
+                  <a:pt x="7903199" y="26458"/>
+                  <a:pt x="7679154" y="18288"/>
+                </a:cubicBezTo>
+                <a:cubicBezTo>
+                  <a:pt x="7455109" y="10118"/>
+                  <a:pt x="7435944" y="27109"/>
+                  <a:pt x="7217862" y="18288"/>
+                </a:cubicBezTo>
+                <a:cubicBezTo>
+                  <a:pt x="6999780" y="9467"/>
+                  <a:pt x="6680409" y="18985"/>
+                  <a:pt x="6539492" y="18288"/>
+                </a:cubicBezTo>
+                <a:cubicBezTo>
+                  <a:pt x="6398575" y="17592"/>
+                  <a:pt x="6312077" y="33018"/>
+                  <a:pt x="6186739" y="18288"/>
+                </a:cubicBezTo>
+                <a:cubicBezTo>
+                  <a:pt x="6061401" y="3558"/>
+                  <a:pt x="5947033" y="12075"/>
+                  <a:pt x="5833986" y="18288"/>
+                </a:cubicBezTo>
+                <a:cubicBezTo>
+                  <a:pt x="5720939" y="24501"/>
+                  <a:pt x="5482226" y="8586"/>
+                  <a:pt x="5155616" y="18288"/>
+                </a:cubicBezTo>
+                <a:cubicBezTo>
+                  <a:pt x="4829006" y="27991"/>
+                  <a:pt x="4841274" y="29316"/>
+                  <a:pt x="4694324" y="18288"/>
+                </a:cubicBezTo>
+                <a:cubicBezTo>
+                  <a:pt x="4547374" y="7260"/>
+                  <a:pt x="4077675" y="7013"/>
+                  <a:pt x="3907414" y="18288"/>
+                </a:cubicBezTo>
+                <a:cubicBezTo>
+                  <a:pt x="3737153" y="29564"/>
+                  <a:pt x="3538393" y="21630"/>
+                  <a:pt x="3446122" y="18288"/>
+                </a:cubicBezTo>
+                <a:cubicBezTo>
+                  <a:pt x="3353851" y="14946"/>
+                  <a:pt x="2990320" y="-8091"/>
+                  <a:pt x="2659212" y="18288"/>
+                </a:cubicBezTo>
+                <a:cubicBezTo>
+                  <a:pt x="2328104" y="44667"/>
+                  <a:pt x="2427653" y="9607"/>
+                  <a:pt x="2306460" y="18288"/>
+                </a:cubicBezTo>
+                <a:cubicBezTo>
+                  <a:pt x="2185267" y="26969"/>
+                  <a:pt x="1719763" y="3717"/>
+                  <a:pt x="1519550" y="18288"/>
+                </a:cubicBezTo>
+                <a:cubicBezTo>
+                  <a:pt x="1319337" y="32860"/>
+                  <a:pt x="1167371" y="17040"/>
+                  <a:pt x="1058258" y="18288"/>
+                </a:cubicBezTo>
+                <a:cubicBezTo>
+                  <a:pt x="949145" y="19536"/>
+                  <a:pt x="780234" y="31447"/>
+                  <a:pt x="705505" y="18288"/>
+                </a:cubicBezTo>
+                <a:cubicBezTo>
+                  <a:pt x="630776" y="5129"/>
+                  <a:pt x="215796" y="30056"/>
+                  <a:pt x="0" y="18288"/>
+                </a:cubicBezTo>
+                <a:cubicBezTo>
+                  <a:pt x="-53" y="11301"/>
+                  <a:pt x="-649" y="7756"/>
+                  <a:pt x="0" y="0"/>
+                </a:cubicBezTo>
+                <a:close/>
+              </a:path>
+            </a:pathLst>
+          </a:custGeom>
+          <a:solidFill>
+            <a:schemeClr val="accent2"/>
+          </a:solidFill>
+          <a:ln w="41275" cap="rnd">
+            <a:solidFill>
+              <a:schemeClr val="accent2"/>
+            </a:solidFill>
+            <a:round/>
+            <a:extLst>
+              <a:ext uri="{C807C97D-BFC1-408E-A445-0C87EB9F89A2}">
+                <ask:lineSketchStyleProps xmlns:ask="http://schemas.microsoft.com/office/drawing/2018/sketchyshapes" sd="1219033472">
+                  <a:prstGeom prst="rect">
+                    <a:avLst/>
+                  </a:prstGeom>
+                  <ask:type>
+                    <ask:lineSketchFreehand/>
+                  </ask:type>
+                </ask:lineSketchStyleProps>
+              </a:ext>
+            </a:extLst>
+          </a:ln>
+        </p:spPr>
+        <p:style>
+          <a:lnRef idx="2">
+            <a:schemeClr val="accent1">
+              <a:shade val="50000"/>
+            </a:schemeClr>
+          </a:lnRef>
+          <a:fillRef idx="1">
+            <a:schemeClr val="accent1"/>
+          </a:fillRef>
+          <a:effectRef idx="0">
+            <a:schemeClr val="accent1"/>
+          </a:effectRef>
+          <a:fontRef idx="minor">
+            <a:schemeClr val="lt1"/>
+          </a:fontRef>
+        </p:style>
+        <p:txBody>
+          <a:bodyPr rtlCol="0" anchor="ctr"/>
+          <a:lstStyle/>
+          <a:p>
+            <a:pPr algn="ctr"/>
+            <a:endParaRPr lang="en-US"/>
+          </a:p>
+        </p:txBody>
+      </p:sp>
+      <p:sp>
+        <p:nvSpPr>
+          <p:cNvPr id="5" name="TextBox 4">
+            <a:extLst>
+              <a:ext uri="{FF2B5EF4-FFF2-40B4-BE49-F238E27FC236}">
+                <a16:creationId xmlns:a16="http://schemas.microsoft.com/office/drawing/2014/main" id="{37873CC5-5CDF-8DA5-4F00-6976A11C2424}"/>
+              </a:ext>
+            </a:extLst>
+          </p:cNvPr>
+          <p:cNvSpPr txBox="1"/>
+          <p:nvPr/>
+        </p:nvSpPr>
+        <p:spPr>
+          <a:xfrm>
+            <a:off x="838200" y="1929384"/>
+            <a:ext cx="10515600" cy="4251960"/>
+          </a:xfrm>
+          <a:prstGeom prst="rect">
+            <a:avLst/>
+          </a:prstGeom>
+        </p:spPr>
+        <p:txBody>
+          <a:bodyPr vert="horz" lIns="91440" tIns="45720" rIns="91440" bIns="45720" rtlCol="0">
+            <a:normAutofit/>
+          </a:bodyPr>
+          <a:lstStyle/>
+          <a:p>
+            <a:pPr indent="-228600">
+              <a:lnSpc>
+                <a:spcPct val="90000"/>
+              </a:lnSpc>
+              <a:spcAft>
+                <a:spcPts val="600"/>
+              </a:spcAft>
+              <a:buFont typeface="Arial" panose="020B0604020202020204" pitchFamily="34" charset="0"/>
+              <a:buChar char="•"/>
+            </a:pPr>
+            <a:r>
+              <a:rPr lang="en-US" sz="1900" dirty="0"/>
+              <a:t>	In conclusion, we implemented multiple search algorithms in our game "Block Escape", including BFS, DFS, IDS, A*, Weighted A* and Greedy. </a:t>
+            </a:r>
+          </a:p>
+          <a:p>
+            <a:pPr indent="-228600">
+              <a:lnSpc>
+                <a:spcPct val="90000"/>
+              </a:lnSpc>
+              <a:spcAft>
+                <a:spcPts val="600"/>
+              </a:spcAft>
+              <a:buFont typeface="Arial" panose="020B0604020202020204" pitchFamily="34" charset="0"/>
+              <a:buChar char="•"/>
+            </a:pPr>
+            <a:r>
+              <a:rPr lang="en-US" sz="1900" dirty="0"/>
               <a:t>	While each algorithm has its strengths and weaknesses, we found that BFS was very slow compared to the other algorithms. Greedy search, on the other hand, performed differently due to its lack of a cost function. When it comes to the heuristics we implemented, we found that prioritizing moves that keep the red block close to the edges of the board was the best heuristic overall. This heuristic consistently outperformed the other heuristics in terms of finding optimal solutions, and we believe this is because it helps the algorithm focus on paths that are more likely to lead to the goal state. In our experiments, all the heuristics provided an optimal solution in the A* algorithm. This shows that the heuristics we chose were effective in guiding the search towards the goal state. Finally, we found that IDS was slower than DFS, but used fewer nodes compared to DFS. This suggests that IDS could be a good choice when memory is a concern, and we recommend considering it as an alternative to DFS in certain scenarios. </a:t>
             </a:r>
           </a:p>
           <a:p>
-            <a:r>
-              <a:rPr lang="en-US" dirty="0"/>
-              <a:t>Overall, we are pleased with the performance of our search algorithms and heuristics in "Block Escape". </a:t>
-            </a:r>
-            <a:endParaRPr lang="en-GB" dirty="0"/>
+            <a:pPr indent="-228600">
+              <a:lnSpc>
+                <a:spcPct val="90000"/>
+              </a:lnSpc>
+              <a:spcAft>
+                <a:spcPts val="600"/>
+              </a:spcAft>
+              <a:buFont typeface="Arial" panose="020B0604020202020204" pitchFamily="34" charset="0"/>
+              <a:buChar char="•"/>
+            </a:pPr>
+            <a:r>
+              <a:rPr lang="en-US" sz="1900" dirty="0"/>
+              <a:t>Overall, the search algorithms and heuristics in "Block Escape“ performed accordingly to our expectations. </a:t>
+            </a:r>
           </a:p>
         </p:txBody>
       </p:sp>

</xml_diff>